<commit_message>
updated presentation after saving :)
</commit_message>
<xml_diff>
--- a/nonlinearLSTM.pptx
+++ b/nonlinearLSTM.pptx
@@ -5,10 +5,10 @@
     <p:sldMasterId id="2147483756" r:id="rId4"/>
   </p:sldMasterIdLst>
   <p:notesMasterIdLst>
-    <p:notesMasterId r:id="rId19"/>
+    <p:notesMasterId r:id="rId28"/>
   </p:notesMasterIdLst>
   <p:handoutMasterIdLst>
-    <p:handoutMasterId r:id="rId20"/>
+    <p:handoutMasterId r:id="rId29"/>
   </p:handoutMasterIdLst>
   <p:sldIdLst>
     <p:sldId id="413" r:id="rId5"/>
@@ -24,7 +24,16 @@
     <p:sldId id="427" r:id="rId15"/>
     <p:sldId id="428" r:id="rId16"/>
     <p:sldId id="429" r:id="rId17"/>
-    <p:sldId id="412" r:id="rId18"/>
+    <p:sldId id="434" r:id="rId18"/>
+    <p:sldId id="431" r:id="rId19"/>
+    <p:sldId id="433" r:id="rId20"/>
+    <p:sldId id="432" r:id="rId21"/>
+    <p:sldId id="439" r:id="rId22"/>
+    <p:sldId id="435" r:id="rId23"/>
+    <p:sldId id="436" r:id="rId24"/>
+    <p:sldId id="437" r:id="rId25"/>
+    <p:sldId id="438" r:id="rId26"/>
+    <p:sldId id="412" r:id="rId27"/>
   </p:sldIdLst>
   <p:sldSz cx="12192000" cy="6858000"/>
   <p:notesSz cx="6858000" cy="9144000"/>
@@ -228,7 +237,7 @@
           <a:p>
             <a:fld id="{C88CE87A-16FF-4C7D-8292-0CB980715C8B}" type="datetimeFigureOut">
               <a:rPr lang="de-DE" smtClean="0"/>
-              <a:t>24.10.2022</a:t>
+              <a:t>01.11.2022</a:t>
             </a:fld>
             <a:endParaRPr lang="de-DE"/>
           </a:p>
@@ -306,7 +315,7 @@
           <a:p>
             <a:fld id="{252F6222-CCA6-4FA7-88E0-B7BAE53645AA}" type="slidenum">
               <a:rPr lang="de-DE" smtClean="0"/>
-              <a:t>‹#›</a:t>
+              <a:t>‹Nr.›</a:t>
             </a:fld>
             <a:endParaRPr lang="de-DE"/>
           </a:p>
@@ -405,7 +414,7 @@
           <a:p>
             <a:fld id="{9DECA62E-2216-4960-A875-4D2633F4A404}" type="datetimeFigureOut">
               <a:rPr lang="de-DE" smtClean="0"/>
-              <a:t>24.10.2022</a:t>
+              <a:t>01.11.2022</a:t>
             </a:fld>
             <a:endParaRPr lang="de-DE"/>
           </a:p>
@@ -563,7 +572,7 @@
           <a:p>
             <a:fld id="{E1F93703-73BA-47D5-8B02-C172375928DA}" type="slidenum">
               <a:rPr lang="de-DE" smtClean="0"/>
-              <a:t>‹#›</a:t>
+              <a:t>‹Nr.›</a:t>
             </a:fld>
             <a:endParaRPr lang="de-DE"/>
           </a:p>
@@ -803,7 +812,7 @@
           <a:p>
             <a:fld id="{B8015DB5-16FE-4380-B5BF-46CD18C131D7}" type="datetime8">
               <a:rPr lang="en-DE" smtClean="0"/>
-              <a:t>24/10/2022 10:53</a:t>
+              <a:t>11/01/2022 16:19</a:t>
             </a:fld>
             <a:endParaRPr lang="de-DE" dirty="0"/>
           </a:p>
@@ -862,7 +871,7 @@
             <a:fld id="{D949F9DF-37BD-4CD6-BF49-65BA579E1D7A}" type="slidenum">
               <a:rPr lang="de-DE" smtClean="0"/>
               <a:pPr/>
-              <a:t>‹#›</a:t>
+              <a:t>‹Nr.›</a:t>
             </a:fld>
             <a:endParaRPr lang="de-DE"/>
           </a:p>
@@ -2282,7 +2291,7 @@
           <a:p>
             <a:fld id="{A2E8877F-2015-4290-957C-06EF82A52242}" type="datetime8">
               <a:rPr lang="en-DE" smtClean="0"/>
-              <a:t>24/10/2022 10:53</a:t>
+              <a:t>11/01/2022 16:19</a:t>
             </a:fld>
             <a:endParaRPr lang="de-DE" dirty="0"/>
           </a:p>
@@ -2362,7 +2371,7 @@
             <a:fld id="{D949F9DF-37BD-4CD6-BF49-65BA579E1D7A}" type="slidenum">
               <a:rPr lang="de-DE" smtClean="0"/>
               <a:pPr/>
-              <a:t>‹#›</a:t>
+              <a:t>‹Nr.›</a:t>
             </a:fld>
             <a:endParaRPr lang="de-DE"/>
           </a:p>
@@ -3960,7 +3969,7 @@
           <a:p>
             <a:fld id="{2E7C052D-61E6-45C2-BA19-CFB3925CB63C}" type="datetime8">
               <a:rPr lang="en-DE" smtClean="0"/>
-              <a:t>24/10/2022 10:53</a:t>
+              <a:t>11/01/2022 16:19</a:t>
             </a:fld>
             <a:endParaRPr lang="de-DE" dirty="0"/>
           </a:p>
@@ -4035,7 +4044,7 @@
             <a:fld id="{D949F9DF-37BD-4CD6-BF49-65BA579E1D7A}" type="slidenum">
               <a:rPr lang="de-DE" smtClean="0"/>
               <a:pPr/>
-              <a:t>‹#›</a:t>
+              <a:t>‹Nr.›</a:t>
             </a:fld>
             <a:endParaRPr lang="de-DE"/>
           </a:p>
@@ -7011,7 +7020,7 @@
           <a:p>
             <a:fld id="{E98A7CA8-B4F8-4103-AA95-845AE462A37A}" type="datetime8">
               <a:rPr lang="en-DE" smtClean="0"/>
-              <a:t>24/10/2022 10:53</a:t>
+              <a:t>11/01/2022 16:19</a:t>
             </a:fld>
             <a:endParaRPr lang="de-DE" dirty="0"/>
           </a:p>
@@ -7106,7 +7115,7 @@
             <a:fld id="{D949F9DF-37BD-4CD6-BF49-65BA579E1D7A}" type="slidenum">
               <a:rPr lang="de-DE" smtClean="0"/>
               <a:pPr/>
-              <a:t>‹#›</a:t>
+              <a:t>‹Nr.›</a:t>
             </a:fld>
             <a:endParaRPr lang="de-DE"/>
           </a:p>
@@ -9080,7 +9089,7 @@
           <a:p>
             <a:fld id="{A2E8877F-2015-4290-957C-06EF82A52242}" type="datetime8">
               <a:rPr lang="en-DE" smtClean="0"/>
-              <a:t>24/10/2022 10:53</a:t>
+              <a:t>11/01/2022 16:19</a:t>
             </a:fld>
             <a:endParaRPr lang="de-DE" dirty="0"/>
           </a:p>
@@ -9303,7 +9312,7 @@
           <a:p>
             <a:fld id="{A2E8877F-2015-4290-957C-06EF82A52242}" type="datetime8">
               <a:rPr lang="en-DE" smtClean="0"/>
-              <a:t>24/10/2022 10:53</a:t>
+              <a:t>11/01/2022 16:19</a:t>
             </a:fld>
             <a:endParaRPr lang="de-DE" dirty="0"/>
           </a:p>
@@ -9568,7 +9577,7 @@
           <a:p>
             <a:fld id="{C683496F-A479-4189-AF7A-49EC797A60BB}" type="datetime8">
               <a:rPr lang="en-DE" smtClean="0"/>
-              <a:t>24/10/2022 10:53</a:t>
+              <a:t>11/01/2022 16:19</a:t>
             </a:fld>
             <a:endParaRPr lang="de-DE" dirty="0"/>
           </a:p>
@@ -9686,7 +9695,7 @@
           <a:p>
             <a:fld id="{A2E8877F-2015-4290-957C-06EF82A52242}" type="datetime8">
               <a:rPr lang="en-DE" smtClean="0"/>
-              <a:t>24/10/2022 10:53</a:t>
+              <a:t>11/01/2022 16:19</a:t>
             </a:fld>
             <a:endParaRPr lang="de-DE" dirty="0"/>
           </a:p>
@@ -9882,10 +9891,10 @@
       </p:grpSpPr>
       <p:sp>
         <p:nvSpPr>
-          <p:cNvPr id="2" name="Textplatzhalter 1">
+          <p:cNvPr id="2" name="Date Placeholder 1">
             <a:extLst>
               <a:ext uri="{FF2B5EF4-FFF2-40B4-BE49-F238E27FC236}">
-                <a16:creationId xmlns:a16="http://schemas.microsoft.com/office/drawing/2014/main" id="{D671D917-0E7D-044A-A553-3607B76DD26D}"/>
+                <a16:creationId xmlns:a16="http://schemas.microsoft.com/office/drawing/2014/main" id="{E653CDC2-E009-3556-5871-43AEB18817C7}"/>
               </a:ext>
             </a:extLst>
           </p:cNvPr>
@@ -9893,28 +9902,191 @@
             <a:spLocks noGrp="1"/>
           </p:cNvSpPr>
           <p:nvPr>
-            <p:ph type="body" sz="quarter" idx="13"/>
+            <p:ph type="dt" sz="half" idx="10"/>
           </p:nvPr>
         </p:nvSpPr>
-        <p:spPr>
-          <a:xfrm>
-            <a:off x="518317" y="2647985"/>
-            <a:ext cx="11157745" cy="1562031"/>
-          </a:xfrm>
-        </p:spPr>
+        <p:spPr/>
         <p:txBody>
           <a:bodyPr/>
           <a:lstStyle/>
           <a:p>
-            <a:r>
-              <a:rPr lang="de-DE" dirty="0"/>
-              <a:t>Vielen Dank</a:t>
-            </a:r>
-          </a:p>
-          <a:p>
-            <a:r>
-              <a:rPr lang="de-DE" dirty="0"/>
-              <a:t>für Ihre Aufmerksamkeit!</a:t>
+            <a:fld id="{A2E8877F-2015-4290-957C-06EF82A52242}" type="datetime8">
+              <a:rPr lang="en-DE" smtClean="0"/>
+              <a:t>11/01/2022 18:10</a:t>
+            </a:fld>
+            <a:endParaRPr lang="de-DE" dirty="0"/>
+          </a:p>
+        </p:txBody>
+      </p:sp>
+      <p:sp>
+        <p:nvSpPr>
+          <p:cNvPr id="3" name="Footer Placeholder 2">
+            <a:extLst>
+              <a:ext uri="{FF2B5EF4-FFF2-40B4-BE49-F238E27FC236}">
+                <a16:creationId xmlns:a16="http://schemas.microsoft.com/office/drawing/2014/main" id="{31D70611-B689-F2D3-EC7A-E9C09F116747}"/>
+              </a:ext>
+            </a:extLst>
+          </p:cNvPr>
+          <p:cNvSpPr>
+            <a:spLocks noGrp="1"/>
+          </p:cNvSpPr>
+          <p:nvPr>
+            <p:ph type="ftr" sz="quarter" idx="11"/>
+          </p:nvPr>
+        </p:nvSpPr>
+        <p:spPr/>
+        <p:txBody>
+          <a:bodyPr/>
+          <a:lstStyle/>
+          <a:p>
+            <a:r>
+              <a:rPr lang="en-US"/>
+              <a:t>Modeling of nonlinear Systems with LSTMs | Sebastian Hirt</a:t>
+            </a:r>
+            <a:endParaRPr lang="de-DE" dirty="0"/>
+          </a:p>
+        </p:txBody>
+      </p:sp>
+      <p:sp>
+        <p:nvSpPr>
+          <p:cNvPr id="4" name="Slide Number Placeholder 3">
+            <a:extLst>
+              <a:ext uri="{FF2B5EF4-FFF2-40B4-BE49-F238E27FC236}">
+                <a16:creationId xmlns:a16="http://schemas.microsoft.com/office/drawing/2014/main" id="{72EF048D-E487-0918-E3D6-70DD63871490}"/>
+              </a:ext>
+            </a:extLst>
+          </p:cNvPr>
+          <p:cNvSpPr>
+            <a:spLocks noGrp="1"/>
+          </p:cNvSpPr>
+          <p:nvPr>
+            <p:ph type="sldNum" sz="quarter" idx="12"/>
+          </p:nvPr>
+        </p:nvSpPr>
+        <p:spPr/>
+        <p:txBody>
+          <a:bodyPr/>
+          <a:lstStyle/>
+          <a:p>
+            <a:fld id="{D949F9DF-37BD-4CD6-BF49-65BA579E1D7A}" type="slidenum">
+              <a:rPr lang="de-DE" smtClean="0"/>
+              <a:pPr/>
+              <a:t>14</a:t>
+            </a:fld>
+            <a:endParaRPr lang="de-DE"/>
+          </a:p>
+        </p:txBody>
+      </p:sp>
+      <p:sp>
+        <p:nvSpPr>
+          <p:cNvPr id="5" name="Title 4">
+            <a:extLst>
+              <a:ext uri="{FF2B5EF4-FFF2-40B4-BE49-F238E27FC236}">
+                <a16:creationId xmlns:a16="http://schemas.microsoft.com/office/drawing/2014/main" id="{45EE9607-A6C6-D200-B84D-465F5AABC4F5}"/>
+              </a:ext>
+            </a:extLst>
+          </p:cNvPr>
+          <p:cNvSpPr>
+            <a:spLocks noGrp="1"/>
+          </p:cNvSpPr>
+          <p:nvPr>
+            <p:ph type="title"/>
+          </p:nvPr>
+        </p:nvSpPr>
+        <p:spPr/>
+        <p:txBody>
+          <a:bodyPr/>
+          <a:lstStyle/>
+          <a:p>
+            <a:r>
+              <a:rPr lang="en-US" dirty="0"/>
+              <a:t>Pendulum</a:t>
+            </a:r>
+          </a:p>
+        </p:txBody>
+      </p:sp>
+      <p:sp>
+        <p:nvSpPr>
+          <p:cNvPr id="6" name="Text Placeholder 5">
+            <a:extLst>
+              <a:ext uri="{FF2B5EF4-FFF2-40B4-BE49-F238E27FC236}">
+                <a16:creationId xmlns:a16="http://schemas.microsoft.com/office/drawing/2014/main" id="{680BC9F9-2757-24C5-308C-2149987995FC}"/>
+              </a:ext>
+            </a:extLst>
+          </p:cNvPr>
+          <p:cNvSpPr>
+            <a:spLocks noGrp="1"/>
+          </p:cNvSpPr>
+          <p:nvPr>
+            <p:ph type="body" sz="quarter" idx="17"/>
+          </p:nvPr>
+        </p:nvSpPr>
+        <p:spPr/>
+        <p:txBody>
+          <a:bodyPr/>
+          <a:lstStyle/>
+          <a:p>
+            <a:r>
+              <a:rPr lang="en-US" dirty="0"/>
+              <a:t>First Pendulum</a:t>
+            </a:r>
+          </a:p>
+          <a:p>
+            <a:r>
+              <a:rPr lang="en-US" dirty="0"/>
+              <a:t>Evaluate on new data!</a:t>
+            </a:r>
+          </a:p>
+          <a:p>
+            <a:pPr lvl="1"/>
+            <a:r>
+              <a:rPr lang="en-US" dirty="0"/>
+              <a:t>Need more similar data samples, variety of steps. </a:t>
+            </a:r>
+            <a:r>
+              <a:rPr lang="en-US" dirty="0">
+                <a:sym typeface="Wingdings" panose="05000000000000000000" pitchFamily="2" charset="2"/>
+              </a:rPr>
+              <a:t> Different starting conditions between -2 and 2, 100 different series</a:t>
+            </a:r>
+          </a:p>
+          <a:p>
+            <a:pPr lvl="1"/>
+            <a:r>
+              <a:rPr lang="en-US" dirty="0">
+                <a:sym typeface="Wingdings" panose="05000000000000000000" pitchFamily="2" charset="2"/>
+              </a:rPr>
+              <a:t>Normalization not necessary, variables have similar ranges</a:t>
+            </a:r>
+            <a:endParaRPr lang="en-US" dirty="0"/>
+          </a:p>
+          <a:p>
+            <a:pPr lvl="1"/>
+            <a:r>
+              <a:rPr lang="en-US" dirty="0"/>
+              <a:t>Train again on </a:t>
+            </a:r>
+            <a:r>
+              <a:rPr lang="en-US" b="1" dirty="0"/>
+              <a:t>now multiple </a:t>
+            </a:r>
+            <a:r>
+              <a:rPr lang="en-US" dirty="0"/>
+              <a:t>different training samples</a:t>
+            </a:r>
+          </a:p>
+          <a:p>
+            <a:pPr lvl="1"/>
+            <a:r>
+              <a:rPr lang="en-US" dirty="0"/>
+              <a:t>Evaluate on the training data again, to make sure it can learn one sample of the multiple training samples well.</a:t>
+            </a:r>
+          </a:p>
+          <a:p>
+            <a:pPr lvl="1"/>
+            <a:r>
+              <a:rPr lang="en-US" dirty="0"/>
+              <a:t>Then evaluate on new data!</a:t>
             </a:r>
           </a:p>
         </p:txBody>
@@ -9922,7 +10094,1146 @@
     </p:spTree>
     <p:extLst>
       <p:ext uri="{BB962C8B-B14F-4D97-AF65-F5344CB8AC3E}">
-        <p14:creationId xmlns:p14="http://schemas.microsoft.com/office/powerpoint/2010/main" val="1185948968"/>
+        <p14:creationId xmlns:p14="http://schemas.microsoft.com/office/powerpoint/2010/main" val="3939193098"/>
+      </p:ext>
+    </p:extLst>
+  </p:cSld>
+  <p:clrMapOvr>
+    <a:masterClrMapping/>
+  </p:clrMapOvr>
+</p:sld>
+</file>
+
+<file path=ppt/slides/slide15.xml><?xml version="1.0" encoding="utf-8"?>
+<p:sld xmlns:a="http://schemas.openxmlformats.org/drawingml/2006/main" xmlns:r="http://schemas.openxmlformats.org/officeDocument/2006/relationships" xmlns:p="http://schemas.openxmlformats.org/presentationml/2006/main">
+  <p:cSld>
+    <p:spTree>
+      <p:nvGrpSpPr>
+        <p:cNvPr id="1" name=""/>
+        <p:cNvGrpSpPr/>
+        <p:nvPr/>
+      </p:nvGrpSpPr>
+      <p:grpSpPr>
+        <a:xfrm>
+          <a:off x="0" y="0"/>
+          <a:ext cx="0" cy="0"/>
+          <a:chOff x="0" y="0"/>
+          <a:chExt cx="0" cy="0"/>
+        </a:xfrm>
+      </p:grpSpPr>
+      <p:sp>
+        <p:nvSpPr>
+          <p:cNvPr id="2" name="Datumsplatzhalter 1">
+            <a:extLst>
+              <a:ext uri="{FF2B5EF4-FFF2-40B4-BE49-F238E27FC236}">
+                <a16:creationId xmlns:a16="http://schemas.microsoft.com/office/drawing/2014/main" id="{B446B528-9123-B86E-03BB-CC1AFE33FB8E}"/>
+              </a:ext>
+            </a:extLst>
+          </p:cNvPr>
+          <p:cNvSpPr>
+            <a:spLocks noGrp="1"/>
+          </p:cNvSpPr>
+          <p:nvPr>
+            <p:ph type="dt" sz="half" idx="10"/>
+          </p:nvPr>
+        </p:nvSpPr>
+        <p:spPr/>
+        <p:txBody>
+          <a:bodyPr/>
+          <a:lstStyle/>
+          <a:p>
+            <a:fld id="{A2E8877F-2015-4290-957C-06EF82A52242}" type="datetime8">
+              <a:rPr lang="en-DE" smtClean="0"/>
+              <a:t>11/01/2022 17:55</a:t>
+            </a:fld>
+            <a:endParaRPr lang="de-DE" dirty="0"/>
+          </a:p>
+        </p:txBody>
+      </p:sp>
+      <p:sp>
+        <p:nvSpPr>
+          <p:cNvPr id="3" name="Fußzeilenplatzhalter 2">
+            <a:extLst>
+              <a:ext uri="{FF2B5EF4-FFF2-40B4-BE49-F238E27FC236}">
+                <a16:creationId xmlns:a16="http://schemas.microsoft.com/office/drawing/2014/main" id="{9039D9D2-CC83-71B3-9FD1-8EE930EC3D74}"/>
+              </a:ext>
+            </a:extLst>
+          </p:cNvPr>
+          <p:cNvSpPr>
+            <a:spLocks noGrp="1"/>
+          </p:cNvSpPr>
+          <p:nvPr>
+            <p:ph type="ftr" sz="quarter" idx="11"/>
+          </p:nvPr>
+        </p:nvSpPr>
+        <p:spPr/>
+        <p:txBody>
+          <a:bodyPr/>
+          <a:lstStyle/>
+          <a:p>
+            <a:r>
+              <a:rPr lang="en-US"/>
+              <a:t>Modeling of nonlinear Systems with LSTMs | Sebastian Hirt</a:t>
+            </a:r>
+            <a:endParaRPr lang="de-DE" dirty="0"/>
+          </a:p>
+        </p:txBody>
+      </p:sp>
+      <p:sp>
+        <p:nvSpPr>
+          <p:cNvPr id="4" name="Foliennummernplatzhalter 3">
+            <a:extLst>
+              <a:ext uri="{FF2B5EF4-FFF2-40B4-BE49-F238E27FC236}">
+                <a16:creationId xmlns:a16="http://schemas.microsoft.com/office/drawing/2014/main" id="{6799EE1F-7DA2-681B-18DD-284EC80CE7C1}"/>
+              </a:ext>
+            </a:extLst>
+          </p:cNvPr>
+          <p:cNvSpPr>
+            <a:spLocks noGrp="1"/>
+          </p:cNvSpPr>
+          <p:nvPr>
+            <p:ph type="sldNum" sz="quarter" idx="12"/>
+          </p:nvPr>
+        </p:nvSpPr>
+        <p:spPr/>
+        <p:txBody>
+          <a:bodyPr/>
+          <a:lstStyle/>
+          <a:p>
+            <a:fld id="{D949F9DF-37BD-4CD6-BF49-65BA579E1D7A}" type="slidenum">
+              <a:rPr lang="de-DE" smtClean="0"/>
+              <a:pPr/>
+              <a:t>15</a:t>
+            </a:fld>
+            <a:endParaRPr lang="de-DE"/>
+          </a:p>
+        </p:txBody>
+      </p:sp>
+      <p:sp>
+        <p:nvSpPr>
+          <p:cNvPr id="5" name="Titel 4">
+            <a:extLst>
+              <a:ext uri="{FF2B5EF4-FFF2-40B4-BE49-F238E27FC236}">
+                <a16:creationId xmlns:a16="http://schemas.microsoft.com/office/drawing/2014/main" id="{1E6B2A5D-4314-E0F4-B6A1-769A8DB4F7C3}"/>
+              </a:ext>
+            </a:extLst>
+          </p:cNvPr>
+          <p:cNvSpPr>
+            <a:spLocks noGrp="1"/>
+          </p:cNvSpPr>
+          <p:nvPr>
+            <p:ph type="title"/>
+          </p:nvPr>
+        </p:nvSpPr>
+        <p:spPr/>
+        <p:txBody>
+          <a:bodyPr/>
+          <a:lstStyle/>
+          <a:p>
+            <a:r>
+              <a:rPr lang="en-US" dirty="0"/>
+              <a:t>Pendulum – Multiple Samples</a:t>
+            </a:r>
+          </a:p>
+        </p:txBody>
+      </p:sp>
+      <p:sp>
+        <p:nvSpPr>
+          <p:cNvPr id="6" name="Textplatzhalter 5">
+            <a:extLst>
+              <a:ext uri="{FF2B5EF4-FFF2-40B4-BE49-F238E27FC236}">
+                <a16:creationId xmlns:a16="http://schemas.microsoft.com/office/drawing/2014/main" id="{202B2346-17ED-3E6E-A606-65763BDC6E02}"/>
+              </a:ext>
+            </a:extLst>
+          </p:cNvPr>
+          <p:cNvSpPr>
+            <a:spLocks noGrp="1"/>
+          </p:cNvSpPr>
+          <p:nvPr>
+            <p:ph type="body" sz="quarter" idx="17"/>
+          </p:nvPr>
+        </p:nvSpPr>
+        <p:spPr/>
+        <p:txBody>
+          <a:bodyPr/>
+          <a:lstStyle/>
+          <a:p>
+            <a:r>
+              <a:rPr lang="en-US" dirty="0"/>
+              <a:t>Prediction on </a:t>
+            </a:r>
+            <a:r>
+              <a:rPr lang="en-US" dirty="0" err="1"/>
+              <a:t>Trainingset</a:t>
+            </a:r>
+            <a:endParaRPr lang="en-US" dirty="0"/>
+          </a:p>
+        </p:txBody>
+      </p:sp>
+      <p:pic>
+        <p:nvPicPr>
+          <p:cNvPr id="8" name="Grafik 7">
+            <a:extLst>
+              <a:ext uri="{FF2B5EF4-FFF2-40B4-BE49-F238E27FC236}">
+                <a16:creationId xmlns:a16="http://schemas.microsoft.com/office/drawing/2014/main" id="{41C2722B-06E4-7722-E423-C82D0EAD8AD0}"/>
+              </a:ext>
+            </a:extLst>
+          </p:cNvPr>
+          <p:cNvPicPr>
+            <a:picLocks noChangeAspect="1"/>
+          </p:cNvPicPr>
+          <p:nvPr/>
+        </p:nvPicPr>
+        <p:blipFill>
+          <a:blip r:embed="rId2">
+            <a:extLst>
+              <a:ext uri="{28A0092B-C50C-407E-A947-70E740481C1C}">
+                <a14:useLocalDpi xmlns:a14="http://schemas.microsoft.com/office/drawing/2010/main" val="0"/>
+              </a:ext>
+            </a:extLst>
+          </a:blip>
+          <a:stretch>
+            <a:fillRect/>
+          </a:stretch>
+        </p:blipFill>
+        <p:spPr>
+          <a:xfrm>
+            <a:off x="3860438" y="1323537"/>
+            <a:ext cx="6746069" cy="5059551"/>
+          </a:xfrm>
+          <a:prstGeom prst="rect">
+            <a:avLst/>
+          </a:prstGeom>
+        </p:spPr>
+      </p:pic>
+    </p:spTree>
+    <p:extLst>
+      <p:ext uri="{BB962C8B-B14F-4D97-AF65-F5344CB8AC3E}">
+        <p14:creationId xmlns:p14="http://schemas.microsoft.com/office/powerpoint/2010/main" val="2123225334"/>
+      </p:ext>
+    </p:extLst>
+  </p:cSld>
+  <p:clrMapOvr>
+    <a:masterClrMapping/>
+  </p:clrMapOvr>
+</p:sld>
+</file>
+
+<file path=ppt/slides/slide16.xml><?xml version="1.0" encoding="utf-8"?>
+<p:sld xmlns:a="http://schemas.openxmlformats.org/drawingml/2006/main" xmlns:r="http://schemas.openxmlformats.org/officeDocument/2006/relationships" xmlns:p="http://schemas.openxmlformats.org/presentationml/2006/main">
+  <p:cSld>
+    <p:spTree>
+      <p:nvGrpSpPr>
+        <p:cNvPr id="1" name=""/>
+        <p:cNvGrpSpPr/>
+        <p:nvPr/>
+      </p:nvGrpSpPr>
+      <p:grpSpPr>
+        <a:xfrm>
+          <a:off x="0" y="0"/>
+          <a:ext cx="0" cy="0"/>
+          <a:chOff x="0" y="0"/>
+          <a:chExt cx="0" cy="0"/>
+        </a:xfrm>
+      </p:grpSpPr>
+      <p:sp>
+        <p:nvSpPr>
+          <p:cNvPr id="2" name="Datumsplatzhalter 1">
+            <a:extLst>
+              <a:ext uri="{FF2B5EF4-FFF2-40B4-BE49-F238E27FC236}">
+                <a16:creationId xmlns:a16="http://schemas.microsoft.com/office/drawing/2014/main" id="{B446B528-9123-B86E-03BB-CC1AFE33FB8E}"/>
+              </a:ext>
+            </a:extLst>
+          </p:cNvPr>
+          <p:cNvSpPr>
+            <a:spLocks noGrp="1"/>
+          </p:cNvSpPr>
+          <p:nvPr>
+            <p:ph type="dt" sz="half" idx="10"/>
+          </p:nvPr>
+        </p:nvSpPr>
+        <p:spPr/>
+        <p:txBody>
+          <a:bodyPr/>
+          <a:lstStyle/>
+          <a:p>
+            <a:fld id="{A2E8877F-2015-4290-957C-06EF82A52242}" type="datetime8">
+              <a:rPr lang="en-DE" smtClean="0"/>
+              <a:t>11/01/2022 18:09</a:t>
+            </a:fld>
+            <a:endParaRPr lang="de-DE" dirty="0"/>
+          </a:p>
+        </p:txBody>
+      </p:sp>
+      <p:sp>
+        <p:nvSpPr>
+          <p:cNvPr id="3" name="Fußzeilenplatzhalter 2">
+            <a:extLst>
+              <a:ext uri="{FF2B5EF4-FFF2-40B4-BE49-F238E27FC236}">
+                <a16:creationId xmlns:a16="http://schemas.microsoft.com/office/drawing/2014/main" id="{9039D9D2-CC83-71B3-9FD1-8EE930EC3D74}"/>
+              </a:ext>
+            </a:extLst>
+          </p:cNvPr>
+          <p:cNvSpPr>
+            <a:spLocks noGrp="1"/>
+          </p:cNvSpPr>
+          <p:nvPr>
+            <p:ph type="ftr" sz="quarter" idx="11"/>
+          </p:nvPr>
+        </p:nvSpPr>
+        <p:spPr/>
+        <p:txBody>
+          <a:bodyPr/>
+          <a:lstStyle/>
+          <a:p>
+            <a:r>
+              <a:rPr lang="en-US"/>
+              <a:t>Modeling of nonlinear Systems with LSTMs | Sebastian Hirt</a:t>
+            </a:r>
+            <a:endParaRPr lang="de-DE" dirty="0"/>
+          </a:p>
+        </p:txBody>
+      </p:sp>
+      <p:sp>
+        <p:nvSpPr>
+          <p:cNvPr id="4" name="Foliennummernplatzhalter 3">
+            <a:extLst>
+              <a:ext uri="{FF2B5EF4-FFF2-40B4-BE49-F238E27FC236}">
+                <a16:creationId xmlns:a16="http://schemas.microsoft.com/office/drawing/2014/main" id="{6799EE1F-7DA2-681B-18DD-284EC80CE7C1}"/>
+              </a:ext>
+            </a:extLst>
+          </p:cNvPr>
+          <p:cNvSpPr>
+            <a:spLocks noGrp="1"/>
+          </p:cNvSpPr>
+          <p:nvPr>
+            <p:ph type="sldNum" sz="quarter" idx="12"/>
+          </p:nvPr>
+        </p:nvSpPr>
+        <p:spPr/>
+        <p:txBody>
+          <a:bodyPr/>
+          <a:lstStyle/>
+          <a:p>
+            <a:fld id="{D949F9DF-37BD-4CD6-BF49-65BA579E1D7A}" type="slidenum">
+              <a:rPr lang="de-DE" smtClean="0"/>
+              <a:pPr/>
+              <a:t>16</a:t>
+            </a:fld>
+            <a:endParaRPr lang="de-DE"/>
+          </a:p>
+        </p:txBody>
+      </p:sp>
+      <p:sp>
+        <p:nvSpPr>
+          <p:cNvPr id="5" name="Titel 4">
+            <a:extLst>
+              <a:ext uri="{FF2B5EF4-FFF2-40B4-BE49-F238E27FC236}">
+                <a16:creationId xmlns:a16="http://schemas.microsoft.com/office/drawing/2014/main" id="{1E6B2A5D-4314-E0F4-B6A1-769A8DB4F7C3}"/>
+              </a:ext>
+            </a:extLst>
+          </p:cNvPr>
+          <p:cNvSpPr>
+            <a:spLocks noGrp="1"/>
+          </p:cNvSpPr>
+          <p:nvPr>
+            <p:ph type="title"/>
+          </p:nvPr>
+        </p:nvSpPr>
+        <p:spPr/>
+        <p:txBody>
+          <a:bodyPr/>
+          <a:lstStyle/>
+          <a:p>
+            <a:r>
+              <a:rPr lang="en-US" dirty="0"/>
+              <a:t>Pendulum – Multiple Samples</a:t>
+            </a:r>
+          </a:p>
+        </p:txBody>
+      </p:sp>
+      <p:sp>
+        <p:nvSpPr>
+          <p:cNvPr id="6" name="Textplatzhalter 5">
+            <a:extLst>
+              <a:ext uri="{FF2B5EF4-FFF2-40B4-BE49-F238E27FC236}">
+                <a16:creationId xmlns:a16="http://schemas.microsoft.com/office/drawing/2014/main" id="{202B2346-17ED-3E6E-A606-65763BDC6E02}"/>
+              </a:ext>
+            </a:extLst>
+          </p:cNvPr>
+          <p:cNvSpPr>
+            <a:spLocks noGrp="1"/>
+          </p:cNvSpPr>
+          <p:nvPr>
+            <p:ph type="body" sz="quarter" idx="17"/>
+          </p:nvPr>
+        </p:nvSpPr>
+        <p:spPr/>
+        <p:txBody>
+          <a:bodyPr/>
+          <a:lstStyle/>
+          <a:p>
+            <a:r>
+              <a:rPr lang="en-US" dirty="0"/>
+              <a:t>Prediction on Validation Set</a:t>
+            </a:r>
+          </a:p>
+        </p:txBody>
+      </p:sp>
+      <p:pic>
+        <p:nvPicPr>
+          <p:cNvPr id="9" name="Grafik 8">
+            <a:extLst>
+              <a:ext uri="{FF2B5EF4-FFF2-40B4-BE49-F238E27FC236}">
+                <a16:creationId xmlns:a16="http://schemas.microsoft.com/office/drawing/2014/main" id="{50B5C8B4-418D-72AC-D6AA-9044D23D4EBA}"/>
+              </a:ext>
+            </a:extLst>
+          </p:cNvPr>
+          <p:cNvPicPr>
+            <a:picLocks noChangeAspect="1"/>
+          </p:cNvPicPr>
+          <p:nvPr/>
+        </p:nvPicPr>
+        <p:blipFill>
+          <a:blip r:embed="rId2">
+            <a:extLst>
+              <a:ext uri="{28A0092B-C50C-407E-A947-70E740481C1C}">
+                <a14:useLocalDpi xmlns:a14="http://schemas.microsoft.com/office/drawing/2010/main" val="0"/>
+              </a:ext>
+            </a:extLst>
+          </a:blip>
+          <a:stretch>
+            <a:fillRect/>
+          </a:stretch>
+        </p:blipFill>
+        <p:spPr>
+          <a:xfrm>
+            <a:off x="3926868" y="1353773"/>
+            <a:ext cx="6679639" cy="5009729"/>
+          </a:xfrm>
+          <a:prstGeom prst="rect">
+            <a:avLst/>
+          </a:prstGeom>
+        </p:spPr>
+      </p:pic>
+    </p:spTree>
+    <p:extLst>
+      <p:ext uri="{BB962C8B-B14F-4D97-AF65-F5344CB8AC3E}">
+        <p14:creationId xmlns:p14="http://schemas.microsoft.com/office/powerpoint/2010/main" val="786337867"/>
+      </p:ext>
+    </p:extLst>
+  </p:cSld>
+  <p:clrMapOvr>
+    <a:masterClrMapping/>
+  </p:clrMapOvr>
+</p:sld>
+</file>
+
+<file path=ppt/slides/slide17.xml><?xml version="1.0" encoding="utf-8"?>
+<p:sld xmlns:a="http://schemas.openxmlformats.org/drawingml/2006/main" xmlns:r="http://schemas.openxmlformats.org/officeDocument/2006/relationships" xmlns:p="http://schemas.openxmlformats.org/presentationml/2006/main">
+  <p:cSld>
+    <p:spTree>
+      <p:nvGrpSpPr>
+        <p:cNvPr id="1" name=""/>
+        <p:cNvGrpSpPr/>
+        <p:nvPr/>
+      </p:nvGrpSpPr>
+      <p:grpSpPr>
+        <a:xfrm>
+          <a:off x="0" y="0"/>
+          <a:ext cx="0" cy="0"/>
+          <a:chOff x="0" y="0"/>
+          <a:chExt cx="0" cy="0"/>
+        </a:xfrm>
+      </p:grpSpPr>
+      <p:sp>
+        <p:nvSpPr>
+          <p:cNvPr id="2" name="Datumsplatzhalter 1">
+            <a:extLst>
+              <a:ext uri="{FF2B5EF4-FFF2-40B4-BE49-F238E27FC236}">
+                <a16:creationId xmlns:a16="http://schemas.microsoft.com/office/drawing/2014/main" id="{B446B528-9123-B86E-03BB-CC1AFE33FB8E}"/>
+              </a:ext>
+            </a:extLst>
+          </p:cNvPr>
+          <p:cNvSpPr>
+            <a:spLocks noGrp="1"/>
+          </p:cNvSpPr>
+          <p:nvPr>
+            <p:ph type="dt" sz="half" idx="10"/>
+          </p:nvPr>
+        </p:nvSpPr>
+        <p:spPr/>
+        <p:txBody>
+          <a:bodyPr/>
+          <a:lstStyle/>
+          <a:p>
+            <a:fld id="{A2E8877F-2015-4290-957C-06EF82A52242}" type="datetime8">
+              <a:rPr lang="en-DE" smtClean="0"/>
+              <a:t>11/01/2022 18:06</a:t>
+            </a:fld>
+            <a:endParaRPr lang="de-DE" dirty="0"/>
+          </a:p>
+        </p:txBody>
+      </p:sp>
+      <p:sp>
+        <p:nvSpPr>
+          <p:cNvPr id="3" name="Fußzeilenplatzhalter 2">
+            <a:extLst>
+              <a:ext uri="{FF2B5EF4-FFF2-40B4-BE49-F238E27FC236}">
+                <a16:creationId xmlns:a16="http://schemas.microsoft.com/office/drawing/2014/main" id="{9039D9D2-CC83-71B3-9FD1-8EE930EC3D74}"/>
+              </a:ext>
+            </a:extLst>
+          </p:cNvPr>
+          <p:cNvSpPr>
+            <a:spLocks noGrp="1"/>
+          </p:cNvSpPr>
+          <p:nvPr>
+            <p:ph type="ftr" sz="quarter" idx="11"/>
+          </p:nvPr>
+        </p:nvSpPr>
+        <p:spPr/>
+        <p:txBody>
+          <a:bodyPr/>
+          <a:lstStyle/>
+          <a:p>
+            <a:r>
+              <a:rPr lang="en-US"/>
+              <a:t>Modeling of nonlinear Systems with LSTMs | Sebastian Hirt</a:t>
+            </a:r>
+            <a:endParaRPr lang="de-DE" dirty="0"/>
+          </a:p>
+        </p:txBody>
+      </p:sp>
+      <p:sp>
+        <p:nvSpPr>
+          <p:cNvPr id="4" name="Foliennummernplatzhalter 3">
+            <a:extLst>
+              <a:ext uri="{FF2B5EF4-FFF2-40B4-BE49-F238E27FC236}">
+                <a16:creationId xmlns:a16="http://schemas.microsoft.com/office/drawing/2014/main" id="{6799EE1F-7DA2-681B-18DD-284EC80CE7C1}"/>
+              </a:ext>
+            </a:extLst>
+          </p:cNvPr>
+          <p:cNvSpPr>
+            <a:spLocks noGrp="1"/>
+          </p:cNvSpPr>
+          <p:nvPr>
+            <p:ph type="sldNum" sz="quarter" idx="12"/>
+          </p:nvPr>
+        </p:nvSpPr>
+        <p:spPr/>
+        <p:txBody>
+          <a:bodyPr/>
+          <a:lstStyle/>
+          <a:p>
+            <a:fld id="{D949F9DF-37BD-4CD6-BF49-65BA579E1D7A}" type="slidenum">
+              <a:rPr lang="de-DE" smtClean="0"/>
+              <a:pPr/>
+              <a:t>17</a:t>
+            </a:fld>
+            <a:endParaRPr lang="de-DE"/>
+          </a:p>
+        </p:txBody>
+      </p:sp>
+      <p:sp>
+        <p:nvSpPr>
+          <p:cNvPr id="5" name="Titel 4">
+            <a:extLst>
+              <a:ext uri="{FF2B5EF4-FFF2-40B4-BE49-F238E27FC236}">
+                <a16:creationId xmlns:a16="http://schemas.microsoft.com/office/drawing/2014/main" id="{1E6B2A5D-4314-E0F4-B6A1-769A8DB4F7C3}"/>
+              </a:ext>
+            </a:extLst>
+          </p:cNvPr>
+          <p:cNvSpPr>
+            <a:spLocks noGrp="1"/>
+          </p:cNvSpPr>
+          <p:nvPr>
+            <p:ph type="title"/>
+          </p:nvPr>
+        </p:nvSpPr>
+        <p:spPr/>
+        <p:txBody>
+          <a:bodyPr/>
+          <a:lstStyle/>
+          <a:p>
+            <a:r>
+              <a:rPr lang="en-US" dirty="0"/>
+              <a:t>Pendulum – Multiple Samples</a:t>
+            </a:r>
+          </a:p>
+        </p:txBody>
+      </p:sp>
+      <p:sp>
+        <p:nvSpPr>
+          <p:cNvPr id="6" name="Textplatzhalter 5">
+            <a:extLst>
+              <a:ext uri="{FF2B5EF4-FFF2-40B4-BE49-F238E27FC236}">
+                <a16:creationId xmlns:a16="http://schemas.microsoft.com/office/drawing/2014/main" id="{202B2346-17ED-3E6E-A606-65763BDC6E02}"/>
+              </a:ext>
+            </a:extLst>
+          </p:cNvPr>
+          <p:cNvSpPr>
+            <a:spLocks noGrp="1"/>
+          </p:cNvSpPr>
+          <p:nvPr>
+            <p:ph type="body" sz="quarter" idx="17"/>
+          </p:nvPr>
+        </p:nvSpPr>
+        <p:spPr/>
+        <p:txBody>
+          <a:bodyPr/>
+          <a:lstStyle/>
+          <a:p>
+            <a:r>
+              <a:rPr lang="en-US" dirty="0"/>
+              <a:t>Prediction on Test Set</a:t>
+            </a:r>
+          </a:p>
+        </p:txBody>
+      </p:sp>
+      <p:pic>
+        <p:nvPicPr>
+          <p:cNvPr id="11" name="Grafik 10">
+            <a:extLst>
+              <a:ext uri="{FF2B5EF4-FFF2-40B4-BE49-F238E27FC236}">
+                <a16:creationId xmlns:a16="http://schemas.microsoft.com/office/drawing/2014/main" id="{3EF1A20F-4806-8D5D-1EA6-81C82385315F}"/>
+              </a:ext>
+            </a:extLst>
+          </p:cNvPr>
+          <p:cNvPicPr>
+            <a:picLocks noChangeAspect="1"/>
+          </p:cNvPicPr>
+          <p:nvPr/>
+        </p:nvPicPr>
+        <p:blipFill>
+          <a:blip r:embed="rId2">
+            <a:extLst>
+              <a:ext uri="{28A0092B-C50C-407E-A947-70E740481C1C}">
+                <a14:useLocalDpi xmlns:a14="http://schemas.microsoft.com/office/drawing/2010/main" val="0"/>
+              </a:ext>
+            </a:extLst>
+          </a:blip>
+          <a:stretch>
+            <a:fillRect/>
+          </a:stretch>
+        </p:blipFill>
+        <p:spPr>
+          <a:xfrm>
+            <a:off x="3757034" y="1289836"/>
+            <a:ext cx="6849473" cy="5137105"/>
+          </a:xfrm>
+          <a:prstGeom prst="rect">
+            <a:avLst/>
+          </a:prstGeom>
+        </p:spPr>
+      </p:pic>
+    </p:spTree>
+    <p:extLst>
+      <p:ext uri="{BB962C8B-B14F-4D97-AF65-F5344CB8AC3E}">
+        <p14:creationId xmlns:p14="http://schemas.microsoft.com/office/powerpoint/2010/main" val="1951731976"/>
+      </p:ext>
+    </p:extLst>
+  </p:cSld>
+  <p:clrMapOvr>
+    <a:masterClrMapping/>
+  </p:clrMapOvr>
+</p:sld>
+</file>
+
+<file path=ppt/slides/slide18.xml><?xml version="1.0" encoding="utf-8"?>
+<p:sld xmlns:a="http://schemas.openxmlformats.org/drawingml/2006/main" xmlns:r="http://schemas.openxmlformats.org/officeDocument/2006/relationships" xmlns:p="http://schemas.openxmlformats.org/presentationml/2006/main">
+  <p:cSld>
+    <p:spTree>
+      <p:nvGrpSpPr>
+        <p:cNvPr id="1" name=""/>
+        <p:cNvGrpSpPr/>
+        <p:nvPr/>
+      </p:nvGrpSpPr>
+      <p:grpSpPr>
+        <a:xfrm>
+          <a:off x="0" y="0"/>
+          <a:ext cx="0" cy="0"/>
+          <a:chOff x="0" y="0"/>
+          <a:chExt cx="0" cy="0"/>
+        </a:xfrm>
+      </p:grpSpPr>
+      <p:sp>
+        <p:nvSpPr>
+          <p:cNvPr id="2" name="Date Placeholder 1">
+            <a:extLst>
+              <a:ext uri="{FF2B5EF4-FFF2-40B4-BE49-F238E27FC236}">
+                <a16:creationId xmlns:a16="http://schemas.microsoft.com/office/drawing/2014/main" id="{E653CDC2-E009-3556-5871-43AEB18817C7}"/>
+              </a:ext>
+            </a:extLst>
+          </p:cNvPr>
+          <p:cNvSpPr>
+            <a:spLocks noGrp="1"/>
+          </p:cNvSpPr>
+          <p:nvPr>
+            <p:ph type="dt" sz="half" idx="10"/>
+          </p:nvPr>
+        </p:nvSpPr>
+        <p:spPr/>
+        <p:txBody>
+          <a:bodyPr/>
+          <a:lstStyle/>
+          <a:p>
+            <a:fld id="{A2E8877F-2015-4290-957C-06EF82A52242}" type="datetime8">
+              <a:rPr lang="en-DE" smtClean="0"/>
+              <a:t>11/01/2022 18:21</a:t>
+            </a:fld>
+            <a:endParaRPr lang="de-DE" dirty="0"/>
+          </a:p>
+        </p:txBody>
+      </p:sp>
+      <p:sp>
+        <p:nvSpPr>
+          <p:cNvPr id="3" name="Footer Placeholder 2">
+            <a:extLst>
+              <a:ext uri="{FF2B5EF4-FFF2-40B4-BE49-F238E27FC236}">
+                <a16:creationId xmlns:a16="http://schemas.microsoft.com/office/drawing/2014/main" id="{31D70611-B689-F2D3-EC7A-E9C09F116747}"/>
+              </a:ext>
+            </a:extLst>
+          </p:cNvPr>
+          <p:cNvSpPr>
+            <a:spLocks noGrp="1"/>
+          </p:cNvSpPr>
+          <p:nvPr>
+            <p:ph type="ftr" sz="quarter" idx="11"/>
+          </p:nvPr>
+        </p:nvSpPr>
+        <p:spPr/>
+        <p:txBody>
+          <a:bodyPr/>
+          <a:lstStyle/>
+          <a:p>
+            <a:r>
+              <a:rPr lang="en-US"/>
+              <a:t>Modeling of nonlinear Systems with LSTMs | Sebastian Hirt</a:t>
+            </a:r>
+            <a:endParaRPr lang="de-DE" dirty="0"/>
+          </a:p>
+        </p:txBody>
+      </p:sp>
+      <p:sp>
+        <p:nvSpPr>
+          <p:cNvPr id="4" name="Slide Number Placeholder 3">
+            <a:extLst>
+              <a:ext uri="{FF2B5EF4-FFF2-40B4-BE49-F238E27FC236}">
+                <a16:creationId xmlns:a16="http://schemas.microsoft.com/office/drawing/2014/main" id="{72EF048D-E487-0918-E3D6-70DD63871490}"/>
+              </a:ext>
+            </a:extLst>
+          </p:cNvPr>
+          <p:cNvSpPr>
+            <a:spLocks noGrp="1"/>
+          </p:cNvSpPr>
+          <p:nvPr>
+            <p:ph type="sldNum" sz="quarter" idx="12"/>
+          </p:nvPr>
+        </p:nvSpPr>
+        <p:spPr/>
+        <p:txBody>
+          <a:bodyPr/>
+          <a:lstStyle/>
+          <a:p>
+            <a:fld id="{D949F9DF-37BD-4CD6-BF49-65BA579E1D7A}" type="slidenum">
+              <a:rPr lang="de-DE" smtClean="0"/>
+              <a:pPr/>
+              <a:t>18</a:t>
+            </a:fld>
+            <a:endParaRPr lang="de-DE"/>
+          </a:p>
+        </p:txBody>
+      </p:sp>
+      <p:sp>
+        <p:nvSpPr>
+          <p:cNvPr id="5" name="Title 4">
+            <a:extLst>
+              <a:ext uri="{FF2B5EF4-FFF2-40B4-BE49-F238E27FC236}">
+                <a16:creationId xmlns:a16="http://schemas.microsoft.com/office/drawing/2014/main" id="{45EE9607-A6C6-D200-B84D-465F5AABC4F5}"/>
+              </a:ext>
+            </a:extLst>
+          </p:cNvPr>
+          <p:cNvSpPr>
+            <a:spLocks noGrp="1"/>
+          </p:cNvSpPr>
+          <p:nvPr>
+            <p:ph type="title"/>
+          </p:nvPr>
+        </p:nvSpPr>
+        <p:spPr/>
+        <p:txBody>
+          <a:bodyPr/>
+          <a:lstStyle/>
+          <a:p>
+            <a:r>
+              <a:rPr lang="en-US" dirty="0"/>
+              <a:t>Drag</a:t>
+            </a:r>
+          </a:p>
+        </p:txBody>
+      </p:sp>
+      <p:sp>
+        <p:nvSpPr>
+          <p:cNvPr id="6" name="Text Placeholder 5">
+            <a:extLst>
+              <a:ext uri="{FF2B5EF4-FFF2-40B4-BE49-F238E27FC236}">
+                <a16:creationId xmlns:a16="http://schemas.microsoft.com/office/drawing/2014/main" id="{680BC9F9-2757-24C5-308C-2149987995FC}"/>
+              </a:ext>
+            </a:extLst>
+          </p:cNvPr>
+          <p:cNvSpPr>
+            <a:spLocks noGrp="1"/>
+          </p:cNvSpPr>
+          <p:nvPr>
+            <p:ph type="body" sz="quarter" idx="17"/>
+          </p:nvPr>
+        </p:nvSpPr>
+        <p:spPr/>
+        <p:txBody>
+          <a:bodyPr/>
+          <a:lstStyle/>
+          <a:p>
+            <a:r>
+              <a:rPr lang="en-US" dirty="0"/>
+              <a:t>Drag</a:t>
+            </a:r>
+          </a:p>
+          <a:p>
+            <a:r>
+              <a:rPr lang="en-US" dirty="0"/>
+              <a:t>Evaluate on new data!</a:t>
+            </a:r>
+          </a:p>
+          <a:p>
+            <a:pPr lvl="1"/>
+            <a:r>
+              <a:rPr lang="en-US" dirty="0"/>
+              <a:t>Need more similar data samples, variety of steps. </a:t>
+            </a:r>
+            <a:r>
+              <a:rPr lang="en-US" dirty="0">
+                <a:sym typeface="Wingdings" panose="05000000000000000000" pitchFamily="2" charset="2"/>
+              </a:rPr>
+              <a:t> Different step heights, 20 variations (12 train, 4 </a:t>
+            </a:r>
+            <a:r>
+              <a:rPr lang="en-US" dirty="0" err="1">
+                <a:sym typeface="Wingdings" panose="05000000000000000000" pitchFamily="2" charset="2"/>
+              </a:rPr>
+              <a:t>val</a:t>
+            </a:r>
+            <a:r>
+              <a:rPr lang="en-US" dirty="0">
+                <a:sym typeface="Wingdings" panose="05000000000000000000" pitchFamily="2" charset="2"/>
+              </a:rPr>
+              <a:t>, 4 test)</a:t>
+            </a:r>
+          </a:p>
+          <a:p>
+            <a:pPr lvl="1"/>
+            <a:r>
+              <a:rPr lang="en-US" dirty="0">
+                <a:sym typeface="Wingdings" panose="05000000000000000000" pitchFamily="2" charset="2"/>
+              </a:rPr>
+              <a:t>Normalization</a:t>
+            </a:r>
+            <a:r>
+              <a:rPr lang="en-US" b="1" dirty="0">
+                <a:sym typeface="Wingdings" panose="05000000000000000000" pitchFamily="2" charset="2"/>
+              </a:rPr>
+              <a:t> </a:t>
+            </a:r>
+            <a:r>
+              <a:rPr lang="en-US" dirty="0">
+                <a:sym typeface="Wingdings" panose="05000000000000000000" pitchFamily="2" charset="2"/>
+              </a:rPr>
+              <a:t>to values between 0 and 1 (Min-Max)</a:t>
+            </a:r>
+          </a:p>
+          <a:p>
+            <a:pPr lvl="1"/>
+            <a:r>
+              <a:rPr lang="en-US" dirty="0"/>
+              <a:t>Train again on </a:t>
+            </a:r>
+            <a:r>
+              <a:rPr lang="en-US" b="1" dirty="0"/>
+              <a:t>now multiple </a:t>
+            </a:r>
+            <a:r>
+              <a:rPr lang="en-US" dirty="0"/>
+              <a:t>different training samples</a:t>
+            </a:r>
+          </a:p>
+          <a:p>
+            <a:pPr lvl="1"/>
+            <a:r>
+              <a:rPr lang="en-US" dirty="0"/>
+              <a:t>Evaluate on the training data again, to make sure it can learn one sample of the multiple training samples well.</a:t>
+            </a:r>
+          </a:p>
+          <a:p>
+            <a:pPr lvl="1"/>
+            <a:r>
+              <a:rPr lang="en-US" dirty="0"/>
+              <a:t>Then evaluate on new data!</a:t>
+            </a:r>
+          </a:p>
+        </p:txBody>
+      </p:sp>
+    </p:spTree>
+    <p:extLst>
+      <p:ext uri="{BB962C8B-B14F-4D97-AF65-F5344CB8AC3E}">
+        <p14:creationId xmlns:p14="http://schemas.microsoft.com/office/powerpoint/2010/main" val="1936224446"/>
+      </p:ext>
+    </p:extLst>
+  </p:cSld>
+  <p:clrMapOvr>
+    <a:masterClrMapping/>
+  </p:clrMapOvr>
+</p:sld>
+</file>
+
+<file path=ppt/slides/slide19.xml><?xml version="1.0" encoding="utf-8"?>
+<p:sld xmlns:a="http://schemas.openxmlformats.org/drawingml/2006/main" xmlns:r="http://schemas.openxmlformats.org/officeDocument/2006/relationships" xmlns:p="http://schemas.openxmlformats.org/presentationml/2006/main">
+  <p:cSld>
+    <p:spTree>
+      <p:nvGrpSpPr>
+        <p:cNvPr id="1" name=""/>
+        <p:cNvGrpSpPr/>
+        <p:nvPr/>
+      </p:nvGrpSpPr>
+      <p:grpSpPr>
+        <a:xfrm>
+          <a:off x="0" y="0"/>
+          <a:ext cx="0" cy="0"/>
+          <a:chOff x="0" y="0"/>
+          <a:chExt cx="0" cy="0"/>
+        </a:xfrm>
+      </p:grpSpPr>
+      <p:sp>
+        <p:nvSpPr>
+          <p:cNvPr id="2" name="Date Placeholder 1">
+            <a:extLst>
+              <a:ext uri="{FF2B5EF4-FFF2-40B4-BE49-F238E27FC236}">
+                <a16:creationId xmlns:a16="http://schemas.microsoft.com/office/drawing/2014/main" id="{E653CDC2-E009-3556-5871-43AEB18817C7}"/>
+              </a:ext>
+            </a:extLst>
+          </p:cNvPr>
+          <p:cNvSpPr>
+            <a:spLocks noGrp="1"/>
+          </p:cNvSpPr>
+          <p:nvPr>
+            <p:ph type="dt" sz="half" idx="10"/>
+          </p:nvPr>
+        </p:nvSpPr>
+        <p:spPr/>
+        <p:txBody>
+          <a:bodyPr/>
+          <a:lstStyle/>
+          <a:p>
+            <a:fld id="{A2E8877F-2015-4290-957C-06EF82A52242}" type="datetime8">
+              <a:rPr lang="en-DE" smtClean="0"/>
+              <a:t>11/01/2022 18:15</a:t>
+            </a:fld>
+            <a:endParaRPr lang="de-DE" dirty="0"/>
+          </a:p>
+        </p:txBody>
+      </p:sp>
+      <p:sp>
+        <p:nvSpPr>
+          <p:cNvPr id="3" name="Footer Placeholder 2">
+            <a:extLst>
+              <a:ext uri="{FF2B5EF4-FFF2-40B4-BE49-F238E27FC236}">
+                <a16:creationId xmlns:a16="http://schemas.microsoft.com/office/drawing/2014/main" id="{31D70611-B689-F2D3-EC7A-E9C09F116747}"/>
+              </a:ext>
+            </a:extLst>
+          </p:cNvPr>
+          <p:cNvSpPr>
+            <a:spLocks noGrp="1"/>
+          </p:cNvSpPr>
+          <p:nvPr>
+            <p:ph type="ftr" sz="quarter" idx="11"/>
+          </p:nvPr>
+        </p:nvSpPr>
+        <p:spPr/>
+        <p:txBody>
+          <a:bodyPr/>
+          <a:lstStyle/>
+          <a:p>
+            <a:r>
+              <a:rPr lang="en-US"/>
+              <a:t>Modeling of nonlinear Systems with LSTMs | Sebastian Hirt</a:t>
+            </a:r>
+            <a:endParaRPr lang="de-DE" dirty="0"/>
+          </a:p>
+        </p:txBody>
+      </p:sp>
+      <p:sp>
+        <p:nvSpPr>
+          <p:cNvPr id="4" name="Slide Number Placeholder 3">
+            <a:extLst>
+              <a:ext uri="{FF2B5EF4-FFF2-40B4-BE49-F238E27FC236}">
+                <a16:creationId xmlns:a16="http://schemas.microsoft.com/office/drawing/2014/main" id="{72EF048D-E487-0918-E3D6-70DD63871490}"/>
+              </a:ext>
+            </a:extLst>
+          </p:cNvPr>
+          <p:cNvSpPr>
+            <a:spLocks noGrp="1"/>
+          </p:cNvSpPr>
+          <p:nvPr>
+            <p:ph type="sldNum" sz="quarter" idx="12"/>
+          </p:nvPr>
+        </p:nvSpPr>
+        <p:spPr/>
+        <p:txBody>
+          <a:bodyPr/>
+          <a:lstStyle/>
+          <a:p>
+            <a:fld id="{D949F9DF-37BD-4CD6-BF49-65BA579E1D7A}" type="slidenum">
+              <a:rPr lang="de-DE" smtClean="0"/>
+              <a:pPr/>
+              <a:t>19</a:t>
+            </a:fld>
+            <a:endParaRPr lang="de-DE"/>
+          </a:p>
+        </p:txBody>
+      </p:sp>
+      <p:sp>
+        <p:nvSpPr>
+          <p:cNvPr id="5" name="Title 4">
+            <a:extLst>
+              <a:ext uri="{FF2B5EF4-FFF2-40B4-BE49-F238E27FC236}">
+                <a16:creationId xmlns:a16="http://schemas.microsoft.com/office/drawing/2014/main" id="{45EE9607-A6C6-D200-B84D-465F5AABC4F5}"/>
+              </a:ext>
+            </a:extLst>
+          </p:cNvPr>
+          <p:cNvSpPr>
+            <a:spLocks noGrp="1"/>
+          </p:cNvSpPr>
+          <p:nvPr>
+            <p:ph type="title"/>
+          </p:nvPr>
+        </p:nvSpPr>
+        <p:spPr/>
+        <p:txBody>
+          <a:bodyPr/>
+          <a:lstStyle/>
+          <a:p>
+            <a:r>
+              <a:rPr lang="en-US" dirty="0"/>
+              <a:t>Drag</a:t>
+            </a:r>
+          </a:p>
+        </p:txBody>
+      </p:sp>
+      <p:sp>
+        <p:nvSpPr>
+          <p:cNvPr id="6" name="Text Placeholder 5">
+            <a:extLst>
+              <a:ext uri="{FF2B5EF4-FFF2-40B4-BE49-F238E27FC236}">
+                <a16:creationId xmlns:a16="http://schemas.microsoft.com/office/drawing/2014/main" id="{680BC9F9-2757-24C5-308C-2149987995FC}"/>
+              </a:ext>
+            </a:extLst>
+          </p:cNvPr>
+          <p:cNvSpPr>
+            <a:spLocks noGrp="1"/>
+          </p:cNvSpPr>
+          <p:nvPr>
+            <p:ph type="body" sz="quarter" idx="17"/>
+          </p:nvPr>
+        </p:nvSpPr>
+        <p:spPr/>
+        <p:txBody>
+          <a:bodyPr/>
+          <a:lstStyle/>
+          <a:p>
+            <a:r>
+              <a:rPr lang="en-US" dirty="0"/>
+              <a:t>Drag</a:t>
+            </a:r>
+          </a:p>
+          <a:p>
+            <a:r>
+              <a:rPr lang="en-US" dirty="0"/>
+              <a:t>Evaluate on new data!</a:t>
+            </a:r>
+          </a:p>
+          <a:p>
+            <a:pPr lvl="1"/>
+            <a:r>
+              <a:rPr lang="en-US" dirty="0"/>
+              <a:t>Need more similar data samples, variety of steps. </a:t>
+            </a:r>
+            <a:r>
+              <a:rPr lang="en-US" dirty="0">
+                <a:sym typeface="Wingdings" panose="05000000000000000000" pitchFamily="2" charset="2"/>
+              </a:rPr>
+              <a:t> Different step heights, 20 variations (12 train, 4 </a:t>
+            </a:r>
+            <a:r>
+              <a:rPr lang="en-US" dirty="0" err="1">
+                <a:sym typeface="Wingdings" panose="05000000000000000000" pitchFamily="2" charset="2"/>
+              </a:rPr>
+              <a:t>val</a:t>
+            </a:r>
+            <a:r>
+              <a:rPr lang="en-US" dirty="0">
+                <a:sym typeface="Wingdings" panose="05000000000000000000" pitchFamily="2" charset="2"/>
+              </a:rPr>
+              <a:t>, 4 test)</a:t>
+            </a:r>
+          </a:p>
+          <a:p>
+            <a:pPr lvl="1"/>
+            <a:r>
+              <a:rPr lang="en-US" b="1" dirty="0">
+                <a:sym typeface="Wingdings" panose="05000000000000000000" pitchFamily="2" charset="2"/>
+              </a:rPr>
+              <a:t>No Normalization </a:t>
+            </a:r>
+            <a:r>
+              <a:rPr lang="en-US" dirty="0">
+                <a:sym typeface="Wingdings" panose="05000000000000000000" pitchFamily="2" charset="2"/>
+              </a:rPr>
+              <a:t>to values between 0 and 1 (Min-Max)</a:t>
+            </a:r>
+          </a:p>
+          <a:p>
+            <a:pPr lvl="1"/>
+            <a:r>
+              <a:rPr lang="en-US" dirty="0"/>
+              <a:t>Train again on </a:t>
+            </a:r>
+            <a:r>
+              <a:rPr lang="en-US" b="1" dirty="0"/>
+              <a:t>now multiple </a:t>
+            </a:r>
+            <a:r>
+              <a:rPr lang="en-US" dirty="0"/>
+              <a:t>different training samples</a:t>
+            </a:r>
+          </a:p>
+          <a:p>
+            <a:pPr lvl="1"/>
+            <a:r>
+              <a:rPr lang="en-US" dirty="0"/>
+              <a:t>Evaluate on the training data again, to make sure it can learn one sample of the multiple training samples well.</a:t>
+            </a:r>
+          </a:p>
+          <a:p>
+            <a:pPr lvl="1"/>
+            <a:r>
+              <a:rPr lang="en-US" dirty="0"/>
+              <a:t>Then evaluate on new data!</a:t>
+            </a:r>
+          </a:p>
+        </p:txBody>
+      </p:sp>
+    </p:spTree>
+    <p:extLst>
+      <p:ext uri="{BB962C8B-B14F-4D97-AF65-F5344CB8AC3E}">
+        <p14:creationId xmlns:p14="http://schemas.microsoft.com/office/powerpoint/2010/main" val="3879249609"/>
       </p:ext>
     </p:extLst>
   </p:cSld>
@@ -10010,7 +11321,7 @@
           <a:p>
             <a:fld id="{C683496F-A479-4189-AF7A-49EC797A60BB}" type="datetime8">
               <a:rPr lang="en-DE" smtClean="0"/>
-              <a:t>24/10/2022 10:53</a:t>
+              <a:t>11/01/2022 16:19</a:t>
             </a:fld>
             <a:endParaRPr lang="de-DE" dirty="0"/>
           </a:p>
@@ -10079,6 +11390,710 @@
     <p:extLst>
       <p:ext uri="{BB962C8B-B14F-4D97-AF65-F5344CB8AC3E}">
         <p14:creationId xmlns:p14="http://schemas.microsoft.com/office/powerpoint/2010/main" val="1433872768"/>
+      </p:ext>
+    </p:extLst>
+  </p:cSld>
+  <p:clrMapOvr>
+    <a:masterClrMapping/>
+  </p:clrMapOvr>
+</p:sld>
+</file>
+
+<file path=ppt/slides/slide20.xml><?xml version="1.0" encoding="utf-8"?>
+<p:sld xmlns:a="http://schemas.openxmlformats.org/drawingml/2006/main" xmlns:r="http://schemas.openxmlformats.org/officeDocument/2006/relationships" xmlns:p="http://schemas.openxmlformats.org/presentationml/2006/main">
+  <p:cSld>
+    <p:spTree>
+      <p:nvGrpSpPr>
+        <p:cNvPr id="1" name=""/>
+        <p:cNvGrpSpPr/>
+        <p:nvPr/>
+      </p:nvGrpSpPr>
+      <p:grpSpPr>
+        <a:xfrm>
+          <a:off x="0" y="0"/>
+          <a:ext cx="0" cy="0"/>
+          <a:chOff x="0" y="0"/>
+          <a:chExt cx="0" cy="0"/>
+        </a:xfrm>
+      </p:grpSpPr>
+      <p:sp>
+        <p:nvSpPr>
+          <p:cNvPr id="2" name="Datumsplatzhalter 1">
+            <a:extLst>
+              <a:ext uri="{FF2B5EF4-FFF2-40B4-BE49-F238E27FC236}">
+                <a16:creationId xmlns:a16="http://schemas.microsoft.com/office/drawing/2014/main" id="{B446B528-9123-B86E-03BB-CC1AFE33FB8E}"/>
+              </a:ext>
+            </a:extLst>
+          </p:cNvPr>
+          <p:cNvSpPr>
+            <a:spLocks noGrp="1"/>
+          </p:cNvSpPr>
+          <p:nvPr>
+            <p:ph type="dt" sz="half" idx="10"/>
+          </p:nvPr>
+        </p:nvSpPr>
+        <p:spPr/>
+        <p:txBody>
+          <a:bodyPr/>
+          <a:lstStyle/>
+          <a:p>
+            <a:fld id="{A2E8877F-2015-4290-957C-06EF82A52242}" type="datetime8">
+              <a:rPr lang="en-DE" smtClean="0"/>
+              <a:t>11/01/2022 18:15</a:t>
+            </a:fld>
+            <a:endParaRPr lang="de-DE" dirty="0"/>
+          </a:p>
+        </p:txBody>
+      </p:sp>
+      <p:sp>
+        <p:nvSpPr>
+          <p:cNvPr id="3" name="Fußzeilenplatzhalter 2">
+            <a:extLst>
+              <a:ext uri="{FF2B5EF4-FFF2-40B4-BE49-F238E27FC236}">
+                <a16:creationId xmlns:a16="http://schemas.microsoft.com/office/drawing/2014/main" id="{9039D9D2-CC83-71B3-9FD1-8EE930EC3D74}"/>
+              </a:ext>
+            </a:extLst>
+          </p:cNvPr>
+          <p:cNvSpPr>
+            <a:spLocks noGrp="1"/>
+          </p:cNvSpPr>
+          <p:nvPr>
+            <p:ph type="ftr" sz="quarter" idx="11"/>
+          </p:nvPr>
+        </p:nvSpPr>
+        <p:spPr/>
+        <p:txBody>
+          <a:bodyPr/>
+          <a:lstStyle/>
+          <a:p>
+            <a:r>
+              <a:rPr lang="en-US"/>
+              <a:t>Modeling of nonlinear Systems with LSTMs | Sebastian Hirt</a:t>
+            </a:r>
+            <a:endParaRPr lang="de-DE" dirty="0"/>
+          </a:p>
+        </p:txBody>
+      </p:sp>
+      <p:sp>
+        <p:nvSpPr>
+          <p:cNvPr id="4" name="Foliennummernplatzhalter 3">
+            <a:extLst>
+              <a:ext uri="{FF2B5EF4-FFF2-40B4-BE49-F238E27FC236}">
+                <a16:creationId xmlns:a16="http://schemas.microsoft.com/office/drawing/2014/main" id="{6799EE1F-7DA2-681B-18DD-284EC80CE7C1}"/>
+              </a:ext>
+            </a:extLst>
+          </p:cNvPr>
+          <p:cNvSpPr>
+            <a:spLocks noGrp="1"/>
+          </p:cNvSpPr>
+          <p:nvPr>
+            <p:ph type="sldNum" sz="quarter" idx="12"/>
+          </p:nvPr>
+        </p:nvSpPr>
+        <p:spPr/>
+        <p:txBody>
+          <a:bodyPr/>
+          <a:lstStyle/>
+          <a:p>
+            <a:fld id="{D949F9DF-37BD-4CD6-BF49-65BA579E1D7A}" type="slidenum">
+              <a:rPr lang="de-DE" smtClean="0"/>
+              <a:pPr/>
+              <a:t>20</a:t>
+            </a:fld>
+            <a:endParaRPr lang="de-DE"/>
+          </a:p>
+        </p:txBody>
+      </p:sp>
+      <p:sp>
+        <p:nvSpPr>
+          <p:cNvPr id="5" name="Titel 4">
+            <a:extLst>
+              <a:ext uri="{FF2B5EF4-FFF2-40B4-BE49-F238E27FC236}">
+                <a16:creationId xmlns:a16="http://schemas.microsoft.com/office/drawing/2014/main" id="{1E6B2A5D-4314-E0F4-B6A1-769A8DB4F7C3}"/>
+              </a:ext>
+            </a:extLst>
+          </p:cNvPr>
+          <p:cNvSpPr>
+            <a:spLocks noGrp="1"/>
+          </p:cNvSpPr>
+          <p:nvPr>
+            <p:ph type="title"/>
+          </p:nvPr>
+        </p:nvSpPr>
+        <p:spPr/>
+        <p:txBody>
+          <a:bodyPr/>
+          <a:lstStyle/>
+          <a:p>
+            <a:r>
+              <a:rPr lang="en-US" dirty="0"/>
+              <a:t>Drag no norm – Multiple Samples</a:t>
+            </a:r>
+          </a:p>
+        </p:txBody>
+      </p:sp>
+      <p:sp>
+        <p:nvSpPr>
+          <p:cNvPr id="6" name="Textplatzhalter 5">
+            <a:extLst>
+              <a:ext uri="{FF2B5EF4-FFF2-40B4-BE49-F238E27FC236}">
+                <a16:creationId xmlns:a16="http://schemas.microsoft.com/office/drawing/2014/main" id="{202B2346-17ED-3E6E-A606-65763BDC6E02}"/>
+              </a:ext>
+            </a:extLst>
+          </p:cNvPr>
+          <p:cNvSpPr>
+            <a:spLocks noGrp="1"/>
+          </p:cNvSpPr>
+          <p:nvPr>
+            <p:ph type="body" sz="quarter" idx="17"/>
+          </p:nvPr>
+        </p:nvSpPr>
+        <p:spPr/>
+        <p:txBody>
+          <a:bodyPr/>
+          <a:lstStyle/>
+          <a:p>
+            <a:r>
+              <a:rPr lang="en-US" dirty="0"/>
+              <a:t>Prediction on </a:t>
+            </a:r>
+            <a:r>
+              <a:rPr lang="en-US" dirty="0" err="1"/>
+              <a:t>Trainingset</a:t>
+            </a:r>
+            <a:endParaRPr lang="en-US" dirty="0"/>
+          </a:p>
+        </p:txBody>
+      </p:sp>
+      <p:pic>
+        <p:nvPicPr>
+          <p:cNvPr id="9" name="Grafik 8">
+            <a:extLst>
+              <a:ext uri="{FF2B5EF4-FFF2-40B4-BE49-F238E27FC236}">
+                <a16:creationId xmlns:a16="http://schemas.microsoft.com/office/drawing/2014/main" id="{EAD48344-2E8F-028F-1C03-3CC75DEC15E0}"/>
+              </a:ext>
+            </a:extLst>
+          </p:cNvPr>
+          <p:cNvPicPr>
+            <a:picLocks noChangeAspect="1"/>
+          </p:cNvPicPr>
+          <p:nvPr/>
+        </p:nvPicPr>
+        <p:blipFill>
+          <a:blip r:embed="rId2">
+            <a:extLst>
+              <a:ext uri="{28A0092B-C50C-407E-A947-70E740481C1C}">
+                <a14:useLocalDpi xmlns:a14="http://schemas.microsoft.com/office/drawing/2010/main" val="0"/>
+              </a:ext>
+            </a:extLst>
+          </a:blip>
+          <a:stretch>
+            <a:fillRect/>
+          </a:stretch>
+        </p:blipFill>
+        <p:spPr>
+          <a:xfrm>
+            <a:off x="4101402" y="1362682"/>
+            <a:ext cx="6810755" cy="5108066"/>
+          </a:xfrm>
+          <a:prstGeom prst="rect">
+            <a:avLst/>
+          </a:prstGeom>
+        </p:spPr>
+      </p:pic>
+    </p:spTree>
+    <p:extLst>
+      <p:ext uri="{BB962C8B-B14F-4D97-AF65-F5344CB8AC3E}">
+        <p14:creationId xmlns:p14="http://schemas.microsoft.com/office/powerpoint/2010/main" val="2614790394"/>
+      </p:ext>
+    </p:extLst>
+  </p:cSld>
+  <p:clrMapOvr>
+    <a:masterClrMapping/>
+  </p:clrMapOvr>
+</p:sld>
+</file>
+
+<file path=ppt/slides/slide21.xml><?xml version="1.0" encoding="utf-8"?>
+<p:sld xmlns:a="http://schemas.openxmlformats.org/drawingml/2006/main" xmlns:r="http://schemas.openxmlformats.org/officeDocument/2006/relationships" xmlns:p="http://schemas.openxmlformats.org/presentationml/2006/main">
+  <p:cSld>
+    <p:spTree>
+      <p:nvGrpSpPr>
+        <p:cNvPr id="1" name=""/>
+        <p:cNvGrpSpPr/>
+        <p:nvPr/>
+      </p:nvGrpSpPr>
+      <p:grpSpPr>
+        <a:xfrm>
+          <a:off x="0" y="0"/>
+          <a:ext cx="0" cy="0"/>
+          <a:chOff x="0" y="0"/>
+          <a:chExt cx="0" cy="0"/>
+        </a:xfrm>
+      </p:grpSpPr>
+      <p:sp>
+        <p:nvSpPr>
+          <p:cNvPr id="2" name="Datumsplatzhalter 1">
+            <a:extLst>
+              <a:ext uri="{FF2B5EF4-FFF2-40B4-BE49-F238E27FC236}">
+                <a16:creationId xmlns:a16="http://schemas.microsoft.com/office/drawing/2014/main" id="{B446B528-9123-B86E-03BB-CC1AFE33FB8E}"/>
+              </a:ext>
+            </a:extLst>
+          </p:cNvPr>
+          <p:cNvSpPr>
+            <a:spLocks noGrp="1"/>
+          </p:cNvSpPr>
+          <p:nvPr>
+            <p:ph type="dt" sz="half" idx="10"/>
+          </p:nvPr>
+        </p:nvSpPr>
+        <p:spPr/>
+        <p:txBody>
+          <a:bodyPr/>
+          <a:lstStyle/>
+          <a:p>
+            <a:fld id="{A2E8877F-2015-4290-957C-06EF82A52242}" type="datetime8">
+              <a:rPr lang="en-DE" smtClean="0"/>
+              <a:t>11/01/2022 18:15</a:t>
+            </a:fld>
+            <a:endParaRPr lang="de-DE" dirty="0"/>
+          </a:p>
+        </p:txBody>
+      </p:sp>
+      <p:sp>
+        <p:nvSpPr>
+          <p:cNvPr id="3" name="Fußzeilenplatzhalter 2">
+            <a:extLst>
+              <a:ext uri="{FF2B5EF4-FFF2-40B4-BE49-F238E27FC236}">
+                <a16:creationId xmlns:a16="http://schemas.microsoft.com/office/drawing/2014/main" id="{9039D9D2-CC83-71B3-9FD1-8EE930EC3D74}"/>
+              </a:ext>
+            </a:extLst>
+          </p:cNvPr>
+          <p:cNvSpPr>
+            <a:spLocks noGrp="1"/>
+          </p:cNvSpPr>
+          <p:nvPr>
+            <p:ph type="ftr" sz="quarter" idx="11"/>
+          </p:nvPr>
+        </p:nvSpPr>
+        <p:spPr/>
+        <p:txBody>
+          <a:bodyPr/>
+          <a:lstStyle/>
+          <a:p>
+            <a:r>
+              <a:rPr lang="en-US"/>
+              <a:t>Modeling of nonlinear Systems with LSTMs | Sebastian Hirt</a:t>
+            </a:r>
+            <a:endParaRPr lang="de-DE" dirty="0"/>
+          </a:p>
+        </p:txBody>
+      </p:sp>
+      <p:sp>
+        <p:nvSpPr>
+          <p:cNvPr id="4" name="Foliennummernplatzhalter 3">
+            <a:extLst>
+              <a:ext uri="{FF2B5EF4-FFF2-40B4-BE49-F238E27FC236}">
+                <a16:creationId xmlns:a16="http://schemas.microsoft.com/office/drawing/2014/main" id="{6799EE1F-7DA2-681B-18DD-284EC80CE7C1}"/>
+              </a:ext>
+            </a:extLst>
+          </p:cNvPr>
+          <p:cNvSpPr>
+            <a:spLocks noGrp="1"/>
+          </p:cNvSpPr>
+          <p:nvPr>
+            <p:ph type="sldNum" sz="quarter" idx="12"/>
+          </p:nvPr>
+        </p:nvSpPr>
+        <p:spPr/>
+        <p:txBody>
+          <a:bodyPr/>
+          <a:lstStyle/>
+          <a:p>
+            <a:fld id="{D949F9DF-37BD-4CD6-BF49-65BA579E1D7A}" type="slidenum">
+              <a:rPr lang="de-DE" smtClean="0"/>
+              <a:pPr/>
+              <a:t>21</a:t>
+            </a:fld>
+            <a:endParaRPr lang="de-DE"/>
+          </a:p>
+        </p:txBody>
+      </p:sp>
+      <p:sp>
+        <p:nvSpPr>
+          <p:cNvPr id="5" name="Titel 4">
+            <a:extLst>
+              <a:ext uri="{FF2B5EF4-FFF2-40B4-BE49-F238E27FC236}">
+                <a16:creationId xmlns:a16="http://schemas.microsoft.com/office/drawing/2014/main" id="{1E6B2A5D-4314-E0F4-B6A1-769A8DB4F7C3}"/>
+              </a:ext>
+            </a:extLst>
+          </p:cNvPr>
+          <p:cNvSpPr>
+            <a:spLocks noGrp="1"/>
+          </p:cNvSpPr>
+          <p:nvPr>
+            <p:ph type="title"/>
+          </p:nvPr>
+        </p:nvSpPr>
+        <p:spPr/>
+        <p:txBody>
+          <a:bodyPr/>
+          <a:lstStyle/>
+          <a:p>
+            <a:r>
+              <a:rPr lang="en-US" dirty="0"/>
+              <a:t>Drag no norm – Multiple Samples</a:t>
+            </a:r>
+          </a:p>
+        </p:txBody>
+      </p:sp>
+      <p:sp>
+        <p:nvSpPr>
+          <p:cNvPr id="6" name="Textplatzhalter 5">
+            <a:extLst>
+              <a:ext uri="{FF2B5EF4-FFF2-40B4-BE49-F238E27FC236}">
+                <a16:creationId xmlns:a16="http://schemas.microsoft.com/office/drawing/2014/main" id="{202B2346-17ED-3E6E-A606-65763BDC6E02}"/>
+              </a:ext>
+            </a:extLst>
+          </p:cNvPr>
+          <p:cNvSpPr>
+            <a:spLocks noGrp="1"/>
+          </p:cNvSpPr>
+          <p:nvPr>
+            <p:ph type="body" sz="quarter" idx="17"/>
+          </p:nvPr>
+        </p:nvSpPr>
+        <p:spPr/>
+        <p:txBody>
+          <a:bodyPr/>
+          <a:lstStyle/>
+          <a:p>
+            <a:r>
+              <a:rPr lang="en-US" dirty="0"/>
+              <a:t>Prediction on Validation Set</a:t>
+            </a:r>
+          </a:p>
+        </p:txBody>
+      </p:sp>
+      <p:pic>
+        <p:nvPicPr>
+          <p:cNvPr id="8" name="Grafik 7">
+            <a:extLst>
+              <a:ext uri="{FF2B5EF4-FFF2-40B4-BE49-F238E27FC236}">
+                <a16:creationId xmlns:a16="http://schemas.microsoft.com/office/drawing/2014/main" id="{0FE016CC-4B36-EFA8-A8E3-66D6AB325EB5}"/>
+              </a:ext>
+            </a:extLst>
+          </p:cNvPr>
+          <p:cNvPicPr>
+            <a:picLocks noChangeAspect="1"/>
+          </p:cNvPicPr>
+          <p:nvPr/>
+        </p:nvPicPr>
+        <p:blipFill>
+          <a:blip r:embed="rId2">
+            <a:extLst>
+              <a:ext uri="{28A0092B-C50C-407E-A947-70E740481C1C}">
+                <a14:useLocalDpi xmlns:a14="http://schemas.microsoft.com/office/drawing/2010/main" val="0"/>
+              </a:ext>
+            </a:extLst>
+          </a:blip>
+          <a:stretch>
+            <a:fillRect/>
+          </a:stretch>
+        </p:blipFill>
+        <p:spPr>
+          <a:xfrm>
+            <a:off x="4016001" y="1263366"/>
+            <a:ext cx="6920724" cy="5190543"/>
+          </a:xfrm>
+          <a:prstGeom prst="rect">
+            <a:avLst/>
+          </a:prstGeom>
+        </p:spPr>
+      </p:pic>
+    </p:spTree>
+    <p:extLst>
+      <p:ext uri="{BB962C8B-B14F-4D97-AF65-F5344CB8AC3E}">
+        <p14:creationId xmlns:p14="http://schemas.microsoft.com/office/powerpoint/2010/main" val="4078750322"/>
+      </p:ext>
+    </p:extLst>
+  </p:cSld>
+  <p:clrMapOvr>
+    <a:masterClrMapping/>
+  </p:clrMapOvr>
+</p:sld>
+</file>
+
+<file path=ppt/slides/slide22.xml><?xml version="1.0" encoding="utf-8"?>
+<p:sld xmlns:a="http://schemas.openxmlformats.org/drawingml/2006/main" xmlns:r="http://schemas.openxmlformats.org/officeDocument/2006/relationships" xmlns:p="http://schemas.openxmlformats.org/presentationml/2006/main">
+  <p:cSld>
+    <p:spTree>
+      <p:nvGrpSpPr>
+        <p:cNvPr id="1" name=""/>
+        <p:cNvGrpSpPr/>
+        <p:nvPr/>
+      </p:nvGrpSpPr>
+      <p:grpSpPr>
+        <a:xfrm>
+          <a:off x="0" y="0"/>
+          <a:ext cx="0" cy="0"/>
+          <a:chOff x="0" y="0"/>
+          <a:chExt cx="0" cy="0"/>
+        </a:xfrm>
+      </p:grpSpPr>
+      <p:sp>
+        <p:nvSpPr>
+          <p:cNvPr id="2" name="Datumsplatzhalter 1">
+            <a:extLst>
+              <a:ext uri="{FF2B5EF4-FFF2-40B4-BE49-F238E27FC236}">
+                <a16:creationId xmlns:a16="http://schemas.microsoft.com/office/drawing/2014/main" id="{B446B528-9123-B86E-03BB-CC1AFE33FB8E}"/>
+              </a:ext>
+            </a:extLst>
+          </p:cNvPr>
+          <p:cNvSpPr>
+            <a:spLocks noGrp="1"/>
+          </p:cNvSpPr>
+          <p:nvPr>
+            <p:ph type="dt" sz="half" idx="10"/>
+          </p:nvPr>
+        </p:nvSpPr>
+        <p:spPr/>
+        <p:txBody>
+          <a:bodyPr/>
+          <a:lstStyle/>
+          <a:p>
+            <a:fld id="{A2E8877F-2015-4290-957C-06EF82A52242}" type="datetime8">
+              <a:rPr lang="en-DE" smtClean="0"/>
+              <a:t>11/01/2022 18:15</a:t>
+            </a:fld>
+            <a:endParaRPr lang="de-DE" dirty="0"/>
+          </a:p>
+        </p:txBody>
+      </p:sp>
+      <p:sp>
+        <p:nvSpPr>
+          <p:cNvPr id="3" name="Fußzeilenplatzhalter 2">
+            <a:extLst>
+              <a:ext uri="{FF2B5EF4-FFF2-40B4-BE49-F238E27FC236}">
+                <a16:creationId xmlns:a16="http://schemas.microsoft.com/office/drawing/2014/main" id="{9039D9D2-CC83-71B3-9FD1-8EE930EC3D74}"/>
+              </a:ext>
+            </a:extLst>
+          </p:cNvPr>
+          <p:cNvSpPr>
+            <a:spLocks noGrp="1"/>
+          </p:cNvSpPr>
+          <p:nvPr>
+            <p:ph type="ftr" sz="quarter" idx="11"/>
+          </p:nvPr>
+        </p:nvSpPr>
+        <p:spPr/>
+        <p:txBody>
+          <a:bodyPr/>
+          <a:lstStyle/>
+          <a:p>
+            <a:r>
+              <a:rPr lang="en-US"/>
+              <a:t>Modeling of nonlinear Systems with LSTMs | Sebastian Hirt</a:t>
+            </a:r>
+            <a:endParaRPr lang="de-DE" dirty="0"/>
+          </a:p>
+        </p:txBody>
+      </p:sp>
+      <p:sp>
+        <p:nvSpPr>
+          <p:cNvPr id="4" name="Foliennummernplatzhalter 3">
+            <a:extLst>
+              <a:ext uri="{FF2B5EF4-FFF2-40B4-BE49-F238E27FC236}">
+                <a16:creationId xmlns:a16="http://schemas.microsoft.com/office/drawing/2014/main" id="{6799EE1F-7DA2-681B-18DD-284EC80CE7C1}"/>
+              </a:ext>
+            </a:extLst>
+          </p:cNvPr>
+          <p:cNvSpPr>
+            <a:spLocks noGrp="1"/>
+          </p:cNvSpPr>
+          <p:nvPr>
+            <p:ph type="sldNum" sz="quarter" idx="12"/>
+          </p:nvPr>
+        </p:nvSpPr>
+        <p:spPr/>
+        <p:txBody>
+          <a:bodyPr/>
+          <a:lstStyle/>
+          <a:p>
+            <a:fld id="{D949F9DF-37BD-4CD6-BF49-65BA579E1D7A}" type="slidenum">
+              <a:rPr lang="de-DE" smtClean="0"/>
+              <a:pPr/>
+              <a:t>22</a:t>
+            </a:fld>
+            <a:endParaRPr lang="de-DE"/>
+          </a:p>
+        </p:txBody>
+      </p:sp>
+      <p:sp>
+        <p:nvSpPr>
+          <p:cNvPr id="5" name="Titel 4">
+            <a:extLst>
+              <a:ext uri="{FF2B5EF4-FFF2-40B4-BE49-F238E27FC236}">
+                <a16:creationId xmlns:a16="http://schemas.microsoft.com/office/drawing/2014/main" id="{1E6B2A5D-4314-E0F4-B6A1-769A8DB4F7C3}"/>
+              </a:ext>
+            </a:extLst>
+          </p:cNvPr>
+          <p:cNvSpPr>
+            <a:spLocks noGrp="1"/>
+          </p:cNvSpPr>
+          <p:nvPr>
+            <p:ph type="title"/>
+          </p:nvPr>
+        </p:nvSpPr>
+        <p:spPr/>
+        <p:txBody>
+          <a:bodyPr/>
+          <a:lstStyle/>
+          <a:p>
+            <a:r>
+              <a:rPr lang="en-US" dirty="0"/>
+              <a:t>Drag no norm – Multiple Samples</a:t>
+            </a:r>
+          </a:p>
+        </p:txBody>
+      </p:sp>
+      <p:sp>
+        <p:nvSpPr>
+          <p:cNvPr id="6" name="Textplatzhalter 5">
+            <a:extLst>
+              <a:ext uri="{FF2B5EF4-FFF2-40B4-BE49-F238E27FC236}">
+                <a16:creationId xmlns:a16="http://schemas.microsoft.com/office/drawing/2014/main" id="{202B2346-17ED-3E6E-A606-65763BDC6E02}"/>
+              </a:ext>
+            </a:extLst>
+          </p:cNvPr>
+          <p:cNvSpPr>
+            <a:spLocks noGrp="1"/>
+          </p:cNvSpPr>
+          <p:nvPr>
+            <p:ph type="body" sz="quarter" idx="17"/>
+          </p:nvPr>
+        </p:nvSpPr>
+        <p:spPr/>
+        <p:txBody>
+          <a:bodyPr/>
+          <a:lstStyle/>
+          <a:p>
+            <a:r>
+              <a:rPr lang="en-US" dirty="0"/>
+              <a:t>Prediction on Test Set</a:t>
+            </a:r>
+          </a:p>
+        </p:txBody>
+      </p:sp>
+      <p:pic>
+        <p:nvPicPr>
+          <p:cNvPr id="8" name="Grafik 7">
+            <a:extLst>
+              <a:ext uri="{FF2B5EF4-FFF2-40B4-BE49-F238E27FC236}">
+                <a16:creationId xmlns:a16="http://schemas.microsoft.com/office/drawing/2014/main" id="{05185672-FDEA-2EBA-F566-A245E90D6CFB}"/>
+              </a:ext>
+            </a:extLst>
+          </p:cNvPr>
+          <p:cNvPicPr>
+            <a:picLocks noChangeAspect="1"/>
+          </p:cNvPicPr>
+          <p:nvPr/>
+        </p:nvPicPr>
+        <p:blipFill>
+          <a:blip r:embed="rId2">
+            <a:extLst>
+              <a:ext uri="{28A0092B-C50C-407E-A947-70E740481C1C}">
+                <a14:useLocalDpi xmlns:a14="http://schemas.microsoft.com/office/drawing/2010/main" val="0"/>
+              </a:ext>
+            </a:extLst>
+          </a:blip>
+          <a:stretch>
+            <a:fillRect/>
+          </a:stretch>
+        </p:blipFill>
+        <p:spPr>
+          <a:xfrm>
+            <a:off x="4016341" y="1263494"/>
+            <a:ext cx="6920384" cy="5190288"/>
+          </a:xfrm>
+          <a:prstGeom prst="rect">
+            <a:avLst/>
+          </a:prstGeom>
+        </p:spPr>
+      </p:pic>
+    </p:spTree>
+    <p:extLst>
+      <p:ext uri="{BB962C8B-B14F-4D97-AF65-F5344CB8AC3E}">
+        <p14:creationId xmlns:p14="http://schemas.microsoft.com/office/powerpoint/2010/main" val="1818948321"/>
+      </p:ext>
+    </p:extLst>
+  </p:cSld>
+  <p:clrMapOvr>
+    <a:masterClrMapping/>
+  </p:clrMapOvr>
+</p:sld>
+</file>
+
+<file path=ppt/slides/slide23.xml><?xml version="1.0" encoding="utf-8"?>
+<p:sld xmlns:a="http://schemas.openxmlformats.org/drawingml/2006/main" xmlns:r="http://schemas.openxmlformats.org/officeDocument/2006/relationships" xmlns:p="http://schemas.openxmlformats.org/presentationml/2006/main">
+  <p:cSld>
+    <p:spTree>
+      <p:nvGrpSpPr>
+        <p:cNvPr id="1" name=""/>
+        <p:cNvGrpSpPr/>
+        <p:nvPr/>
+      </p:nvGrpSpPr>
+      <p:grpSpPr>
+        <a:xfrm>
+          <a:off x="0" y="0"/>
+          <a:ext cx="0" cy="0"/>
+          <a:chOff x="0" y="0"/>
+          <a:chExt cx="0" cy="0"/>
+        </a:xfrm>
+      </p:grpSpPr>
+      <p:sp>
+        <p:nvSpPr>
+          <p:cNvPr id="2" name="Textplatzhalter 1">
+            <a:extLst>
+              <a:ext uri="{FF2B5EF4-FFF2-40B4-BE49-F238E27FC236}">
+                <a16:creationId xmlns:a16="http://schemas.microsoft.com/office/drawing/2014/main" id="{D671D917-0E7D-044A-A553-3607B76DD26D}"/>
+              </a:ext>
+            </a:extLst>
+          </p:cNvPr>
+          <p:cNvSpPr>
+            <a:spLocks noGrp="1"/>
+          </p:cNvSpPr>
+          <p:nvPr>
+            <p:ph type="body" sz="quarter" idx="13"/>
+          </p:nvPr>
+        </p:nvSpPr>
+        <p:spPr>
+          <a:xfrm>
+            <a:off x="518317" y="2647985"/>
+            <a:ext cx="11157745" cy="1562031"/>
+          </a:xfrm>
+        </p:spPr>
+        <p:txBody>
+          <a:bodyPr/>
+          <a:lstStyle/>
+          <a:p>
+            <a:r>
+              <a:rPr lang="de-DE" dirty="0"/>
+              <a:t>Vielen Dank</a:t>
+            </a:r>
+          </a:p>
+          <a:p>
+            <a:r>
+              <a:rPr lang="de-DE" dirty="0"/>
+              <a:t>für Ihre Aufmerksamkeit!</a:t>
+            </a:r>
+          </a:p>
+        </p:txBody>
+      </p:sp>
+    </p:spTree>
+    <p:extLst>
+      <p:ext uri="{BB962C8B-B14F-4D97-AF65-F5344CB8AC3E}">
+        <p14:creationId xmlns:p14="http://schemas.microsoft.com/office/powerpoint/2010/main" val="1185948968"/>
       </p:ext>
     </p:extLst>
   </p:cSld>
@@ -10128,7 +12143,7 @@
           <a:p>
             <a:fld id="{A2E8877F-2015-4290-957C-06EF82A52242}" type="datetime8">
               <a:rPr lang="en-DE" smtClean="0"/>
-              <a:t>24/10/2022 10:53</a:t>
+              <a:t>11/01/2022 16:19</a:t>
             </a:fld>
             <a:endParaRPr lang="de-DE" dirty="0"/>
           </a:p>
@@ -10722,7 +12737,7 @@
           <a:p>
             <a:fld id="{A2E8877F-2015-4290-957C-06EF82A52242}" type="datetime8">
               <a:rPr lang="en-DE" smtClean="0"/>
-              <a:t>24/10/2022 10:53</a:t>
+              <a:t>11/01/2022 16:19</a:t>
             </a:fld>
             <a:endParaRPr lang="de-DE" dirty="0"/>
           </a:p>
@@ -11526,7 +13541,7 @@
           <a:p>
             <a:fld id="{C683496F-A479-4189-AF7A-49EC797A60BB}" type="datetime8">
               <a:rPr lang="en-DE" smtClean="0"/>
-              <a:t>24/10/2022 10:53</a:t>
+              <a:t>11/01/2022 16:19</a:t>
             </a:fld>
             <a:endParaRPr lang="de-DE" dirty="0"/>
           </a:p>
@@ -11680,7 +13695,7 @@
           <a:p>
             <a:fld id="{A2E8877F-2015-4290-957C-06EF82A52242}" type="datetime8">
               <a:rPr lang="en-DE" smtClean="0"/>
-              <a:t>24/10/2022 10:53</a:t>
+              <a:t>11/01/2022 16:19</a:t>
             </a:fld>
             <a:endParaRPr lang="de-DE" dirty="0"/>
           </a:p>
@@ -11851,7 +13866,7 @@
           <a:p>
             <a:fld id="{A2E8877F-2015-4290-957C-06EF82A52242}" type="datetime8">
               <a:rPr lang="en-DE" smtClean="0"/>
-              <a:t>24/10/2022 10:53</a:t>
+              <a:t>11/01/2022 16:19</a:t>
             </a:fld>
             <a:endParaRPr lang="de-DE" dirty="0"/>
           </a:p>
@@ -12096,7 +14111,7 @@
           <a:p>
             <a:fld id="{C683496F-A479-4189-AF7A-49EC797A60BB}" type="datetime8">
               <a:rPr lang="en-DE" smtClean="0"/>
-              <a:t>24/10/2022 10:53</a:t>
+              <a:t>11/01/2022 16:19</a:t>
             </a:fld>
             <a:endParaRPr lang="de-DE" dirty="0"/>
           </a:p>
@@ -12214,7 +14229,7 @@
           <a:p>
             <a:fld id="{A2E8877F-2015-4290-957C-06EF82A52242}" type="datetime8">
               <a:rPr lang="en-DE" smtClean="0"/>
-              <a:t>24/10/2022 10:53</a:t>
+              <a:t>11/01/2022 16:19</a:t>
             </a:fld>
             <a:endParaRPr lang="de-DE" dirty="0"/>
           </a:p>
@@ -13367,12 +15382,6 @@
 </file>
 
 <file path=customXml/item1.xml><?xml version="1.0" encoding="utf-8"?>
-<p:properties xmlns:p="http://schemas.microsoft.com/office/2006/metadata/properties" xmlns:xsi="http://www.w3.org/2001/XMLSchema-instance" xmlns:pc="http://schemas.microsoft.com/office/infopath/2007/PartnerControls">
-  <documentManagement/>
-</p:properties>
-</file>
-
-<file path=customXml/item2.xml><?xml version="1.0" encoding="utf-8"?>
 <ct:contentTypeSchema xmlns:ct="http://schemas.microsoft.com/office/2006/metadata/contentType" xmlns:ma="http://schemas.microsoft.com/office/2006/metadata/properties/metaAttributes" ct:_="" ma:_="" ma:contentTypeName="Dokument" ma:contentTypeID="0x010100B7C64748B88E4F4A81E78C320064AA18" ma:contentTypeVersion="13" ma:contentTypeDescription="Ein neues Dokument erstellen." ma:contentTypeScope="" ma:versionID="7d7fe78eff81fbacf66dc0ff6aeec5a3">
   <xsd:schema xmlns:xsd="http://www.w3.org/2001/XMLSchema" xmlns:xs="http://www.w3.org/2001/XMLSchema" xmlns:p="http://schemas.microsoft.com/office/2006/metadata/properties" xmlns:ns2="e1a9e197-d112-4abb-aa0c-4ed035d690a3" xmlns:ns3="5d4c14f1-5e26-4315-944b-e10ebb29e5be" targetNamespace="http://schemas.microsoft.com/office/2006/metadata/properties" ma:root="true" ma:fieldsID="798e591f6d3205a21a5c8f3fdff7cfef" ns2:_="" ns3:_="">
     <xsd:import namespace="e1a9e197-d112-4abb-aa0c-4ed035d690a3"/>
@@ -13595,6 +15604,12 @@
 </ct:contentTypeSchema>
 </file>
 
+<file path=customXml/item2.xml><?xml version="1.0" encoding="utf-8"?>
+<p:properties xmlns:p="http://schemas.microsoft.com/office/2006/metadata/properties" xmlns:xsi="http://www.w3.org/2001/XMLSchema-instance" xmlns:pc="http://schemas.microsoft.com/office/infopath/2007/PartnerControls">
+  <documentManagement/>
+</p:properties>
+</file>
+
 <file path=customXml/item3.xml><?xml version="1.0" encoding="utf-8"?>
 <?mso-contentType ?>
 <FormTemplates xmlns="http://schemas.microsoft.com/sharepoint/v3/contenttype/forms">
@@ -13605,23 +15620,6 @@
 </file>
 
 <file path=customXml/itemProps1.xml><?xml version="1.0" encoding="utf-8"?>
-<ds:datastoreItem xmlns:ds="http://schemas.openxmlformats.org/officeDocument/2006/customXml" ds:itemID="{CC1A7FE3-81F7-4596-A188-3EE8D4188E1F}">
-  <ds:schemaRefs>
-    <ds:schemaRef ds:uri="http://schemas.microsoft.com/office/2006/documentManagement/types"/>
-    <ds:schemaRef ds:uri="http://www.w3.org/XML/1998/namespace"/>
-    <ds:schemaRef ds:uri="http://purl.org/dc/terms/"/>
-    <ds:schemaRef ds:uri="http://schemas.openxmlformats.org/package/2006/metadata/core-properties"/>
-    <ds:schemaRef ds:uri="e1a9e197-d112-4abb-aa0c-4ed035d690a3"/>
-    <ds:schemaRef ds:uri="http://purl.org/dc/elements/1.1/"/>
-    <ds:schemaRef ds:uri="http://schemas.microsoft.com/office/infopath/2007/PartnerControls"/>
-    <ds:schemaRef ds:uri="5d4c14f1-5e26-4315-944b-e10ebb29e5be"/>
-    <ds:schemaRef ds:uri="http://schemas.microsoft.com/office/2006/metadata/properties"/>
-    <ds:schemaRef ds:uri="http://purl.org/dc/dcmitype/"/>
-  </ds:schemaRefs>
-</ds:datastoreItem>
-</file>
-
-<file path=customXml/itemProps2.xml><?xml version="1.0" encoding="utf-8"?>
 <ds:datastoreItem xmlns:ds="http://schemas.openxmlformats.org/officeDocument/2006/customXml" ds:itemID="{CDFBE955-EBBF-441B-94AE-DC551CE16727}">
   <ds:schemaRefs>
     <ds:schemaRef ds:uri="http://schemas.microsoft.com/office/2006/metadata/contentType"/>
@@ -13640,6 +15638,23 @@
 </ds:datastoreItem>
 </file>
 
+<file path=customXml/itemProps2.xml><?xml version="1.0" encoding="utf-8"?>
+<ds:datastoreItem xmlns:ds="http://schemas.openxmlformats.org/officeDocument/2006/customXml" ds:itemID="{CC1A7FE3-81F7-4596-A188-3EE8D4188E1F}">
+  <ds:schemaRefs>
+    <ds:schemaRef ds:uri="http://schemas.microsoft.com/office/2006/documentManagement/types"/>
+    <ds:schemaRef ds:uri="http://www.w3.org/XML/1998/namespace"/>
+    <ds:schemaRef ds:uri="http://purl.org/dc/terms/"/>
+    <ds:schemaRef ds:uri="http://schemas.openxmlformats.org/package/2006/metadata/core-properties"/>
+    <ds:schemaRef ds:uri="e1a9e197-d112-4abb-aa0c-4ed035d690a3"/>
+    <ds:schemaRef ds:uri="http://purl.org/dc/elements/1.1/"/>
+    <ds:schemaRef ds:uri="http://schemas.microsoft.com/office/infopath/2007/PartnerControls"/>
+    <ds:schemaRef ds:uri="5d4c14f1-5e26-4315-944b-e10ebb29e5be"/>
+    <ds:schemaRef ds:uri="http://schemas.microsoft.com/office/2006/metadata/properties"/>
+    <ds:schemaRef ds:uri="http://purl.org/dc/dcmitype/"/>
+  </ds:schemaRefs>
+</ds:datastoreItem>
+</file>
+
 <file path=customXml/itemProps3.xml><?xml version="1.0" encoding="utf-8"?>
 <ds:datastoreItem xmlns:ds="http://schemas.openxmlformats.org/officeDocument/2006/customXml" ds:itemID="{E457329C-FB5F-4A4D-B331-82D30E9A7432}">
   <ds:schemaRefs>

</xml_diff>

<commit_message>
updated presentation with todo, hypothesis, issues
</commit_message>
<xml_diff>
--- a/nonlinearLSTM.pptx
+++ b/nonlinearLSTM.pptx
@@ -5,10 +5,10 @@
     <p:sldMasterId id="2147483756" r:id="rId4"/>
   </p:sldMasterIdLst>
   <p:notesMasterIdLst>
-    <p:notesMasterId r:id="rId28"/>
+    <p:notesMasterId r:id="rId35"/>
   </p:notesMasterIdLst>
   <p:handoutMasterIdLst>
-    <p:handoutMasterId r:id="rId29"/>
+    <p:handoutMasterId r:id="rId36"/>
   </p:handoutMasterIdLst>
   <p:sldIdLst>
     <p:sldId id="413" r:id="rId5"/>
@@ -28,12 +28,19 @@
     <p:sldId id="431" r:id="rId19"/>
     <p:sldId id="433" r:id="rId20"/>
     <p:sldId id="432" r:id="rId21"/>
-    <p:sldId id="439" r:id="rId22"/>
-    <p:sldId id="435" r:id="rId23"/>
-    <p:sldId id="436" r:id="rId24"/>
-    <p:sldId id="437" r:id="rId25"/>
-    <p:sldId id="438" r:id="rId26"/>
-    <p:sldId id="412" r:id="rId27"/>
+    <p:sldId id="440" r:id="rId22"/>
+    <p:sldId id="439" r:id="rId23"/>
+    <p:sldId id="441" r:id="rId24"/>
+    <p:sldId id="442" r:id="rId25"/>
+    <p:sldId id="443" r:id="rId26"/>
+    <p:sldId id="444" r:id="rId27"/>
+    <p:sldId id="435" r:id="rId28"/>
+    <p:sldId id="436" r:id="rId29"/>
+    <p:sldId id="437" r:id="rId30"/>
+    <p:sldId id="438" r:id="rId31"/>
+    <p:sldId id="446" r:id="rId32"/>
+    <p:sldId id="445" r:id="rId33"/>
+    <p:sldId id="412" r:id="rId34"/>
   </p:sldIdLst>
   <p:sldSz cx="12192000" cy="6858000"/>
   <p:notesSz cx="6858000" cy="9144000"/>
@@ -812,7 +819,7 @@
           <a:p>
             <a:fld id="{B8015DB5-16FE-4380-B5BF-46CD18C131D7}" type="datetime8">
               <a:rPr lang="en-DE" smtClean="0"/>
-              <a:t>11/01/2022 16:19</a:t>
+              <a:t>11/01/2022 18:33</a:t>
             </a:fld>
             <a:endParaRPr lang="de-DE" dirty="0"/>
           </a:p>
@@ -2291,7 +2298,7 @@
           <a:p>
             <a:fld id="{A2E8877F-2015-4290-957C-06EF82A52242}" type="datetime8">
               <a:rPr lang="en-DE" smtClean="0"/>
-              <a:t>11/01/2022 16:19</a:t>
+              <a:t>11/01/2022 18:33</a:t>
             </a:fld>
             <a:endParaRPr lang="de-DE" dirty="0"/>
           </a:p>
@@ -3969,7 +3976,7 @@
           <a:p>
             <a:fld id="{2E7C052D-61E6-45C2-BA19-CFB3925CB63C}" type="datetime8">
               <a:rPr lang="en-DE" smtClean="0"/>
-              <a:t>11/01/2022 16:19</a:t>
+              <a:t>11/01/2022 18:33</a:t>
             </a:fld>
             <a:endParaRPr lang="de-DE" dirty="0"/>
           </a:p>
@@ -7020,7 +7027,7 @@
           <a:p>
             <a:fld id="{E98A7CA8-B4F8-4103-AA95-845AE462A37A}" type="datetime8">
               <a:rPr lang="en-DE" smtClean="0"/>
-              <a:t>11/01/2022 16:19</a:t>
+              <a:t>11/01/2022 18:33</a:t>
             </a:fld>
             <a:endParaRPr lang="de-DE" dirty="0"/>
           </a:p>
@@ -9089,7 +9096,7 @@
           <a:p>
             <a:fld id="{A2E8877F-2015-4290-957C-06EF82A52242}" type="datetime8">
               <a:rPr lang="en-DE" smtClean="0"/>
-              <a:t>11/01/2022 16:19</a:t>
+              <a:t>11/01/2022 18:33</a:t>
             </a:fld>
             <a:endParaRPr lang="de-DE" dirty="0"/>
           </a:p>
@@ -9312,7 +9319,7 @@
           <a:p>
             <a:fld id="{A2E8877F-2015-4290-957C-06EF82A52242}" type="datetime8">
               <a:rPr lang="en-DE" smtClean="0"/>
-              <a:t>11/01/2022 16:19</a:t>
+              <a:t>11/01/2022 18:33</a:t>
             </a:fld>
             <a:endParaRPr lang="de-DE" dirty="0"/>
           </a:p>
@@ -9577,7 +9584,7 @@
           <a:p>
             <a:fld id="{C683496F-A479-4189-AF7A-49EC797A60BB}" type="datetime8">
               <a:rPr lang="en-DE" smtClean="0"/>
-              <a:t>11/01/2022 16:19</a:t>
+              <a:t>11/01/2022 18:33</a:t>
             </a:fld>
             <a:endParaRPr lang="de-DE" dirty="0"/>
           </a:p>
@@ -9695,7 +9702,7 @@
           <a:p>
             <a:fld id="{A2E8877F-2015-4290-957C-06EF82A52242}" type="datetime8">
               <a:rPr lang="en-DE" smtClean="0"/>
-              <a:t>11/01/2022 16:19</a:t>
+              <a:t>11/01/2022 18:33</a:t>
             </a:fld>
             <a:endParaRPr lang="de-DE" dirty="0"/>
           </a:p>
@@ -9912,7 +9919,7 @@
           <a:p>
             <a:fld id="{A2E8877F-2015-4290-957C-06EF82A52242}" type="datetime8">
               <a:rPr lang="en-DE" smtClean="0"/>
-              <a:t>11/01/2022 18:10</a:t>
+              <a:t>11/01/2022 18:33</a:t>
             </a:fld>
             <a:endParaRPr lang="de-DE" dirty="0"/>
           </a:p>
@@ -10144,7 +10151,7 @@
           <a:p>
             <a:fld id="{A2E8877F-2015-4290-957C-06EF82A52242}" type="datetime8">
               <a:rPr lang="en-DE" smtClean="0"/>
-              <a:t>11/01/2022 17:55</a:t>
+              <a:t>11/01/2022 18:33</a:t>
             </a:fld>
             <a:endParaRPr lang="de-DE" dirty="0"/>
           </a:p>
@@ -10359,7 +10366,7 @@
           <a:p>
             <a:fld id="{A2E8877F-2015-4290-957C-06EF82A52242}" type="datetime8">
               <a:rPr lang="en-DE" smtClean="0"/>
-              <a:t>11/01/2022 18:09</a:t>
+              <a:t>11/01/2022 18:33</a:t>
             </a:fld>
             <a:endParaRPr lang="de-DE" dirty="0"/>
           </a:p>
@@ -10569,7 +10576,7 @@
           <a:p>
             <a:fld id="{A2E8877F-2015-4290-957C-06EF82A52242}" type="datetime8">
               <a:rPr lang="en-DE" smtClean="0"/>
-              <a:t>11/01/2022 18:06</a:t>
+              <a:t>11/01/2022 18:33</a:t>
             </a:fld>
             <a:endParaRPr lang="de-DE" dirty="0"/>
           </a:p>
@@ -10758,10 +10765,48 @@
       </p:grpSpPr>
       <p:sp>
         <p:nvSpPr>
-          <p:cNvPr id="2" name="Date Placeholder 1">
-            <a:extLst>
-              <a:ext uri="{FF2B5EF4-FFF2-40B4-BE49-F238E27FC236}">
-                <a16:creationId xmlns:a16="http://schemas.microsoft.com/office/drawing/2014/main" id="{E653CDC2-E009-3556-5871-43AEB18817C7}"/>
+          <p:cNvPr id="21" name="Titel 20">
+            <a:extLst>
+              <a:ext uri="{FF2B5EF4-FFF2-40B4-BE49-F238E27FC236}">
+                <a16:creationId xmlns:a16="http://schemas.microsoft.com/office/drawing/2014/main" id="{3018BD05-96D8-43F2-A6AA-CC40E7C32CCE}"/>
+              </a:ext>
+            </a:extLst>
+          </p:cNvPr>
+          <p:cNvSpPr>
+            <a:spLocks noGrp="1"/>
+          </p:cNvSpPr>
+          <p:nvPr>
+            <p:ph type="title"/>
+          </p:nvPr>
+        </p:nvSpPr>
+        <p:spPr>
+          <a:xfrm>
+            <a:off x="518318" y="3152001"/>
+            <a:ext cx="11157743" cy="553998"/>
+          </a:xfrm>
+        </p:spPr>
+        <p:txBody>
+          <a:bodyPr/>
+          <a:lstStyle/>
+          <a:p>
+            <a:r>
+              <a:rPr lang="en-US" dirty="0" err="1"/>
+              <a:t>ToDo</a:t>
+            </a:r>
+            <a:r>
+              <a:rPr lang="en-US" dirty="0"/>
+              <a:t> - Drag</a:t>
+            </a:r>
+            <a:endParaRPr lang="de-DE" dirty="0"/>
+          </a:p>
+        </p:txBody>
+      </p:sp>
+      <p:sp>
+        <p:nvSpPr>
+          <p:cNvPr id="2" name="Datumsplatzhalter 1">
+            <a:extLst>
+              <a:ext uri="{FF2B5EF4-FFF2-40B4-BE49-F238E27FC236}">
+                <a16:creationId xmlns:a16="http://schemas.microsoft.com/office/drawing/2014/main" id="{FE7214E1-5D14-4D0B-BADD-2E239FECEC10}"/>
               </a:ext>
             </a:extLst>
           </p:cNvPr>
@@ -10777,9 +10822,9 @@
           <a:bodyPr/>
           <a:lstStyle/>
           <a:p>
-            <a:fld id="{A2E8877F-2015-4290-957C-06EF82A52242}" type="datetime8">
+            <a:fld id="{C683496F-A479-4189-AF7A-49EC797A60BB}" type="datetime8">
               <a:rPr lang="en-DE" smtClean="0"/>
-              <a:t>11/01/2022 18:21</a:t>
+              <a:t>11/01/2022 18:33</a:t>
             </a:fld>
             <a:endParaRPr lang="de-DE" dirty="0"/>
           </a:p>
@@ -10787,10 +10832,10 @@
       </p:sp>
       <p:sp>
         <p:nvSpPr>
-          <p:cNvPr id="3" name="Footer Placeholder 2">
-            <a:extLst>
-              <a:ext uri="{FF2B5EF4-FFF2-40B4-BE49-F238E27FC236}">
-                <a16:creationId xmlns:a16="http://schemas.microsoft.com/office/drawing/2014/main" id="{31D70611-B689-F2D3-EC7A-E9C09F116747}"/>
+          <p:cNvPr id="3" name="Fußzeilenplatzhalter 2">
+            <a:extLst>
+              <a:ext uri="{FF2B5EF4-FFF2-40B4-BE49-F238E27FC236}">
+                <a16:creationId xmlns:a16="http://schemas.microsoft.com/office/drawing/2014/main" id="{6A6AD034-0F65-47AF-9CAA-C4B0CEB30D4D}"/>
               </a:ext>
             </a:extLst>
           </p:cNvPr>
@@ -10816,10 +10861,10 @@
       </p:sp>
       <p:sp>
         <p:nvSpPr>
-          <p:cNvPr id="4" name="Slide Number Placeholder 3">
-            <a:extLst>
-              <a:ext uri="{FF2B5EF4-FFF2-40B4-BE49-F238E27FC236}">
-                <a16:creationId xmlns:a16="http://schemas.microsoft.com/office/drawing/2014/main" id="{72EF048D-E487-0918-E3D6-70DD63871490}"/>
+          <p:cNvPr id="4" name="Foliennummernplatzhalter 3">
+            <a:extLst>
+              <a:ext uri="{FF2B5EF4-FFF2-40B4-BE49-F238E27FC236}">
+                <a16:creationId xmlns:a16="http://schemas.microsoft.com/office/drawing/2014/main" id="{00F7E098-F740-40F7-A085-7034627D9148}"/>
               </a:ext>
             </a:extLst>
           </p:cNvPr>
@@ -10844,147 +10889,10 @@
           </a:p>
         </p:txBody>
       </p:sp>
-      <p:sp>
-        <p:nvSpPr>
-          <p:cNvPr id="5" name="Title 4">
-            <a:extLst>
-              <a:ext uri="{FF2B5EF4-FFF2-40B4-BE49-F238E27FC236}">
-                <a16:creationId xmlns:a16="http://schemas.microsoft.com/office/drawing/2014/main" id="{45EE9607-A6C6-D200-B84D-465F5AABC4F5}"/>
-              </a:ext>
-            </a:extLst>
-          </p:cNvPr>
-          <p:cNvSpPr>
-            <a:spLocks noGrp="1"/>
-          </p:cNvSpPr>
-          <p:nvPr>
-            <p:ph type="title"/>
-          </p:nvPr>
-        </p:nvSpPr>
-        <p:spPr/>
-        <p:txBody>
-          <a:bodyPr/>
-          <a:lstStyle/>
-          <a:p>
-            <a:r>
-              <a:rPr lang="en-US" dirty="0"/>
-              <a:t>Drag</a:t>
-            </a:r>
-          </a:p>
-        </p:txBody>
-      </p:sp>
-      <p:sp>
-        <p:nvSpPr>
-          <p:cNvPr id="6" name="Text Placeholder 5">
-            <a:extLst>
-              <a:ext uri="{FF2B5EF4-FFF2-40B4-BE49-F238E27FC236}">
-                <a16:creationId xmlns:a16="http://schemas.microsoft.com/office/drawing/2014/main" id="{680BC9F9-2757-24C5-308C-2149987995FC}"/>
-              </a:ext>
-            </a:extLst>
-          </p:cNvPr>
-          <p:cNvSpPr>
-            <a:spLocks noGrp="1"/>
-          </p:cNvSpPr>
-          <p:nvPr>
-            <p:ph type="body" sz="quarter" idx="17"/>
-          </p:nvPr>
-        </p:nvSpPr>
-        <p:spPr/>
-        <p:txBody>
-          <a:bodyPr/>
-          <a:lstStyle/>
-          <a:p>
-            <a:r>
-              <a:rPr lang="en-US" dirty="0"/>
-              <a:t>Drag</a:t>
-            </a:r>
-          </a:p>
-          <a:p>
-            <a:r>
-              <a:rPr lang="en-US" dirty="0"/>
-              <a:t>Evaluate on new data!</a:t>
-            </a:r>
-          </a:p>
-          <a:p>
-            <a:pPr lvl="1"/>
-            <a:r>
-              <a:rPr lang="en-US" dirty="0"/>
-              <a:t>Need more similar data samples, variety of steps. </a:t>
-            </a:r>
-            <a:r>
-              <a:rPr lang="en-US" dirty="0">
-                <a:sym typeface="Wingdings" panose="05000000000000000000" pitchFamily="2" charset="2"/>
-              </a:rPr>
-              <a:t> Different step heights, 20 variations (12 train, 4 </a:t>
-            </a:r>
-            <a:r>
-              <a:rPr lang="en-US" dirty="0" err="1">
-                <a:sym typeface="Wingdings" panose="05000000000000000000" pitchFamily="2" charset="2"/>
-              </a:rPr>
-              <a:t>val</a:t>
-            </a:r>
-            <a:r>
-              <a:rPr lang="en-US" dirty="0">
-                <a:sym typeface="Wingdings" panose="05000000000000000000" pitchFamily="2" charset="2"/>
-              </a:rPr>
-              <a:t>, 4 test)</a:t>
-            </a:r>
-          </a:p>
-          <a:p>
-            <a:pPr lvl="1"/>
-            <a:r>
-              <a:rPr lang="en-US" dirty="0">
-                <a:sym typeface="Wingdings" panose="05000000000000000000" pitchFamily="2" charset="2"/>
-              </a:rPr>
-              <a:t>Normalization</a:t>
-            </a:r>
-            <a:r>
-              <a:rPr lang="en-US" b="1" dirty="0">
-                <a:sym typeface="Wingdings" panose="05000000000000000000" pitchFamily="2" charset="2"/>
-              </a:rPr>
-              <a:t> </a:t>
-            </a:r>
-            <a:r>
-              <a:rPr lang="en-US" dirty="0">
-                <a:sym typeface="Wingdings" panose="05000000000000000000" pitchFamily="2" charset="2"/>
-              </a:rPr>
-              <a:t>to values between 0 and 1 (Min-Max)</a:t>
-            </a:r>
-          </a:p>
-          <a:p>
-            <a:pPr lvl="1"/>
-            <a:r>
-              <a:rPr lang="en-US" dirty="0"/>
-              <a:t>Train again on </a:t>
-            </a:r>
-            <a:r>
-              <a:rPr lang="en-US" b="1" dirty="0"/>
-              <a:t>now multiple </a:t>
-            </a:r>
-            <a:r>
-              <a:rPr lang="en-US" dirty="0"/>
-              <a:t>different training samples</a:t>
-            </a:r>
-          </a:p>
-          <a:p>
-            <a:pPr lvl="1"/>
-            <a:r>
-              <a:rPr lang="en-US" dirty="0"/>
-              <a:t>Evaluate on the training data again, to make sure it can learn one sample of the multiple training samples well.</a:t>
-            </a:r>
-          </a:p>
-          <a:p>
-            <a:pPr lvl="1"/>
-            <a:r>
-              <a:rPr lang="en-US" dirty="0"/>
-              <a:t>Then evaluate on new data!</a:t>
-            </a:r>
-          </a:p>
-        </p:txBody>
-      </p:sp>
     </p:spTree>
     <p:extLst>
       <p:ext uri="{BB962C8B-B14F-4D97-AF65-F5344CB8AC3E}">
-        <p14:creationId xmlns:p14="http://schemas.microsoft.com/office/powerpoint/2010/main" val="1936224446"/>
+        <p14:creationId xmlns:p14="http://schemas.microsoft.com/office/powerpoint/2010/main" val="3952180218"/>
       </p:ext>
     </p:extLst>
   </p:cSld>
@@ -11034,7 +10942,7 @@
           <a:p>
             <a:fld id="{A2E8877F-2015-4290-957C-06EF82A52242}" type="datetime8">
               <a:rPr lang="en-DE" smtClean="0"/>
-              <a:t>11/01/2022 18:15</a:t>
+              <a:t>11/01/2022 18:33</a:t>
             </a:fld>
             <a:endParaRPr lang="de-DE" dirty="0"/>
           </a:p>
@@ -11190,7 +11098,7 @@
               <a:rPr lang="en-US" b="1" dirty="0">
                 <a:sym typeface="Wingdings" panose="05000000000000000000" pitchFamily="2" charset="2"/>
               </a:rPr>
-              <a:t>No Normalization </a:t>
+              <a:t>Normalization </a:t>
             </a:r>
             <a:r>
               <a:rPr lang="en-US" dirty="0">
@@ -11233,7 +11141,7 @@
     </p:spTree>
     <p:extLst>
       <p:ext uri="{BB962C8B-B14F-4D97-AF65-F5344CB8AC3E}">
-        <p14:creationId xmlns:p14="http://schemas.microsoft.com/office/powerpoint/2010/main" val="3879249609"/>
+        <p14:creationId xmlns:p14="http://schemas.microsoft.com/office/powerpoint/2010/main" val="1936224446"/>
       </p:ext>
     </p:extLst>
   </p:cSld>
@@ -11321,7 +11229,7 @@
           <a:p>
             <a:fld id="{C683496F-A479-4189-AF7A-49EC797A60BB}" type="datetime8">
               <a:rPr lang="en-DE" smtClean="0"/>
-              <a:t>11/01/2022 16:19</a:t>
+              <a:t>11/01/2022 18:33</a:t>
             </a:fld>
             <a:endParaRPr lang="de-DE" dirty="0"/>
           </a:p>
@@ -11439,7 +11347,7 @@
           <a:p>
             <a:fld id="{A2E8877F-2015-4290-957C-06EF82A52242}" type="datetime8">
               <a:rPr lang="en-DE" smtClean="0"/>
-              <a:t>11/01/2022 18:15</a:t>
+              <a:t>11/01/2022 18:35</a:t>
             </a:fld>
             <a:endParaRPr lang="de-DE" dirty="0"/>
           </a:p>
@@ -11499,6 +11407,1039 @@
               <a:rPr lang="de-DE" smtClean="0"/>
               <a:pPr/>
               <a:t>20</a:t>
+            </a:fld>
+            <a:endParaRPr lang="de-DE"/>
+          </a:p>
+        </p:txBody>
+      </p:sp>
+      <p:sp>
+        <p:nvSpPr>
+          <p:cNvPr id="5" name="Titel 4">
+            <a:extLst>
+              <a:ext uri="{FF2B5EF4-FFF2-40B4-BE49-F238E27FC236}">
+                <a16:creationId xmlns:a16="http://schemas.microsoft.com/office/drawing/2014/main" id="{1E6B2A5D-4314-E0F4-B6A1-769A8DB4F7C3}"/>
+              </a:ext>
+            </a:extLst>
+          </p:cNvPr>
+          <p:cNvSpPr>
+            <a:spLocks noGrp="1"/>
+          </p:cNvSpPr>
+          <p:nvPr>
+            <p:ph type="title"/>
+          </p:nvPr>
+        </p:nvSpPr>
+        <p:spPr/>
+        <p:txBody>
+          <a:bodyPr/>
+          <a:lstStyle/>
+          <a:p>
+            <a:r>
+              <a:rPr lang="en-US"/>
+              <a:t>Drag norm – Multiple Samples</a:t>
+            </a:r>
+            <a:endParaRPr lang="en-US" dirty="0"/>
+          </a:p>
+        </p:txBody>
+      </p:sp>
+      <p:sp>
+        <p:nvSpPr>
+          <p:cNvPr id="6" name="Textplatzhalter 5">
+            <a:extLst>
+              <a:ext uri="{FF2B5EF4-FFF2-40B4-BE49-F238E27FC236}">
+                <a16:creationId xmlns:a16="http://schemas.microsoft.com/office/drawing/2014/main" id="{202B2346-17ED-3E6E-A606-65763BDC6E02}"/>
+              </a:ext>
+            </a:extLst>
+          </p:cNvPr>
+          <p:cNvSpPr>
+            <a:spLocks noGrp="1"/>
+          </p:cNvSpPr>
+          <p:nvPr>
+            <p:ph type="body" sz="quarter" idx="17"/>
+          </p:nvPr>
+        </p:nvSpPr>
+        <p:spPr/>
+        <p:txBody>
+          <a:bodyPr/>
+          <a:lstStyle/>
+          <a:p>
+            <a:r>
+              <a:rPr lang="en-US"/>
+              <a:t>Prediction on Trainingset</a:t>
+            </a:r>
+            <a:endParaRPr lang="en-US" dirty="0"/>
+          </a:p>
+        </p:txBody>
+      </p:sp>
+      <p:pic>
+        <p:nvPicPr>
+          <p:cNvPr id="8" name="Grafik 7">
+            <a:extLst>
+              <a:ext uri="{FF2B5EF4-FFF2-40B4-BE49-F238E27FC236}">
+                <a16:creationId xmlns:a16="http://schemas.microsoft.com/office/drawing/2014/main" id="{D57134CD-915A-3FA7-65A9-FE8BD03FF90E}"/>
+              </a:ext>
+            </a:extLst>
+          </p:cNvPr>
+          <p:cNvPicPr>
+            <a:picLocks noChangeAspect="1"/>
+          </p:cNvPicPr>
+          <p:nvPr/>
+        </p:nvPicPr>
+        <p:blipFill>
+          <a:blip r:embed="rId2">
+            <a:extLst>
+              <a:ext uri="{28A0092B-C50C-407E-A947-70E740481C1C}">
+                <a14:useLocalDpi xmlns:a14="http://schemas.microsoft.com/office/drawing/2010/main" val="0"/>
+              </a:ext>
+            </a:extLst>
+          </a:blip>
+          <a:stretch>
+            <a:fillRect/>
+          </a:stretch>
+        </p:blipFill>
+        <p:spPr>
+          <a:xfrm>
+            <a:off x="3973812" y="1276916"/>
+            <a:ext cx="6864083" cy="5148062"/>
+          </a:xfrm>
+          <a:prstGeom prst="rect">
+            <a:avLst/>
+          </a:prstGeom>
+        </p:spPr>
+      </p:pic>
+    </p:spTree>
+    <p:extLst>
+      <p:ext uri="{BB962C8B-B14F-4D97-AF65-F5344CB8AC3E}">
+        <p14:creationId xmlns:p14="http://schemas.microsoft.com/office/powerpoint/2010/main" val="1143952171"/>
+      </p:ext>
+    </p:extLst>
+  </p:cSld>
+  <p:clrMapOvr>
+    <a:masterClrMapping/>
+  </p:clrMapOvr>
+</p:sld>
+</file>
+
+<file path=ppt/slides/slide21.xml><?xml version="1.0" encoding="utf-8"?>
+<p:sld xmlns:a="http://schemas.openxmlformats.org/drawingml/2006/main" xmlns:r="http://schemas.openxmlformats.org/officeDocument/2006/relationships" xmlns:p="http://schemas.openxmlformats.org/presentationml/2006/main">
+  <p:cSld>
+    <p:spTree>
+      <p:nvGrpSpPr>
+        <p:cNvPr id="1" name=""/>
+        <p:cNvGrpSpPr/>
+        <p:nvPr/>
+      </p:nvGrpSpPr>
+      <p:grpSpPr>
+        <a:xfrm>
+          <a:off x="0" y="0"/>
+          <a:ext cx="0" cy="0"/>
+          <a:chOff x="0" y="0"/>
+          <a:chExt cx="0" cy="0"/>
+        </a:xfrm>
+      </p:grpSpPr>
+      <p:sp>
+        <p:nvSpPr>
+          <p:cNvPr id="2" name="Datumsplatzhalter 1">
+            <a:extLst>
+              <a:ext uri="{FF2B5EF4-FFF2-40B4-BE49-F238E27FC236}">
+                <a16:creationId xmlns:a16="http://schemas.microsoft.com/office/drawing/2014/main" id="{B446B528-9123-B86E-03BB-CC1AFE33FB8E}"/>
+              </a:ext>
+            </a:extLst>
+          </p:cNvPr>
+          <p:cNvSpPr>
+            <a:spLocks noGrp="1"/>
+          </p:cNvSpPr>
+          <p:nvPr>
+            <p:ph type="dt" sz="half" idx="10"/>
+          </p:nvPr>
+        </p:nvSpPr>
+        <p:spPr/>
+        <p:txBody>
+          <a:bodyPr/>
+          <a:lstStyle/>
+          <a:p>
+            <a:fld id="{A2E8877F-2015-4290-957C-06EF82A52242}" type="datetime8">
+              <a:rPr lang="en-DE" smtClean="0"/>
+              <a:t>11/01/2022 18:35</a:t>
+            </a:fld>
+            <a:endParaRPr lang="de-DE" dirty="0"/>
+          </a:p>
+        </p:txBody>
+      </p:sp>
+      <p:sp>
+        <p:nvSpPr>
+          <p:cNvPr id="3" name="Fußzeilenplatzhalter 2">
+            <a:extLst>
+              <a:ext uri="{FF2B5EF4-FFF2-40B4-BE49-F238E27FC236}">
+                <a16:creationId xmlns:a16="http://schemas.microsoft.com/office/drawing/2014/main" id="{9039D9D2-CC83-71B3-9FD1-8EE930EC3D74}"/>
+              </a:ext>
+            </a:extLst>
+          </p:cNvPr>
+          <p:cNvSpPr>
+            <a:spLocks noGrp="1"/>
+          </p:cNvSpPr>
+          <p:nvPr>
+            <p:ph type="ftr" sz="quarter" idx="11"/>
+          </p:nvPr>
+        </p:nvSpPr>
+        <p:spPr/>
+        <p:txBody>
+          <a:bodyPr/>
+          <a:lstStyle/>
+          <a:p>
+            <a:r>
+              <a:rPr lang="en-US"/>
+              <a:t>Modeling of nonlinear Systems with LSTMs | Sebastian Hirt</a:t>
+            </a:r>
+            <a:endParaRPr lang="de-DE" dirty="0"/>
+          </a:p>
+        </p:txBody>
+      </p:sp>
+      <p:sp>
+        <p:nvSpPr>
+          <p:cNvPr id="4" name="Foliennummernplatzhalter 3">
+            <a:extLst>
+              <a:ext uri="{FF2B5EF4-FFF2-40B4-BE49-F238E27FC236}">
+                <a16:creationId xmlns:a16="http://schemas.microsoft.com/office/drawing/2014/main" id="{6799EE1F-7DA2-681B-18DD-284EC80CE7C1}"/>
+              </a:ext>
+            </a:extLst>
+          </p:cNvPr>
+          <p:cNvSpPr>
+            <a:spLocks noGrp="1"/>
+          </p:cNvSpPr>
+          <p:nvPr>
+            <p:ph type="sldNum" sz="quarter" idx="12"/>
+          </p:nvPr>
+        </p:nvSpPr>
+        <p:spPr/>
+        <p:txBody>
+          <a:bodyPr/>
+          <a:lstStyle/>
+          <a:p>
+            <a:fld id="{D949F9DF-37BD-4CD6-BF49-65BA579E1D7A}" type="slidenum">
+              <a:rPr lang="de-DE" smtClean="0"/>
+              <a:pPr/>
+              <a:t>21</a:t>
+            </a:fld>
+            <a:endParaRPr lang="de-DE"/>
+          </a:p>
+        </p:txBody>
+      </p:sp>
+      <p:sp>
+        <p:nvSpPr>
+          <p:cNvPr id="5" name="Titel 4">
+            <a:extLst>
+              <a:ext uri="{FF2B5EF4-FFF2-40B4-BE49-F238E27FC236}">
+                <a16:creationId xmlns:a16="http://schemas.microsoft.com/office/drawing/2014/main" id="{1E6B2A5D-4314-E0F4-B6A1-769A8DB4F7C3}"/>
+              </a:ext>
+            </a:extLst>
+          </p:cNvPr>
+          <p:cNvSpPr>
+            <a:spLocks noGrp="1"/>
+          </p:cNvSpPr>
+          <p:nvPr>
+            <p:ph type="title"/>
+          </p:nvPr>
+        </p:nvSpPr>
+        <p:spPr/>
+        <p:txBody>
+          <a:bodyPr/>
+          <a:lstStyle/>
+          <a:p>
+            <a:r>
+              <a:rPr lang="en-US" dirty="0"/>
+              <a:t>Drag norm – Multiple Samples</a:t>
+            </a:r>
+          </a:p>
+        </p:txBody>
+      </p:sp>
+      <p:sp>
+        <p:nvSpPr>
+          <p:cNvPr id="6" name="Textplatzhalter 5">
+            <a:extLst>
+              <a:ext uri="{FF2B5EF4-FFF2-40B4-BE49-F238E27FC236}">
+                <a16:creationId xmlns:a16="http://schemas.microsoft.com/office/drawing/2014/main" id="{202B2346-17ED-3E6E-A606-65763BDC6E02}"/>
+              </a:ext>
+            </a:extLst>
+          </p:cNvPr>
+          <p:cNvSpPr>
+            <a:spLocks noGrp="1"/>
+          </p:cNvSpPr>
+          <p:nvPr>
+            <p:ph type="body" sz="quarter" idx="17"/>
+          </p:nvPr>
+        </p:nvSpPr>
+        <p:spPr/>
+        <p:txBody>
+          <a:bodyPr/>
+          <a:lstStyle/>
+          <a:p>
+            <a:r>
+              <a:rPr lang="en-US" dirty="0"/>
+              <a:t>Prediction on Validation Set</a:t>
+            </a:r>
+          </a:p>
+        </p:txBody>
+      </p:sp>
+      <p:pic>
+        <p:nvPicPr>
+          <p:cNvPr id="9" name="Grafik 8">
+            <a:extLst>
+              <a:ext uri="{FF2B5EF4-FFF2-40B4-BE49-F238E27FC236}">
+                <a16:creationId xmlns:a16="http://schemas.microsoft.com/office/drawing/2014/main" id="{1431F442-B0B9-3419-5D70-1CF4701BD9DD}"/>
+              </a:ext>
+            </a:extLst>
+          </p:cNvPr>
+          <p:cNvPicPr>
+            <a:picLocks noChangeAspect="1"/>
+          </p:cNvPicPr>
+          <p:nvPr/>
+        </p:nvPicPr>
+        <p:blipFill>
+          <a:blip r:embed="rId2">
+            <a:extLst>
+              <a:ext uri="{28A0092B-C50C-407E-A947-70E740481C1C}">
+                <a14:useLocalDpi xmlns:a14="http://schemas.microsoft.com/office/drawing/2010/main" val="0"/>
+              </a:ext>
+            </a:extLst>
+          </a:blip>
+          <a:stretch>
+            <a:fillRect/>
+          </a:stretch>
+        </p:blipFill>
+        <p:spPr>
+          <a:xfrm>
+            <a:off x="4196855" y="1415548"/>
+            <a:ext cx="6679240" cy="5009430"/>
+          </a:xfrm>
+          <a:prstGeom prst="rect">
+            <a:avLst/>
+          </a:prstGeom>
+        </p:spPr>
+      </p:pic>
+    </p:spTree>
+    <p:extLst>
+      <p:ext uri="{BB962C8B-B14F-4D97-AF65-F5344CB8AC3E}">
+        <p14:creationId xmlns:p14="http://schemas.microsoft.com/office/powerpoint/2010/main" val="2559965656"/>
+      </p:ext>
+    </p:extLst>
+  </p:cSld>
+  <p:clrMapOvr>
+    <a:masterClrMapping/>
+  </p:clrMapOvr>
+</p:sld>
+</file>
+
+<file path=ppt/slides/slide22.xml><?xml version="1.0" encoding="utf-8"?>
+<p:sld xmlns:a="http://schemas.openxmlformats.org/drawingml/2006/main" xmlns:r="http://schemas.openxmlformats.org/officeDocument/2006/relationships" xmlns:p="http://schemas.openxmlformats.org/presentationml/2006/main">
+  <p:cSld>
+    <p:spTree>
+      <p:nvGrpSpPr>
+        <p:cNvPr id="1" name=""/>
+        <p:cNvGrpSpPr/>
+        <p:nvPr/>
+      </p:nvGrpSpPr>
+      <p:grpSpPr>
+        <a:xfrm>
+          <a:off x="0" y="0"/>
+          <a:ext cx="0" cy="0"/>
+          <a:chOff x="0" y="0"/>
+          <a:chExt cx="0" cy="0"/>
+        </a:xfrm>
+      </p:grpSpPr>
+      <p:sp>
+        <p:nvSpPr>
+          <p:cNvPr id="2" name="Datumsplatzhalter 1">
+            <a:extLst>
+              <a:ext uri="{FF2B5EF4-FFF2-40B4-BE49-F238E27FC236}">
+                <a16:creationId xmlns:a16="http://schemas.microsoft.com/office/drawing/2014/main" id="{B446B528-9123-B86E-03BB-CC1AFE33FB8E}"/>
+              </a:ext>
+            </a:extLst>
+          </p:cNvPr>
+          <p:cNvSpPr>
+            <a:spLocks noGrp="1"/>
+          </p:cNvSpPr>
+          <p:nvPr>
+            <p:ph type="dt" sz="half" idx="10"/>
+          </p:nvPr>
+        </p:nvSpPr>
+        <p:spPr/>
+        <p:txBody>
+          <a:bodyPr/>
+          <a:lstStyle/>
+          <a:p>
+            <a:fld id="{A2E8877F-2015-4290-957C-06EF82A52242}" type="datetime8">
+              <a:rPr lang="en-DE" smtClean="0"/>
+              <a:t>11/01/2022 18:35</a:t>
+            </a:fld>
+            <a:endParaRPr lang="de-DE" dirty="0"/>
+          </a:p>
+        </p:txBody>
+      </p:sp>
+      <p:sp>
+        <p:nvSpPr>
+          <p:cNvPr id="3" name="Fußzeilenplatzhalter 2">
+            <a:extLst>
+              <a:ext uri="{FF2B5EF4-FFF2-40B4-BE49-F238E27FC236}">
+                <a16:creationId xmlns:a16="http://schemas.microsoft.com/office/drawing/2014/main" id="{9039D9D2-CC83-71B3-9FD1-8EE930EC3D74}"/>
+              </a:ext>
+            </a:extLst>
+          </p:cNvPr>
+          <p:cNvSpPr>
+            <a:spLocks noGrp="1"/>
+          </p:cNvSpPr>
+          <p:nvPr>
+            <p:ph type="ftr" sz="quarter" idx="11"/>
+          </p:nvPr>
+        </p:nvSpPr>
+        <p:spPr/>
+        <p:txBody>
+          <a:bodyPr/>
+          <a:lstStyle/>
+          <a:p>
+            <a:r>
+              <a:rPr lang="en-US"/>
+              <a:t>Modeling of nonlinear Systems with LSTMs | Sebastian Hirt</a:t>
+            </a:r>
+            <a:endParaRPr lang="de-DE" dirty="0"/>
+          </a:p>
+        </p:txBody>
+      </p:sp>
+      <p:sp>
+        <p:nvSpPr>
+          <p:cNvPr id="4" name="Foliennummernplatzhalter 3">
+            <a:extLst>
+              <a:ext uri="{FF2B5EF4-FFF2-40B4-BE49-F238E27FC236}">
+                <a16:creationId xmlns:a16="http://schemas.microsoft.com/office/drawing/2014/main" id="{6799EE1F-7DA2-681B-18DD-284EC80CE7C1}"/>
+              </a:ext>
+            </a:extLst>
+          </p:cNvPr>
+          <p:cNvSpPr>
+            <a:spLocks noGrp="1"/>
+          </p:cNvSpPr>
+          <p:nvPr>
+            <p:ph type="sldNum" sz="quarter" idx="12"/>
+          </p:nvPr>
+        </p:nvSpPr>
+        <p:spPr/>
+        <p:txBody>
+          <a:bodyPr/>
+          <a:lstStyle/>
+          <a:p>
+            <a:fld id="{D949F9DF-37BD-4CD6-BF49-65BA579E1D7A}" type="slidenum">
+              <a:rPr lang="de-DE" smtClean="0"/>
+              <a:pPr/>
+              <a:t>22</a:t>
+            </a:fld>
+            <a:endParaRPr lang="de-DE"/>
+          </a:p>
+        </p:txBody>
+      </p:sp>
+      <p:sp>
+        <p:nvSpPr>
+          <p:cNvPr id="5" name="Titel 4">
+            <a:extLst>
+              <a:ext uri="{FF2B5EF4-FFF2-40B4-BE49-F238E27FC236}">
+                <a16:creationId xmlns:a16="http://schemas.microsoft.com/office/drawing/2014/main" id="{1E6B2A5D-4314-E0F4-B6A1-769A8DB4F7C3}"/>
+              </a:ext>
+            </a:extLst>
+          </p:cNvPr>
+          <p:cNvSpPr>
+            <a:spLocks noGrp="1"/>
+          </p:cNvSpPr>
+          <p:nvPr>
+            <p:ph type="title"/>
+          </p:nvPr>
+        </p:nvSpPr>
+        <p:spPr/>
+        <p:txBody>
+          <a:bodyPr/>
+          <a:lstStyle/>
+          <a:p>
+            <a:r>
+              <a:rPr lang="en-US" dirty="0"/>
+              <a:t>Drag norm – Multiple Samples</a:t>
+            </a:r>
+          </a:p>
+        </p:txBody>
+      </p:sp>
+      <p:sp>
+        <p:nvSpPr>
+          <p:cNvPr id="6" name="Textplatzhalter 5">
+            <a:extLst>
+              <a:ext uri="{FF2B5EF4-FFF2-40B4-BE49-F238E27FC236}">
+                <a16:creationId xmlns:a16="http://schemas.microsoft.com/office/drawing/2014/main" id="{202B2346-17ED-3E6E-A606-65763BDC6E02}"/>
+              </a:ext>
+            </a:extLst>
+          </p:cNvPr>
+          <p:cNvSpPr>
+            <a:spLocks noGrp="1"/>
+          </p:cNvSpPr>
+          <p:nvPr>
+            <p:ph type="body" sz="quarter" idx="17"/>
+          </p:nvPr>
+        </p:nvSpPr>
+        <p:spPr/>
+        <p:txBody>
+          <a:bodyPr/>
+          <a:lstStyle/>
+          <a:p>
+            <a:r>
+              <a:rPr lang="en-US" dirty="0"/>
+              <a:t>Prediction on Test Set</a:t>
+            </a:r>
+          </a:p>
+        </p:txBody>
+      </p:sp>
+      <p:pic>
+        <p:nvPicPr>
+          <p:cNvPr id="11" name="Grafik 10">
+            <a:extLst>
+              <a:ext uri="{FF2B5EF4-FFF2-40B4-BE49-F238E27FC236}">
+                <a16:creationId xmlns:a16="http://schemas.microsoft.com/office/drawing/2014/main" id="{43076303-D7DA-40DF-066D-224760260A9C}"/>
+              </a:ext>
+            </a:extLst>
+          </p:cNvPr>
+          <p:cNvPicPr>
+            <a:picLocks noChangeAspect="1"/>
+          </p:cNvPicPr>
+          <p:nvPr/>
+        </p:nvPicPr>
+        <p:blipFill>
+          <a:blip r:embed="rId2">
+            <a:extLst>
+              <a:ext uri="{28A0092B-C50C-407E-A947-70E740481C1C}">
+                <a14:useLocalDpi xmlns:a14="http://schemas.microsoft.com/office/drawing/2010/main" val="0"/>
+              </a:ext>
+            </a:extLst>
+          </a:blip>
+          <a:stretch>
+            <a:fillRect/>
+          </a:stretch>
+        </p:blipFill>
+        <p:spPr>
+          <a:xfrm>
+            <a:off x="3951346" y="1435570"/>
+            <a:ext cx="6655161" cy="4991371"/>
+          </a:xfrm>
+          <a:prstGeom prst="rect">
+            <a:avLst/>
+          </a:prstGeom>
+        </p:spPr>
+      </p:pic>
+    </p:spTree>
+    <p:extLst>
+      <p:ext uri="{BB962C8B-B14F-4D97-AF65-F5344CB8AC3E}">
+        <p14:creationId xmlns:p14="http://schemas.microsoft.com/office/powerpoint/2010/main" val="2258630762"/>
+      </p:ext>
+    </p:extLst>
+  </p:cSld>
+  <p:clrMapOvr>
+    <a:masterClrMapping/>
+  </p:clrMapOvr>
+</p:sld>
+</file>
+
+<file path=ppt/slides/slide23.xml><?xml version="1.0" encoding="utf-8"?>
+<p:sld xmlns:a="http://schemas.openxmlformats.org/drawingml/2006/main" xmlns:r="http://schemas.openxmlformats.org/officeDocument/2006/relationships" xmlns:p="http://schemas.openxmlformats.org/presentationml/2006/main">
+  <p:cSld>
+    <p:spTree>
+      <p:nvGrpSpPr>
+        <p:cNvPr id="1" name=""/>
+        <p:cNvGrpSpPr/>
+        <p:nvPr/>
+      </p:nvGrpSpPr>
+      <p:grpSpPr>
+        <a:xfrm>
+          <a:off x="0" y="0"/>
+          <a:ext cx="0" cy="0"/>
+          <a:chOff x="0" y="0"/>
+          <a:chExt cx="0" cy="0"/>
+        </a:xfrm>
+      </p:grpSpPr>
+      <p:sp>
+        <p:nvSpPr>
+          <p:cNvPr id="21" name="Titel 20">
+            <a:extLst>
+              <a:ext uri="{FF2B5EF4-FFF2-40B4-BE49-F238E27FC236}">
+                <a16:creationId xmlns:a16="http://schemas.microsoft.com/office/drawing/2014/main" id="{3018BD05-96D8-43F2-A6AA-CC40E7C32CCE}"/>
+              </a:ext>
+            </a:extLst>
+          </p:cNvPr>
+          <p:cNvSpPr>
+            <a:spLocks noGrp="1"/>
+          </p:cNvSpPr>
+          <p:nvPr>
+            <p:ph type="title"/>
+          </p:nvPr>
+        </p:nvSpPr>
+        <p:spPr>
+          <a:xfrm>
+            <a:off x="518318" y="3152001"/>
+            <a:ext cx="11157743" cy="553998"/>
+          </a:xfrm>
+        </p:spPr>
+        <p:txBody>
+          <a:bodyPr/>
+          <a:lstStyle/>
+          <a:p>
+            <a:r>
+              <a:rPr lang="en-US" dirty="0"/>
+              <a:t>Drag without Normalization</a:t>
+            </a:r>
+            <a:endParaRPr lang="de-DE" dirty="0"/>
+          </a:p>
+        </p:txBody>
+      </p:sp>
+      <p:sp>
+        <p:nvSpPr>
+          <p:cNvPr id="2" name="Datumsplatzhalter 1">
+            <a:extLst>
+              <a:ext uri="{FF2B5EF4-FFF2-40B4-BE49-F238E27FC236}">
+                <a16:creationId xmlns:a16="http://schemas.microsoft.com/office/drawing/2014/main" id="{FE7214E1-5D14-4D0B-BADD-2E239FECEC10}"/>
+              </a:ext>
+            </a:extLst>
+          </p:cNvPr>
+          <p:cNvSpPr>
+            <a:spLocks noGrp="1"/>
+          </p:cNvSpPr>
+          <p:nvPr>
+            <p:ph type="dt" sz="half" idx="10"/>
+          </p:nvPr>
+        </p:nvSpPr>
+        <p:spPr/>
+        <p:txBody>
+          <a:bodyPr/>
+          <a:lstStyle/>
+          <a:p>
+            <a:fld id="{C683496F-A479-4189-AF7A-49EC797A60BB}" type="datetime8">
+              <a:rPr lang="en-DE" smtClean="0"/>
+              <a:t>11/01/2022 18:49</a:t>
+            </a:fld>
+            <a:endParaRPr lang="de-DE" dirty="0"/>
+          </a:p>
+        </p:txBody>
+      </p:sp>
+      <p:sp>
+        <p:nvSpPr>
+          <p:cNvPr id="3" name="Fußzeilenplatzhalter 2">
+            <a:extLst>
+              <a:ext uri="{FF2B5EF4-FFF2-40B4-BE49-F238E27FC236}">
+                <a16:creationId xmlns:a16="http://schemas.microsoft.com/office/drawing/2014/main" id="{6A6AD034-0F65-47AF-9CAA-C4B0CEB30D4D}"/>
+              </a:ext>
+            </a:extLst>
+          </p:cNvPr>
+          <p:cNvSpPr>
+            <a:spLocks noGrp="1"/>
+          </p:cNvSpPr>
+          <p:nvPr>
+            <p:ph type="ftr" sz="quarter" idx="11"/>
+          </p:nvPr>
+        </p:nvSpPr>
+        <p:spPr/>
+        <p:txBody>
+          <a:bodyPr/>
+          <a:lstStyle/>
+          <a:p>
+            <a:r>
+              <a:rPr lang="en-US"/>
+              <a:t>Modeling of nonlinear Systems with LSTMs | Sebastian Hirt</a:t>
+            </a:r>
+            <a:endParaRPr lang="de-DE" dirty="0"/>
+          </a:p>
+        </p:txBody>
+      </p:sp>
+      <p:sp>
+        <p:nvSpPr>
+          <p:cNvPr id="4" name="Foliennummernplatzhalter 3">
+            <a:extLst>
+              <a:ext uri="{FF2B5EF4-FFF2-40B4-BE49-F238E27FC236}">
+                <a16:creationId xmlns:a16="http://schemas.microsoft.com/office/drawing/2014/main" id="{00F7E098-F740-40F7-A085-7034627D9148}"/>
+              </a:ext>
+            </a:extLst>
+          </p:cNvPr>
+          <p:cNvSpPr>
+            <a:spLocks noGrp="1"/>
+          </p:cNvSpPr>
+          <p:nvPr>
+            <p:ph type="sldNum" sz="quarter" idx="12"/>
+          </p:nvPr>
+        </p:nvSpPr>
+        <p:spPr/>
+        <p:txBody>
+          <a:bodyPr/>
+          <a:lstStyle/>
+          <a:p>
+            <a:fld id="{D949F9DF-37BD-4CD6-BF49-65BA579E1D7A}" type="slidenum">
+              <a:rPr lang="de-DE" smtClean="0"/>
+              <a:pPr/>
+              <a:t>23</a:t>
+            </a:fld>
+            <a:endParaRPr lang="de-DE"/>
+          </a:p>
+        </p:txBody>
+      </p:sp>
+    </p:spTree>
+    <p:extLst>
+      <p:ext uri="{BB962C8B-B14F-4D97-AF65-F5344CB8AC3E}">
+        <p14:creationId xmlns:p14="http://schemas.microsoft.com/office/powerpoint/2010/main" val="894646411"/>
+      </p:ext>
+    </p:extLst>
+  </p:cSld>
+  <p:clrMapOvr>
+    <a:masterClrMapping/>
+  </p:clrMapOvr>
+</p:sld>
+</file>
+
+<file path=ppt/slides/slide24.xml><?xml version="1.0" encoding="utf-8"?>
+<p:sld xmlns:a="http://schemas.openxmlformats.org/drawingml/2006/main" xmlns:r="http://schemas.openxmlformats.org/officeDocument/2006/relationships" xmlns:p="http://schemas.openxmlformats.org/presentationml/2006/main">
+  <p:cSld>
+    <p:spTree>
+      <p:nvGrpSpPr>
+        <p:cNvPr id="1" name=""/>
+        <p:cNvGrpSpPr/>
+        <p:nvPr/>
+      </p:nvGrpSpPr>
+      <p:grpSpPr>
+        <a:xfrm>
+          <a:off x="0" y="0"/>
+          <a:ext cx="0" cy="0"/>
+          <a:chOff x="0" y="0"/>
+          <a:chExt cx="0" cy="0"/>
+        </a:xfrm>
+      </p:grpSpPr>
+      <p:sp>
+        <p:nvSpPr>
+          <p:cNvPr id="2" name="Date Placeholder 1">
+            <a:extLst>
+              <a:ext uri="{FF2B5EF4-FFF2-40B4-BE49-F238E27FC236}">
+                <a16:creationId xmlns:a16="http://schemas.microsoft.com/office/drawing/2014/main" id="{E653CDC2-E009-3556-5871-43AEB18817C7}"/>
+              </a:ext>
+            </a:extLst>
+          </p:cNvPr>
+          <p:cNvSpPr>
+            <a:spLocks noGrp="1"/>
+          </p:cNvSpPr>
+          <p:nvPr>
+            <p:ph type="dt" sz="half" idx="10"/>
+          </p:nvPr>
+        </p:nvSpPr>
+        <p:spPr/>
+        <p:txBody>
+          <a:bodyPr/>
+          <a:lstStyle/>
+          <a:p>
+            <a:fld id="{A2E8877F-2015-4290-957C-06EF82A52242}" type="datetime8">
+              <a:rPr lang="en-DE" smtClean="0"/>
+              <a:t>11/01/2022 18:33</a:t>
+            </a:fld>
+            <a:endParaRPr lang="de-DE" dirty="0"/>
+          </a:p>
+        </p:txBody>
+      </p:sp>
+      <p:sp>
+        <p:nvSpPr>
+          <p:cNvPr id="3" name="Footer Placeholder 2">
+            <a:extLst>
+              <a:ext uri="{FF2B5EF4-FFF2-40B4-BE49-F238E27FC236}">
+                <a16:creationId xmlns:a16="http://schemas.microsoft.com/office/drawing/2014/main" id="{31D70611-B689-F2D3-EC7A-E9C09F116747}"/>
+              </a:ext>
+            </a:extLst>
+          </p:cNvPr>
+          <p:cNvSpPr>
+            <a:spLocks noGrp="1"/>
+          </p:cNvSpPr>
+          <p:nvPr>
+            <p:ph type="ftr" sz="quarter" idx="11"/>
+          </p:nvPr>
+        </p:nvSpPr>
+        <p:spPr/>
+        <p:txBody>
+          <a:bodyPr/>
+          <a:lstStyle/>
+          <a:p>
+            <a:r>
+              <a:rPr lang="en-US"/>
+              <a:t>Modeling of nonlinear Systems with LSTMs | Sebastian Hirt</a:t>
+            </a:r>
+            <a:endParaRPr lang="de-DE" dirty="0"/>
+          </a:p>
+        </p:txBody>
+      </p:sp>
+      <p:sp>
+        <p:nvSpPr>
+          <p:cNvPr id="4" name="Slide Number Placeholder 3">
+            <a:extLst>
+              <a:ext uri="{FF2B5EF4-FFF2-40B4-BE49-F238E27FC236}">
+                <a16:creationId xmlns:a16="http://schemas.microsoft.com/office/drawing/2014/main" id="{72EF048D-E487-0918-E3D6-70DD63871490}"/>
+              </a:ext>
+            </a:extLst>
+          </p:cNvPr>
+          <p:cNvSpPr>
+            <a:spLocks noGrp="1"/>
+          </p:cNvSpPr>
+          <p:nvPr>
+            <p:ph type="sldNum" sz="quarter" idx="12"/>
+          </p:nvPr>
+        </p:nvSpPr>
+        <p:spPr/>
+        <p:txBody>
+          <a:bodyPr/>
+          <a:lstStyle/>
+          <a:p>
+            <a:fld id="{D949F9DF-37BD-4CD6-BF49-65BA579E1D7A}" type="slidenum">
+              <a:rPr lang="de-DE" smtClean="0"/>
+              <a:pPr/>
+              <a:t>24</a:t>
+            </a:fld>
+            <a:endParaRPr lang="de-DE"/>
+          </a:p>
+        </p:txBody>
+      </p:sp>
+      <p:sp>
+        <p:nvSpPr>
+          <p:cNvPr id="5" name="Title 4">
+            <a:extLst>
+              <a:ext uri="{FF2B5EF4-FFF2-40B4-BE49-F238E27FC236}">
+                <a16:creationId xmlns:a16="http://schemas.microsoft.com/office/drawing/2014/main" id="{45EE9607-A6C6-D200-B84D-465F5AABC4F5}"/>
+              </a:ext>
+            </a:extLst>
+          </p:cNvPr>
+          <p:cNvSpPr>
+            <a:spLocks noGrp="1"/>
+          </p:cNvSpPr>
+          <p:nvPr>
+            <p:ph type="title"/>
+          </p:nvPr>
+        </p:nvSpPr>
+        <p:spPr/>
+        <p:txBody>
+          <a:bodyPr/>
+          <a:lstStyle/>
+          <a:p>
+            <a:r>
+              <a:rPr lang="en-US" dirty="0"/>
+              <a:t>Drag</a:t>
+            </a:r>
+          </a:p>
+        </p:txBody>
+      </p:sp>
+      <p:sp>
+        <p:nvSpPr>
+          <p:cNvPr id="6" name="Text Placeholder 5">
+            <a:extLst>
+              <a:ext uri="{FF2B5EF4-FFF2-40B4-BE49-F238E27FC236}">
+                <a16:creationId xmlns:a16="http://schemas.microsoft.com/office/drawing/2014/main" id="{680BC9F9-2757-24C5-308C-2149987995FC}"/>
+              </a:ext>
+            </a:extLst>
+          </p:cNvPr>
+          <p:cNvSpPr>
+            <a:spLocks noGrp="1"/>
+          </p:cNvSpPr>
+          <p:nvPr>
+            <p:ph type="body" sz="quarter" idx="17"/>
+          </p:nvPr>
+        </p:nvSpPr>
+        <p:spPr/>
+        <p:txBody>
+          <a:bodyPr/>
+          <a:lstStyle/>
+          <a:p>
+            <a:r>
+              <a:rPr lang="en-US" dirty="0"/>
+              <a:t>Drag</a:t>
+            </a:r>
+          </a:p>
+          <a:p>
+            <a:r>
+              <a:rPr lang="en-US" dirty="0"/>
+              <a:t>Evaluate on new data!</a:t>
+            </a:r>
+          </a:p>
+          <a:p>
+            <a:pPr lvl="1"/>
+            <a:r>
+              <a:rPr lang="en-US" dirty="0"/>
+              <a:t>Need more similar data samples, variety of steps. </a:t>
+            </a:r>
+            <a:r>
+              <a:rPr lang="en-US" dirty="0">
+                <a:sym typeface="Wingdings" panose="05000000000000000000" pitchFamily="2" charset="2"/>
+              </a:rPr>
+              <a:t> Different step heights, 20 variations (12 train, 4 </a:t>
+            </a:r>
+            <a:r>
+              <a:rPr lang="en-US" dirty="0" err="1">
+                <a:sym typeface="Wingdings" panose="05000000000000000000" pitchFamily="2" charset="2"/>
+              </a:rPr>
+              <a:t>val</a:t>
+            </a:r>
+            <a:r>
+              <a:rPr lang="en-US" dirty="0">
+                <a:sym typeface="Wingdings" panose="05000000000000000000" pitchFamily="2" charset="2"/>
+              </a:rPr>
+              <a:t>, 4 test)</a:t>
+            </a:r>
+          </a:p>
+          <a:p>
+            <a:pPr lvl="1"/>
+            <a:r>
+              <a:rPr lang="en-US" b="1" dirty="0">
+                <a:sym typeface="Wingdings" panose="05000000000000000000" pitchFamily="2" charset="2"/>
+              </a:rPr>
+              <a:t>No Normalization </a:t>
+            </a:r>
+            <a:r>
+              <a:rPr lang="en-US" dirty="0">
+                <a:sym typeface="Wingdings" panose="05000000000000000000" pitchFamily="2" charset="2"/>
+              </a:rPr>
+              <a:t>to values between 0 and 1 (Min-Max)</a:t>
+            </a:r>
+          </a:p>
+          <a:p>
+            <a:pPr lvl="1"/>
+            <a:r>
+              <a:rPr lang="en-US" dirty="0"/>
+              <a:t>Train again on </a:t>
+            </a:r>
+            <a:r>
+              <a:rPr lang="en-US" b="1" dirty="0"/>
+              <a:t>now multiple </a:t>
+            </a:r>
+            <a:r>
+              <a:rPr lang="en-US" dirty="0"/>
+              <a:t>different training samples</a:t>
+            </a:r>
+          </a:p>
+          <a:p>
+            <a:pPr lvl="1"/>
+            <a:r>
+              <a:rPr lang="en-US" dirty="0"/>
+              <a:t>Evaluate on the training data again, to make sure it can learn one sample of the multiple training samples well.</a:t>
+            </a:r>
+          </a:p>
+          <a:p>
+            <a:pPr lvl="1"/>
+            <a:r>
+              <a:rPr lang="en-US" dirty="0"/>
+              <a:t>Then evaluate on new data!</a:t>
+            </a:r>
+          </a:p>
+        </p:txBody>
+      </p:sp>
+    </p:spTree>
+    <p:extLst>
+      <p:ext uri="{BB962C8B-B14F-4D97-AF65-F5344CB8AC3E}">
+        <p14:creationId xmlns:p14="http://schemas.microsoft.com/office/powerpoint/2010/main" val="3879249609"/>
+      </p:ext>
+    </p:extLst>
+  </p:cSld>
+  <p:clrMapOvr>
+    <a:masterClrMapping/>
+  </p:clrMapOvr>
+</p:sld>
+</file>
+
+<file path=ppt/slides/slide25.xml><?xml version="1.0" encoding="utf-8"?>
+<p:sld xmlns:a="http://schemas.openxmlformats.org/drawingml/2006/main" xmlns:r="http://schemas.openxmlformats.org/officeDocument/2006/relationships" xmlns:p="http://schemas.openxmlformats.org/presentationml/2006/main">
+  <p:cSld>
+    <p:spTree>
+      <p:nvGrpSpPr>
+        <p:cNvPr id="1" name=""/>
+        <p:cNvGrpSpPr/>
+        <p:nvPr/>
+      </p:nvGrpSpPr>
+      <p:grpSpPr>
+        <a:xfrm>
+          <a:off x="0" y="0"/>
+          <a:ext cx="0" cy="0"/>
+          <a:chOff x="0" y="0"/>
+          <a:chExt cx="0" cy="0"/>
+        </a:xfrm>
+      </p:grpSpPr>
+      <p:sp>
+        <p:nvSpPr>
+          <p:cNvPr id="2" name="Datumsplatzhalter 1">
+            <a:extLst>
+              <a:ext uri="{FF2B5EF4-FFF2-40B4-BE49-F238E27FC236}">
+                <a16:creationId xmlns:a16="http://schemas.microsoft.com/office/drawing/2014/main" id="{B446B528-9123-B86E-03BB-CC1AFE33FB8E}"/>
+              </a:ext>
+            </a:extLst>
+          </p:cNvPr>
+          <p:cNvSpPr>
+            <a:spLocks noGrp="1"/>
+          </p:cNvSpPr>
+          <p:nvPr>
+            <p:ph type="dt" sz="half" idx="10"/>
+          </p:nvPr>
+        </p:nvSpPr>
+        <p:spPr/>
+        <p:txBody>
+          <a:bodyPr/>
+          <a:lstStyle/>
+          <a:p>
+            <a:fld id="{A2E8877F-2015-4290-957C-06EF82A52242}" type="datetime8">
+              <a:rPr lang="en-DE" smtClean="0"/>
+              <a:t>11/01/2022 18:33</a:t>
+            </a:fld>
+            <a:endParaRPr lang="de-DE" dirty="0"/>
+          </a:p>
+        </p:txBody>
+      </p:sp>
+      <p:sp>
+        <p:nvSpPr>
+          <p:cNvPr id="3" name="Fußzeilenplatzhalter 2">
+            <a:extLst>
+              <a:ext uri="{FF2B5EF4-FFF2-40B4-BE49-F238E27FC236}">
+                <a16:creationId xmlns:a16="http://schemas.microsoft.com/office/drawing/2014/main" id="{9039D9D2-CC83-71B3-9FD1-8EE930EC3D74}"/>
+              </a:ext>
+            </a:extLst>
+          </p:cNvPr>
+          <p:cNvSpPr>
+            <a:spLocks noGrp="1"/>
+          </p:cNvSpPr>
+          <p:nvPr>
+            <p:ph type="ftr" sz="quarter" idx="11"/>
+          </p:nvPr>
+        </p:nvSpPr>
+        <p:spPr/>
+        <p:txBody>
+          <a:bodyPr/>
+          <a:lstStyle/>
+          <a:p>
+            <a:r>
+              <a:rPr lang="en-US"/>
+              <a:t>Modeling of nonlinear Systems with LSTMs | Sebastian Hirt</a:t>
+            </a:r>
+            <a:endParaRPr lang="de-DE" dirty="0"/>
+          </a:p>
+        </p:txBody>
+      </p:sp>
+      <p:sp>
+        <p:nvSpPr>
+          <p:cNvPr id="4" name="Foliennummernplatzhalter 3">
+            <a:extLst>
+              <a:ext uri="{FF2B5EF4-FFF2-40B4-BE49-F238E27FC236}">
+                <a16:creationId xmlns:a16="http://schemas.microsoft.com/office/drawing/2014/main" id="{6799EE1F-7DA2-681B-18DD-284EC80CE7C1}"/>
+              </a:ext>
+            </a:extLst>
+          </p:cNvPr>
+          <p:cNvSpPr>
+            <a:spLocks noGrp="1"/>
+          </p:cNvSpPr>
+          <p:nvPr>
+            <p:ph type="sldNum" sz="quarter" idx="12"/>
+          </p:nvPr>
+        </p:nvSpPr>
+        <p:spPr/>
+        <p:txBody>
+          <a:bodyPr/>
+          <a:lstStyle/>
+          <a:p>
+            <a:fld id="{D949F9DF-37BD-4CD6-BF49-65BA579E1D7A}" type="slidenum">
+              <a:rPr lang="de-DE" smtClean="0"/>
+              <a:pPr/>
+              <a:t>25</a:t>
             </a:fld>
             <a:endParaRPr lang="de-DE"/>
           </a:p>
@@ -11614,7 +12555,7 @@
 </p:sld>
 </file>
 
-<file path=ppt/slides/slide21.xml><?xml version="1.0" encoding="utf-8"?>
+<file path=ppt/slides/slide26.xml><?xml version="1.0" encoding="utf-8"?>
 <p:sld xmlns:a="http://schemas.openxmlformats.org/drawingml/2006/main" xmlns:r="http://schemas.openxmlformats.org/officeDocument/2006/relationships" xmlns:p="http://schemas.openxmlformats.org/presentationml/2006/main">
   <p:cSld>
     <p:spTree>
@@ -11654,7 +12595,7 @@
           <a:p>
             <a:fld id="{A2E8877F-2015-4290-957C-06EF82A52242}" type="datetime8">
               <a:rPr lang="en-DE" smtClean="0"/>
-              <a:t>11/01/2022 18:15</a:t>
+              <a:t>11/01/2022 18:33</a:t>
             </a:fld>
             <a:endParaRPr lang="de-DE" dirty="0"/>
           </a:p>
@@ -11713,7 +12654,7 @@
             <a:fld id="{D949F9DF-37BD-4CD6-BF49-65BA579E1D7A}" type="slidenum">
               <a:rPr lang="de-DE" smtClean="0"/>
               <a:pPr/>
-              <a:t>21</a:t>
+              <a:t>26</a:t>
             </a:fld>
             <a:endParaRPr lang="de-DE"/>
           </a:p>
@@ -11824,7 +12765,7 @@
 </p:sld>
 </file>
 
-<file path=ppt/slides/slide22.xml><?xml version="1.0" encoding="utf-8"?>
+<file path=ppt/slides/slide27.xml><?xml version="1.0" encoding="utf-8"?>
 <p:sld xmlns:a="http://schemas.openxmlformats.org/drawingml/2006/main" xmlns:r="http://schemas.openxmlformats.org/officeDocument/2006/relationships" xmlns:p="http://schemas.openxmlformats.org/presentationml/2006/main">
   <p:cSld>
     <p:spTree>
@@ -11864,7 +12805,7 @@
           <a:p>
             <a:fld id="{A2E8877F-2015-4290-957C-06EF82A52242}" type="datetime8">
               <a:rPr lang="en-DE" smtClean="0"/>
-              <a:t>11/01/2022 18:15</a:t>
+              <a:t>11/01/2022 18:33</a:t>
             </a:fld>
             <a:endParaRPr lang="de-DE" dirty="0"/>
           </a:p>
@@ -11923,7 +12864,7 @@
             <a:fld id="{D949F9DF-37BD-4CD6-BF49-65BA579E1D7A}" type="slidenum">
               <a:rPr lang="de-DE" smtClean="0"/>
               <a:pPr/>
-              <a:t>22</a:t>
+              <a:t>27</a:t>
             </a:fld>
             <a:endParaRPr lang="de-DE"/>
           </a:p>
@@ -12034,7 +12975,7 @@
 </p:sld>
 </file>
 
-<file path=ppt/slides/slide23.xml><?xml version="1.0" encoding="utf-8"?>
+<file path=ppt/slides/slide28.xml><?xml version="1.0" encoding="utf-8"?>
 <p:sld xmlns:a="http://schemas.openxmlformats.org/drawingml/2006/main" xmlns:r="http://schemas.openxmlformats.org/officeDocument/2006/relationships" xmlns:p="http://schemas.openxmlformats.org/presentationml/2006/main">
   <p:cSld>
     <p:spTree>
@@ -12053,10 +12994,10 @@
       </p:grpSpPr>
       <p:sp>
         <p:nvSpPr>
-          <p:cNvPr id="2" name="Textplatzhalter 1">
-            <a:extLst>
-              <a:ext uri="{FF2B5EF4-FFF2-40B4-BE49-F238E27FC236}">
-                <a16:creationId xmlns:a16="http://schemas.microsoft.com/office/drawing/2014/main" id="{D671D917-0E7D-044A-A553-3607B76DD26D}"/>
+          <p:cNvPr id="2" name="Datumsplatzhalter 1">
+            <a:extLst>
+              <a:ext uri="{FF2B5EF4-FFF2-40B4-BE49-F238E27FC236}">
+                <a16:creationId xmlns:a16="http://schemas.microsoft.com/office/drawing/2014/main" id="{633D9BD4-F4B5-149F-6E8A-4F59F8DAC856}"/>
               </a:ext>
             </a:extLst>
           </p:cNvPr>
@@ -12064,28 +13005,167 @@
             <a:spLocks noGrp="1"/>
           </p:cNvSpPr>
           <p:nvPr>
-            <p:ph type="body" sz="quarter" idx="13"/>
+            <p:ph type="dt" sz="half" idx="10"/>
           </p:nvPr>
         </p:nvSpPr>
-        <p:spPr>
-          <a:xfrm>
-            <a:off x="518317" y="2647985"/>
-            <a:ext cx="11157745" cy="1562031"/>
-          </a:xfrm>
-        </p:spPr>
+        <p:spPr/>
         <p:txBody>
           <a:bodyPr/>
           <a:lstStyle/>
           <a:p>
-            <a:r>
-              <a:rPr lang="de-DE" dirty="0"/>
-              <a:t>Vielen Dank</a:t>
-            </a:r>
-          </a:p>
-          <a:p>
-            <a:r>
-              <a:rPr lang="de-DE" dirty="0"/>
-              <a:t>für Ihre Aufmerksamkeit!</a:t>
+            <a:fld id="{A2E8877F-2015-4290-957C-06EF82A52242}" type="datetime8">
+              <a:rPr lang="en-DE" smtClean="0"/>
+              <a:t>11/01/2022 19:05</a:t>
+            </a:fld>
+            <a:endParaRPr lang="de-DE" dirty="0"/>
+          </a:p>
+        </p:txBody>
+      </p:sp>
+      <p:sp>
+        <p:nvSpPr>
+          <p:cNvPr id="3" name="Fußzeilenplatzhalter 2">
+            <a:extLst>
+              <a:ext uri="{FF2B5EF4-FFF2-40B4-BE49-F238E27FC236}">
+                <a16:creationId xmlns:a16="http://schemas.microsoft.com/office/drawing/2014/main" id="{513B6BE7-D696-BC29-C3FF-FE83B6C77824}"/>
+              </a:ext>
+            </a:extLst>
+          </p:cNvPr>
+          <p:cNvSpPr>
+            <a:spLocks noGrp="1"/>
+          </p:cNvSpPr>
+          <p:nvPr>
+            <p:ph type="ftr" sz="quarter" idx="11"/>
+          </p:nvPr>
+        </p:nvSpPr>
+        <p:spPr/>
+        <p:txBody>
+          <a:bodyPr/>
+          <a:lstStyle/>
+          <a:p>
+            <a:r>
+              <a:rPr lang="en-US"/>
+              <a:t>Modeling of nonlinear Systems with LSTMs | Sebastian Hirt</a:t>
+            </a:r>
+            <a:endParaRPr lang="de-DE" dirty="0"/>
+          </a:p>
+        </p:txBody>
+      </p:sp>
+      <p:sp>
+        <p:nvSpPr>
+          <p:cNvPr id="4" name="Foliennummernplatzhalter 3">
+            <a:extLst>
+              <a:ext uri="{FF2B5EF4-FFF2-40B4-BE49-F238E27FC236}">
+                <a16:creationId xmlns:a16="http://schemas.microsoft.com/office/drawing/2014/main" id="{FFDF05F7-18F6-7F38-9DC5-0A16457FE22A}"/>
+              </a:ext>
+            </a:extLst>
+          </p:cNvPr>
+          <p:cNvSpPr>
+            <a:spLocks noGrp="1"/>
+          </p:cNvSpPr>
+          <p:nvPr>
+            <p:ph type="sldNum" sz="quarter" idx="12"/>
+          </p:nvPr>
+        </p:nvSpPr>
+        <p:spPr/>
+        <p:txBody>
+          <a:bodyPr/>
+          <a:lstStyle/>
+          <a:p>
+            <a:fld id="{D949F9DF-37BD-4CD6-BF49-65BA579E1D7A}" type="slidenum">
+              <a:rPr lang="de-DE" smtClean="0"/>
+              <a:pPr/>
+              <a:t>28</a:t>
+            </a:fld>
+            <a:endParaRPr lang="de-DE"/>
+          </a:p>
+        </p:txBody>
+      </p:sp>
+      <p:sp>
+        <p:nvSpPr>
+          <p:cNvPr id="5" name="Titel 4">
+            <a:extLst>
+              <a:ext uri="{FF2B5EF4-FFF2-40B4-BE49-F238E27FC236}">
+                <a16:creationId xmlns:a16="http://schemas.microsoft.com/office/drawing/2014/main" id="{6F192CDE-B847-02C9-6C12-29C4CFBD0B8B}"/>
+              </a:ext>
+            </a:extLst>
+          </p:cNvPr>
+          <p:cNvSpPr>
+            <a:spLocks noGrp="1"/>
+          </p:cNvSpPr>
+          <p:nvPr>
+            <p:ph type="title"/>
+          </p:nvPr>
+        </p:nvSpPr>
+        <p:spPr/>
+        <p:txBody>
+          <a:bodyPr/>
+          <a:lstStyle/>
+          <a:p>
+            <a:r>
+              <a:rPr lang="en-US" dirty="0"/>
+              <a:t>Eval</a:t>
+            </a:r>
+          </a:p>
+        </p:txBody>
+      </p:sp>
+      <p:sp>
+        <p:nvSpPr>
+          <p:cNvPr id="6" name="Textplatzhalter 5">
+            <a:extLst>
+              <a:ext uri="{FF2B5EF4-FFF2-40B4-BE49-F238E27FC236}">
+                <a16:creationId xmlns:a16="http://schemas.microsoft.com/office/drawing/2014/main" id="{DF5258BC-B97B-5BD2-9538-9776750B6984}"/>
+              </a:ext>
+            </a:extLst>
+          </p:cNvPr>
+          <p:cNvSpPr>
+            <a:spLocks noGrp="1"/>
+          </p:cNvSpPr>
+          <p:nvPr>
+            <p:ph type="body" sz="quarter" idx="17"/>
+          </p:nvPr>
+        </p:nvSpPr>
+        <p:spPr/>
+        <p:txBody>
+          <a:bodyPr/>
+          <a:lstStyle/>
+          <a:p>
+            <a:r>
+              <a:rPr lang="en-US" dirty="0"/>
+              <a:t>Seems like normalization doesn’t really help</a:t>
+            </a:r>
+          </a:p>
+          <a:p>
+            <a:pPr lvl="1"/>
+            <a:r>
+              <a:rPr lang="en-US" dirty="0"/>
+              <a:t>Normalization might only help if there are multiple outputs with different ranges of values</a:t>
+            </a:r>
+          </a:p>
+          <a:p>
+            <a:pPr lvl="1"/>
+            <a:r>
+              <a:rPr lang="en-US" dirty="0"/>
+              <a:t>The loss is then just larger for the variables with a higher value</a:t>
+            </a:r>
+          </a:p>
+          <a:p>
+            <a:pPr lvl="1"/>
+            <a:r>
+              <a:rPr lang="en-US" dirty="0"/>
+              <a:t>Leads to prioritization of what output to improve</a:t>
+            </a:r>
+          </a:p>
+          <a:p>
+            <a:pPr lvl="1"/>
+            <a:r>
+              <a:rPr lang="en-US" dirty="0"/>
+              <a:t>Not the case here, only one output</a:t>
+            </a:r>
+          </a:p>
+          <a:p>
+            <a:r>
+              <a:rPr lang="en-US" dirty="0"/>
+              <a:t>But need to unnormalize results and compare then with objective metric (mean squared error)</a:t>
             </a:r>
           </a:p>
         </p:txBody>
@@ -12093,7 +13173,245 @@
     </p:spTree>
     <p:extLst>
       <p:ext uri="{BB962C8B-B14F-4D97-AF65-F5344CB8AC3E}">
-        <p14:creationId xmlns:p14="http://schemas.microsoft.com/office/powerpoint/2010/main" val="1185948968"/>
+        <p14:creationId xmlns:p14="http://schemas.microsoft.com/office/powerpoint/2010/main" val="2048986311"/>
+      </p:ext>
+    </p:extLst>
+  </p:cSld>
+  <p:clrMapOvr>
+    <a:masterClrMapping/>
+  </p:clrMapOvr>
+</p:sld>
+</file>
+
+<file path=ppt/slides/slide29.xml><?xml version="1.0" encoding="utf-8"?>
+<p:sld xmlns:a="http://schemas.openxmlformats.org/drawingml/2006/main" xmlns:r="http://schemas.openxmlformats.org/officeDocument/2006/relationships" xmlns:p="http://schemas.openxmlformats.org/presentationml/2006/main">
+  <p:cSld>
+    <p:spTree>
+      <p:nvGrpSpPr>
+        <p:cNvPr id="1" name=""/>
+        <p:cNvGrpSpPr/>
+        <p:nvPr/>
+      </p:nvGrpSpPr>
+      <p:grpSpPr>
+        <a:xfrm>
+          <a:off x="0" y="0"/>
+          <a:ext cx="0" cy="0"/>
+          <a:chOff x="0" y="0"/>
+          <a:chExt cx="0" cy="0"/>
+        </a:xfrm>
+      </p:grpSpPr>
+      <p:sp>
+        <p:nvSpPr>
+          <p:cNvPr id="2" name="Date Placeholder 1">
+            <a:extLst>
+              <a:ext uri="{FF2B5EF4-FFF2-40B4-BE49-F238E27FC236}">
+                <a16:creationId xmlns:a16="http://schemas.microsoft.com/office/drawing/2014/main" id="{E653CDC2-E009-3556-5871-43AEB18817C7}"/>
+              </a:ext>
+            </a:extLst>
+          </p:cNvPr>
+          <p:cNvSpPr>
+            <a:spLocks noGrp="1"/>
+          </p:cNvSpPr>
+          <p:nvPr>
+            <p:ph type="dt" sz="half" idx="10"/>
+          </p:nvPr>
+        </p:nvSpPr>
+        <p:spPr/>
+        <p:txBody>
+          <a:bodyPr/>
+          <a:lstStyle/>
+          <a:p>
+            <a:fld id="{A2E8877F-2015-4290-957C-06EF82A52242}" type="datetime8">
+              <a:rPr lang="en-DE" smtClean="0"/>
+              <a:t>11/01/2022 18:50</a:t>
+            </a:fld>
+            <a:endParaRPr lang="de-DE" dirty="0"/>
+          </a:p>
+        </p:txBody>
+      </p:sp>
+      <p:sp>
+        <p:nvSpPr>
+          <p:cNvPr id="3" name="Footer Placeholder 2">
+            <a:extLst>
+              <a:ext uri="{FF2B5EF4-FFF2-40B4-BE49-F238E27FC236}">
+                <a16:creationId xmlns:a16="http://schemas.microsoft.com/office/drawing/2014/main" id="{31D70611-B689-F2D3-EC7A-E9C09F116747}"/>
+              </a:ext>
+            </a:extLst>
+          </p:cNvPr>
+          <p:cNvSpPr>
+            <a:spLocks noGrp="1"/>
+          </p:cNvSpPr>
+          <p:nvPr>
+            <p:ph type="ftr" sz="quarter" idx="11"/>
+          </p:nvPr>
+        </p:nvSpPr>
+        <p:spPr/>
+        <p:txBody>
+          <a:bodyPr/>
+          <a:lstStyle/>
+          <a:p>
+            <a:r>
+              <a:rPr lang="en-US"/>
+              <a:t>Modeling of nonlinear Systems with LSTMs | Sebastian Hirt</a:t>
+            </a:r>
+            <a:endParaRPr lang="de-DE" dirty="0"/>
+          </a:p>
+        </p:txBody>
+      </p:sp>
+      <p:sp>
+        <p:nvSpPr>
+          <p:cNvPr id="4" name="Slide Number Placeholder 3">
+            <a:extLst>
+              <a:ext uri="{FF2B5EF4-FFF2-40B4-BE49-F238E27FC236}">
+                <a16:creationId xmlns:a16="http://schemas.microsoft.com/office/drawing/2014/main" id="{72EF048D-E487-0918-E3D6-70DD63871490}"/>
+              </a:ext>
+            </a:extLst>
+          </p:cNvPr>
+          <p:cNvSpPr>
+            <a:spLocks noGrp="1"/>
+          </p:cNvSpPr>
+          <p:nvPr>
+            <p:ph type="sldNum" sz="quarter" idx="12"/>
+          </p:nvPr>
+        </p:nvSpPr>
+        <p:spPr/>
+        <p:txBody>
+          <a:bodyPr/>
+          <a:lstStyle/>
+          <a:p>
+            <a:fld id="{D949F9DF-37BD-4CD6-BF49-65BA579E1D7A}" type="slidenum">
+              <a:rPr lang="de-DE" smtClean="0"/>
+              <a:pPr/>
+              <a:t>29</a:t>
+            </a:fld>
+            <a:endParaRPr lang="de-DE"/>
+          </a:p>
+        </p:txBody>
+      </p:sp>
+      <p:sp>
+        <p:nvSpPr>
+          <p:cNvPr id="5" name="Title 4">
+            <a:extLst>
+              <a:ext uri="{FF2B5EF4-FFF2-40B4-BE49-F238E27FC236}">
+                <a16:creationId xmlns:a16="http://schemas.microsoft.com/office/drawing/2014/main" id="{45EE9607-A6C6-D200-B84D-465F5AABC4F5}"/>
+              </a:ext>
+            </a:extLst>
+          </p:cNvPr>
+          <p:cNvSpPr>
+            <a:spLocks noGrp="1"/>
+          </p:cNvSpPr>
+          <p:nvPr>
+            <p:ph type="title"/>
+          </p:nvPr>
+        </p:nvSpPr>
+        <p:spPr/>
+        <p:txBody>
+          <a:bodyPr/>
+          <a:lstStyle/>
+          <a:p>
+            <a:r>
+              <a:rPr lang="en-US" dirty="0" err="1"/>
+              <a:t>ToDo</a:t>
+            </a:r>
+            <a:endParaRPr lang="en-US" dirty="0"/>
+          </a:p>
+        </p:txBody>
+      </p:sp>
+      <p:sp>
+        <p:nvSpPr>
+          <p:cNvPr id="6" name="Text Placeholder 5">
+            <a:extLst>
+              <a:ext uri="{FF2B5EF4-FFF2-40B4-BE49-F238E27FC236}">
+                <a16:creationId xmlns:a16="http://schemas.microsoft.com/office/drawing/2014/main" id="{680BC9F9-2757-24C5-308C-2149987995FC}"/>
+              </a:ext>
+            </a:extLst>
+          </p:cNvPr>
+          <p:cNvSpPr>
+            <a:spLocks noGrp="1"/>
+          </p:cNvSpPr>
+          <p:nvPr>
+            <p:ph type="body" sz="quarter" idx="17"/>
+          </p:nvPr>
+        </p:nvSpPr>
+        <p:spPr/>
+        <p:txBody>
+          <a:bodyPr/>
+          <a:lstStyle/>
+          <a:p>
+            <a:r>
+              <a:rPr lang="en-US" dirty="0" err="1"/>
+              <a:t>ToDo</a:t>
+            </a:r>
+            <a:endParaRPr lang="en-US" dirty="0"/>
+          </a:p>
+          <a:p>
+            <a:pPr lvl="1"/>
+            <a:r>
+              <a:rPr lang="en-US" dirty="0"/>
+              <a:t>Finalize plot labels</a:t>
+            </a:r>
+          </a:p>
+          <a:p>
+            <a:pPr lvl="1"/>
+            <a:r>
+              <a:rPr lang="en-US" dirty="0"/>
+              <a:t>Unnormalize normalized results, calculate loss on sets then, compare to unnormalized training</a:t>
+            </a:r>
+          </a:p>
+          <a:p>
+            <a:pPr lvl="1"/>
+            <a:r>
+              <a:rPr lang="en-US" dirty="0"/>
+              <a:t>Test model sizes (more/less layers, more/less LSTM cells in each layer) and make table comparison</a:t>
+            </a:r>
+          </a:p>
+          <a:p>
+            <a:r>
+              <a:rPr lang="en-US" dirty="0"/>
+              <a:t>Issues</a:t>
+            </a:r>
+          </a:p>
+          <a:p>
+            <a:pPr lvl="1"/>
+            <a:r>
+              <a:rPr lang="en-US" dirty="0"/>
+              <a:t>Need to decide what I want to test</a:t>
+            </a:r>
+          </a:p>
+          <a:p>
+            <a:pPr lvl="2"/>
+            <a:r>
+              <a:rPr lang="en-US" dirty="0"/>
+              <a:t>Many Hyperparameters, can’t test everything</a:t>
+            </a:r>
+          </a:p>
+          <a:p>
+            <a:pPr lvl="2"/>
+            <a:r>
+              <a:rPr lang="en-US" dirty="0"/>
+              <a:t>Define few configurations</a:t>
+            </a:r>
+          </a:p>
+          <a:p>
+            <a:pPr lvl="2"/>
+            <a:r>
+              <a:rPr lang="en-US" dirty="0"/>
+              <a:t>Make hypotheses how they will perform</a:t>
+            </a:r>
+          </a:p>
+          <a:p>
+            <a:pPr lvl="2"/>
+            <a:r>
+              <a:rPr lang="en-US" dirty="0"/>
+              <a:t>Compare them in table</a:t>
+            </a:r>
+          </a:p>
+        </p:txBody>
+      </p:sp>
+    </p:spTree>
+    <p:extLst>
+      <p:ext uri="{BB962C8B-B14F-4D97-AF65-F5344CB8AC3E}">
+        <p14:creationId xmlns:p14="http://schemas.microsoft.com/office/powerpoint/2010/main" val="1139780746"/>
       </p:ext>
     </p:extLst>
   </p:cSld>
@@ -12143,7 +13461,7 @@
           <a:p>
             <a:fld id="{A2E8877F-2015-4290-957C-06EF82A52242}" type="datetime8">
               <a:rPr lang="en-DE" smtClean="0"/>
-              <a:t>11/01/2022 16:19</a:t>
+              <a:t>11/01/2022 18:33</a:t>
             </a:fld>
             <a:endParaRPr lang="de-DE" dirty="0"/>
           </a:p>
@@ -12697,6 +14015,75 @@
 </p:sld>
 </file>
 
+<file path=ppt/slides/slide30.xml><?xml version="1.0" encoding="utf-8"?>
+<p:sld xmlns:a="http://schemas.openxmlformats.org/drawingml/2006/main" xmlns:r="http://schemas.openxmlformats.org/officeDocument/2006/relationships" xmlns:p="http://schemas.openxmlformats.org/presentationml/2006/main">
+  <p:cSld>
+    <p:spTree>
+      <p:nvGrpSpPr>
+        <p:cNvPr id="1" name=""/>
+        <p:cNvGrpSpPr/>
+        <p:nvPr/>
+      </p:nvGrpSpPr>
+      <p:grpSpPr>
+        <a:xfrm>
+          <a:off x="0" y="0"/>
+          <a:ext cx="0" cy="0"/>
+          <a:chOff x="0" y="0"/>
+          <a:chExt cx="0" cy="0"/>
+        </a:xfrm>
+      </p:grpSpPr>
+      <p:sp>
+        <p:nvSpPr>
+          <p:cNvPr id="2" name="Textplatzhalter 1">
+            <a:extLst>
+              <a:ext uri="{FF2B5EF4-FFF2-40B4-BE49-F238E27FC236}">
+                <a16:creationId xmlns:a16="http://schemas.microsoft.com/office/drawing/2014/main" id="{D671D917-0E7D-044A-A553-3607B76DD26D}"/>
+              </a:ext>
+            </a:extLst>
+          </p:cNvPr>
+          <p:cNvSpPr>
+            <a:spLocks noGrp="1"/>
+          </p:cNvSpPr>
+          <p:nvPr>
+            <p:ph type="body" sz="quarter" idx="13"/>
+          </p:nvPr>
+        </p:nvSpPr>
+        <p:spPr>
+          <a:xfrm>
+            <a:off x="518317" y="2647985"/>
+            <a:ext cx="11157745" cy="1562031"/>
+          </a:xfrm>
+        </p:spPr>
+        <p:txBody>
+          <a:bodyPr/>
+          <a:lstStyle/>
+          <a:p>
+            <a:r>
+              <a:rPr lang="de-DE" dirty="0"/>
+              <a:t>Vielen Dank</a:t>
+            </a:r>
+          </a:p>
+          <a:p>
+            <a:r>
+              <a:rPr lang="de-DE" dirty="0"/>
+              <a:t>für Ihre Aufmerksamkeit!</a:t>
+            </a:r>
+          </a:p>
+        </p:txBody>
+      </p:sp>
+    </p:spTree>
+    <p:extLst>
+      <p:ext uri="{BB962C8B-B14F-4D97-AF65-F5344CB8AC3E}">
+        <p14:creationId xmlns:p14="http://schemas.microsoft.com/office/powerpoint/2010/main" val="1185948968"/>
+      </p:ext>
+    </p:extLst>
+  </p:cSld>
+  <p:clrMapOvr>
+    <a:masterClrMapping/>
+  </p:clrMapOvr>
+</p:sld>
+</file>
+
 <file path=ppt/slides/slide4.xml><?xml version="1.0" encoding="utf-8"?>
 <p:sld xmlns:a="http://schemas.openxmlformats.org/drawingml/2006/main" xmlns:r="http://schemas.openxmlformats.org/officeDocument/2006/relationships" xmlns:p="http://schemas.openxmlformats.org/presentationml/2006/main">
   <p:cSld>
@@ -12737,7 +14124,7 @@
           <a:p>
             <a:fld id="{A2E8877F-2015-4290-957C-06EF82A52242}" type="datetime8">
               <a:rPr lang="en-DE" smtClean="0"/>
-              <a:t>11/01/2022 16:19</a:t>
+              <a:t>11/01/2022 18:33</a:t>
             </a:fld>
             <a:endParaRPr lang="de-DE" dirty="0"/>
           </a:p>
@@ -13541,7 +14928,7 @@
           <a:p>
             <a:fld id="{C683496F-A479-4189-AF7A-49EC797A60BB}" type="datetime8">
               <a:rPr lang="en-DE" smtClean="0"/>
-              <a:t>11/01/2022 16:19</a:t>
+              <a:t>11/01/2022 18:33</a:t>
             </a:fld>
             <a:endParaRPr lang="de-DE" dirty="0"/>
           </a:p>
@@ -13695,7 +15082,7 @@
           <a:p>
             <a:fld id="{A2E8877F-2015-4290-957C-06EF82A52242}" type="datetime8">
               <a:rPr lang="en-DE" smtClean="0"/>
-              <a:t>11/01/2022 16:19</a:t>
+              <a:t>11/01/2022 18:33</a:t>
             </a:fld>
             <a:endParaRPr lang="de-DE" dirty="0"/>
           </a:p>
@@ -13866,7 +15253,7 @@
           <a:p>
             <a:fld id="{A2E8877F-2015-4290-957C-06EF82A52242}" type="datetime8">
               <a:rPr lang="en-DE" smtClean="0"/>
-              <a:t>11/01/2022 16:19</a:t>
+              <a:t>11/01/2022 18:33</a:t>
             </a:fld>
             <a:endParaRPr lang="de-DE" dirty="0"/>
           </a:p>
@@ -14111,7 +15498,7 @@
           <a:p>
             <a:fld id="{C683496F-A479-4189-AF7A-49EC797A60BB}" type="datetime8">
               <a:rPr lang="en-DE" smtClean="0"/>
-              <a:t>11/01/2022 16:19</a:t>
+              <a:t>11/01/2022 18:33</a:t>
             </a:fld>
             <a:endParaRPr lang="de-DE" dirty="0"/>
           </a:p>
@@ -14229,7 +15616,7 @@
           <a:p>
             <a:fld id="{A2E8877F-2015-4290-957C-06EF82A52242}" type="datetime8">
               <a:rPr lang="en-DE" smtClean="0"/>
-              <a:t>11/01/2022 16:19</a:t>
+              <a:t>11/01/2022 18:33</a:t>
             </a:fld>
             <a:endParaRPr lang="de-DE" dirty="0"/>
           </a:p>
@@ -15382,6 +16769,12 @@
 </file>
 
 <file path=customXml/item1.xml><?xml version="1.0" encoding="utf-8"?>
+<p:properties xmlns:p="http://schemas.microsoft.com/office/2006/metadata/properties" xmlns:xsi="http://www.w3.org/2001/XMLSchema-instance" xmlns:pc="http://schemas.microsoft.com/office/infopath/2007/PartnerControls">
+  <documentManagement/>
+</p:properties>
+</file>
+
+<file path=customXml/item2.xml><?xml version="1.0" encoding="utf-8"?>
 <ct:contentTypeSchema xmlns:ct="http://schemas.microsoft.com/office/2006/metadata/contentType" xmlns:ma="http://schemas.microsoft.com/office/2006/metadata/properties/metaAttributes" ct:_="" ma:_="" ma:contentTypeName="Dokument" ma:contentTypeID="0x010100B7C64748B88E4F4A81E78C320064AA18" ma:contentTypeVersion="13" ma:contentTypeDescription="Ein neues Dokument erstellen." ma:contentTypeScope="" ma:versionID="7d7fe78eff81fbacf66dc0ff6aeec5a3">
   <xsd:schema xmlns:xsd="http://www.w3.org/2001/XMLSchema" xmlns:xs="http://www.w3.org/2001/XMLSchema" xmlns:p="http://schemas.microsoft.com/office/2006/metadata/properties" xmlns:ns2="e1a9e197-d112-4abb-aa0c-4ed035d690a3" xmlns:ns3="5d4c14f1-5e26-4315-944b-e10ebb29e5be" targetNamespace="http://schemas.microsoft.com/office/2006/metadata/properties" ma:root="true" ma:fieldsID="798e591f6d3205a21a5c8f3fdff7cfef" ns2:_="" ns3:_="">
     <xsd:import namespace="e1a9e197-d112-4abb-aa0c-4ed035d690a3"/>
@@ -15604,12 +16997,6 @@
 </ct:contentTypeSchema>
 </file>
 
-<file path=customXml/item2.xml><?xml version="1.0" encoding="utf-8"?>
-<p:properties xmlns:p="http://schemas.microsoft.com/office/2006/metadata/properties" xmlns:xsi="http://www.w3.org/2001/XMLSchema-instance" xmlns:pc="http://schemas.microsoft.com/office/infopath/2007/PartnerControls">
-  <documentManagement/>
-</p:properties>
-</file>
-
 <file path=customXml/item3.xml><?xml version="1.0" encoding="utf-8"?>
 <?mso-contentType ?>
 <FormTemplates xmlns="http://schemas.microsoft.com/sharepoint/v3/contenttype/forms">
@@ -15620,6 +17007,23 @@
 </file>
 
 <file path=customXml/itemProps1.xml><?xml version="1.0" encoding="utf-8"?>
+<ds:datastoreItem xmlns:ds="http://schemas.openxmlformats.org/officeDocument/2006/customXml" ds:itemID="{CC1A7FE3-81F7-4596-A188-3EE8D4188E1F}">
+  <ds:schemaRefs>
+    <ds:schemaRef ds:uri="http://schemas.microsoft.com/office/2006/documentManagement/types"/>
+    <ds:schemaRef ds:uri="http://www.w3.org/XML/1998/namespace"/>
+    <ds:schemaRef ds:uri="http://purl.org/dc/terms/"/>
+    <ds:schemaRef ds:uri="http://schemas.openxmlformats.org/package/2006/metadata/core-properties"/>
+    <ds:schemaRef ds:uri="e1a9e197-d112-4abb-aa0c-4ed035d690a3"/>
+    <ds:schemaRef ds:uri="http://purl.org/dc/elements/1.1/"/>
+    <ds:schemaRef ds:uri="http://schemas.microsoft.com/office/infopath/2007/PartnerControls"/>
+    <ds:schemaRef ds:uri="5d4c14f1-5e26-4315-944b-e10ebb29e5be"/>
+    <ds:schemaRef ds:uri="http://schemas.microsoft.com/office/2006/metadata/properties"/>
+    <ds:schemaRef ds:uri="http://purl.org/dc/dcmitype/"/>
+  </ds:schemaRefs>
+</ds:datastoreItem>
+</file>
+
+<file path=customXml/itemProps2.xml><?xml version="1.0" encoding="utf-8"?>
 <ds:datastoreItem xmlns:ds="http://schemas.openxmlformats.org/officeDocument/2006/customXml" ds:itemID="{CDFBE955-EBBF-441B-94AE-DC551CE16727}">
   <ds:schemaRefs>
     <ds:schemaRef ds:uri="http://schemas.microsoft.com/office/2006/metadata/contentType"/>
@@ -15638,23 +17042,6 @@
 </ds:datastoreItem>
 </file>
 
-<file path=customXml/itemProps2.xml><?xml version="1.0" encoding="utf-8"?>
-<ds:datastoreItem xmlns:ds="http://schemas.openxmlformats.org/officeDocument/2006/customXml" ds:itemID="{CC1A7FE3-81F7-4596-A188-3EE8D4188E1F}">
-  <ds:schemaRefs>
-    <ds:schemaRef ds:uri="http://schemas.microsoft.com/office/2006/documentManagement/types"/>
-    <ds:schemaRef ds:uri="http://www.w3.org/XML/1998/namespace"/>
-    <ds:schemaRef ds:uri="http://purl.org/dc/terms/"/>
-    <ds:schemaRef ds:uri="http://schemas.openxmlformats.org/package/2006/metadata/core-properties"/>
-    <ds:schemaRef ds:uri="e1a9e197-d112-4abb-aa0c-4ed035d690a3"/>
-    <ds:schemaRef ds:uri="http://purl.org/dc/elements/1.1/"/>
-    <ds:schemaRef ds:uri="http://schemas.microsoft.com/office/infopath/2007/PartnerControls"/>
-    <ds:schemaRef ds:uri="5d4c14f1-5e26-4315-944b-e10ebb29e5be"/>
-    <ds:schemaRef ds:uri="http://schemas.microsoft.com/office/2006/metadata/properties"/>
-    <ds:schemaRef ds:uri="http://purl.org/dc/dcmitype/"/>
-  </ds:schemaRefs>
-</ds:datastoreItem>
-</file>
-
 <file path=customXml/itemProps3.xml><?xml version="1.0" encoding="utf-8"?>
 <ds:datastoreItem xmlns:ds="http://schemas.openxmlformats.org/officeDocument/2006/customXml" ds:itemID="{E457329C-FB5F-4A4D-B331-82D30E9A7432}">
   <ds:schemaRefs>

</xml_diff>